<commit_message>
yet another new version
</commit_message>
<xml_diff>
--- a/ESS_May_2021/Wednesday_May_5th/2_Component_basics/2_Sources_and_Monitors_2.pptx
+++ b/ESS_May_2021/Wednesday_May_5th/2_Component_basics/2_Sources_and_Monitors_2.pptx
@@ -358,12 +358,140 @@
 <p1510:revInfo xmlns:a="http://schemas.openxmlformats.org/drawingml/2006/main" xmlns:r="http://schemas.openxmlformats.org/officeDocument/2006/relationships" xmlns:p1510="http://schemas.microsoft.com/office/powerpoint/2015/10/main">
   <p1510:revLst>
     <p1510:client id="{192497DD-4841-1F2E-2102-CD52C9305636}" v="460" dt="2021-05-03T18:20:52.827"/>
+    <p1510:client id="{4DBFD482-A271-941E-7EBB-8524531C8CF1}" v="14" dt="2021-05-03T19:36:18.840"/>
   </p1510:revLst>
 </p1510:revInfo>
 </file>
 
 <file path=ppt/changesInfos/changesInfo1.xml><?xml version="1.0" encoding="utf-8"?>
 <pc:chgInfo xmlns:a="http://schemas.openxmlformats.org/drawingml/2006/main" xmlns:r="http://schemas.openxmlformats.org/officeDocument/2006/relationships" xmlns:ac="http://schemas.microsoft.com/office/drawing/2013/main/command" xmlns:pc="http://schemas.microsoft.com/office/powerpoint/2013/main/command">
+  <pc:docChgLst>
+    <pc:chgData name="Erik Bergbäck Knudsen" userId="S::erkn@dtu.dk::7028c474-af22-41ee-9ddd-5fdf2cd26899" providerId="AD" clId="Web-{4DBFD482-A271-941E-7EBB-8524531C8CF1}"/>
+    <pc:docChg chg="modSld">
+      <pc:chgData name="Erik Bergbäck Knudsen" userId="S::erkn@dtu.dk::7028c474-af22-41ee-9ddd-5fdf2cd26899" providerId="AD" clId="Web-{4DBFD482-A271-941E-7EBB-8524531C8CF1}" dt="2021-05-03T19:36:18.840" v="13" actId="14100"/>
+      <pc:docMkLst>
+        <pc:docMk/>
+      </pc:docMkLst>
+      <pc:sldChg chg="modSp">
+        <pc:chgData name="Erik Bergbäck Knudsen" userId="S::erkn@dtu.dk::7028c474-af22-41ee-9ddd-5fdf2cd26899" providerId="AD" clId="Web-{4DBFD482-A271-941E-7EBB-8524531C8CF1}" dt="2021-05-03T19:36:18.840" v="13" actId="14100"/>
+        <pc:sldMkLst>
+          <pc:docMk/>
+          <pc:sldMk cId="0" sldId="265"/>
+        </pc:sldMkLst>
+        <pc:spChg chg="mod">
+          <ac:chgData name="Erik Bergbäck Knudsen" userId="S::erkn@dtu.dk::7028c474-af22-41ee-9ddd-5fdf2cd26899" providerId="AD" clId="Web-{4DBFD482-A271-941E-7EBB-8524531C8CF1}" dt="2021-05-03T19:36:10.152" v="9" actId="14100"/>
+          <ac:spMkLst>
+            <pc:docMk/>
+            <pc:sldMk cId="0" sldId="265"/>
+            <ac:spMk id="373" creationId="{00000000-0000-0000-0000-000000000000}"/>
+          </ac:spMkLst>
+        </pc:spChg>
+        <pc:spChg chg="mod">
+          <ac:chgData name="Erik Bergbäck Knudsen" userId="S::erkn@dtu.dk::7028c474-af22-41ee-9ddd-5fdf2cd26899" providerId="AD" clId="Web-{4DBFD482-A271-941E-7EBB-8524531C8CF1}" dt="2021-05-03T19:36:12.840" v="10" actId="14100"/>
+          <ac:spMkLst>
+            <pc:docMk/>
+            <pc:sldMk cId="0" sldId="265"/>
+            <ac:spMk id="374" creationId="{00000000-0000-0000-0000-000000000000}"/>
+          </ac:spMkLst>
+        </pc:spChg>
+        <pc:spChg chg="mod">
+          <ac:chgData name="Erik Bergbäck Knudsen" userId="S::erkn@dtu.dk::7028c474-af22-41ee-9ddd-5fdf2cd26899" providerId="AD" clId="Web-{4DBFD482-A271-941E-7EBB-8524531C8CF1}" dt="2021-05-03T19:36:15.371" v="11" actId="14100"/>
+          <ac:spMkLst>
+            <pc:docMk/>
+            <pc:sldMk cId="0" sldId="265"/>
+            <ac:spMk id="375" creationId="{00000000-0000-0000-0000-000000000000}"/>
+          </ac:spMkLst>
+        </pc:spChg>
+        <pc:spChg chg="mod">
+          <ac:chgData name="Erik Bergbäck Knudsen" userId="S::erkn@dtu.dk::7028c474-af22-41ee-9ddd-5fdf2cd26899" providerId="AD" clId="Web-{4DBFD482-A271-941E-7EBB-8524531C8CF1}" dt="2021-05-03T19:36:18.840" v="13" actId="14100"/>
+          <ac:spMkLst>
+            <pc:docMk/>
+            <pc:sldMk cId="0" sldId="265"/>
+            <ac:spMk id="376" creationId="{00000000-0000-0000-0000-000000000000}"/>
+          </ac:spMkLst>
+        </pc:spChg>
+      </pc:sldChg>
+      <pc:sldChg chg="modSp">
+        <pc:chgData name="Erik Bergbäck Knudsen" userId="S::erkn@dtu.dk::7028c474-af22-41ee-9ddd-5fdf2cd26899" providerId="AD" clId="Web-{4DBFD482-A271-941E-7EBB-8524531C8CF1}" dt="2021-05-03T19:36:05.355" v="8" actId="14100"/>
+        <pc:sldMkLst>
+          <pc:docMk/>
+          <pc:sldMk cId="0" sldId="266"/>
+        </pc:sldMkLst>
+        <pc:spChg chg="mod">
+          <ac:chgData name="Erik Bergbäck Knudsen" userId="S::erkn@dtu.dk::7028c474-af22-41ee-9ddd-5fdf2cd26899" providerId="AD" clId="Web-{4DBFD482-A271-941E-7EBB-8524531C8CF1}" dt="2021-05-03T19:35:55.746" v="5" actId="14100"/>
+          <ac:spMkLst>
+            <pc:docMk/>
+            <pc:sldMk cId="0" sldId="266"/>
+            <ac:spMk id="399" creationId="{00000000-0000-0000-0000-000000000000}"/>
+          </ac:spMkLst>
+        </pc:spChg>
+        <pc:spChg chg="mod">
+          <ac:chgData name="Erik Bergbäck Knudsen" userId="S::erkn@dtu.dk::7028c474-af22-41ee-9ddd-5fdf2cd26899" providerId="AD" clId="Web-{4DBFD482-A271-941E-7EBB-8524531C8CF1}" dt="2021-05-03T19:35:49.886" v="3" actId="14100"/>
+          <ac:spMkLst>
+            <pc:docMk/>
+            <pc:sldMk cId="0" sldId="266"/>
+            <ac:spMk id="400" creationId="{00000000-0000-0000-0000-000000000000}"/>
+          </ac:spMkLst>
+        </pc:spChg>
+        <pc:spChg chg="mod">
+          <ac:chgData name="Erik Bergbäck Knudsen" userId="S::erkn@dtu.dk::7028c474-af22-41ee-9ddd-5fdf2cd26899" providerId="AD" clId="Web-{4DBFD482-A271-941E-7EBB-8524531C8CF1}" dt="2021-05-03T19:35:52.996" v="4" actId="14100"/>
+          <ac:spMkLst>
+            <pc:docMk/>
+            <pc:sldMk cId="0" sldId="266"/>
+            <ac:spMk id="401" creationId="{00000000-0000-0000-0000-000000000000}"/>
+          </ac:spMkLst>
+        </pc:spChg>
+        <pc:spChg chg="mod">
+          <ac:chgData name="Erik Bergbäck Knudsen" userId="S::erkn@dtu.dk::7028c474-af22-41ee-9ddd-5fdf2cd26899" providerId="AD" clId="Web-{4DBFD482-A271-941E-7EBB-8524531C8CF1}" dt="2021-05-03T19:35:38.792" v="1" actId="14100"/>
+          <ac:spMkLst>
+            <pc:docMk/>
+            <pc:sldMk cId="0" sldId="266"/>
+            <ac:spMk id="405" creationId="{00000000-0000-0000-0000-000000000000}"/>
+          </ac:spMkLst>
+        </pc:spChg>
+        <pc:spChg chg="mod">
+          <ac:chgData name="Erik Bergbäck Knudsen" userId="S::erkn@dtu.dk::7028c474-af22-41ee-9ddd-5fdf2cd26899" providerId="AD" clId="Web-{4DBFD482-A271-941E-7EBB-8524531C8CF1}" dt="2021-05-03T19:35:41.386" v="2" actId="14100"/>
+          <ac:spMkLst>
+            <pc:docMk/>
+            <pc:sldMk cId="0" sldId="266"/>
+            <ac:spMk id="406" creationId="{00000000-0000-0000-0000-000000000000}"/>
+          </ac:spMkLst>
+        </pc:spChg>
+        <pc:spChg chg="mod">
+          <ac:chgData name="Erik Bergbäck Knudsen" userId="S::erkn@dtu.dk::7028c474-af22-41ee-9ddd-5fdf2cd26899" providerId="AD" clId="Web-{4DBFD482-A271-941E-7EBB-8524531C8CF1}" dt="2021-05-03T19:36:05.355" v="8" actId="14100"/>
+          <ac:spMkLst>
+            <pc:docMk/>
+            <pc:sldMk cId="0" sldId="266"/>
+            <ac:spMk id="427" creationId="{00000000-0000-0000-0000-000000000000}"/>
+          </ac:spMkLst>
+        </pc:spChg>
+        <pc:spChg chg="mod">
+          <ac:chgData name="Erik Bergbäck Knudsen" userId="S::erkn@dtu.dk::7028c474-af22-41ee-9ddd-5fdf2cd26899" providerId="AD" clId="Web-{4DBFD482-A271-941E-7EBB-8524531C8CF1}" dt="2021-05-03T19:36:02.480" v="7" actId="14100"/>
+          <ac:spMkLst>
+            <pc:docMk/>
+            <pc:sldMk cId="0" sldId="266"/>
+            <ac:spMk id="428" creationId="{00000000-0000-0000-0000-000000000000}"/>
+          </ac:spMkLst>
+        </pc:spChg>
+        <pc:spChg chg="mod">
+          <ac:chgData name="Erik Bergbäck Knudsen" userId="S::erkn@dtu.dk::7028c474-af22-41ee-9ddd-5fdf2cd26899" providerId="AD" clId="Web-{4DBFD482-A271-941E-7EBB-8524531C8CF1}" dt="2021-05-03T19:35:59.386" v="6" actId="14100"/>
+          <ac:spMkLst>
+            <pc:docMk/>
+            <pc:sldMk cId="0" sldId="266"/>
+            <ac:spMk id="429" creationId="{00000000-0000-0000-0000-000000000000}"/>
+          </ac:spMkLst>
+        </pc:spChg>
+        <pc:spChg chg="mod">
+          <ac:chgData name="Erik Bergbäck Knudsen" userId="S::erkn@dtu.dk::7028c474-af22-41ee-9ddd-5fdf2cd26899" providerId="AD" clId="Web-{4DBFD482-A271-941E-7EBB-8524531C8CF1}" dt="2021-05-03T19:35:35.433" v="0" actId="14100"/>
+          <ac:spMkLst>
+            <pc:docMk/>
+            <pc:sldMk cId="0" sldId="266"/>
+            <ac:spMk id="430" creationId="{00000000-0000-0000-0000-000000000000}"/>
+          </ac:spMkLst>
+        </pc:spChg>
+      </pc:sldChg>
+    </pc:docChg>
+  </pc:docChgLst>
   <pc:docChgLst>
     <pc:chgData name="Erik Bergbäck Knudsen" userId="S::erkn@dtu.dk::7028c474-af22-41ee-9ddd-5fdf2cd26899" providerId="AD" clId="Web-{192497DD-4841-1F2E-2102-CD52C9305636}"/>
     <pc:docChg chg="addSld delSld modSld sldOrd">
@@ -1913,7 +2041,7 @@
           </a:ln>
           <a:extLst>
             <a:ext uri="{C572A759-6A51-4108-AA02-DFA0A04FC94B}">
-              <ma14:wrappingTextBoxFlag xmlns="" xmlns:m="http://schemas.openxmlformats.org/officeDocument/2006/math" xmlns:a14="http://schemas.microsoft.com/office/drawing/2010/main" xmlns:ma14="http://schemas.microsoft.com/office/mac/drawingml/2011/main" val="1"/>
+              <ma14:wrappingTextBoxFlag xmlns:ma14="http://schemas.microsoft.com/office/mac/drawingml/2011/main" xmlns:a14="http://schemas.microsoft.com/office/drawing/2010/main" xmlns:m="http://schemas.openxmlformats.org/officeDocument/2006/math" xmlns="" val="1"/>
             </a:ext>
           </a:extLst>
         </p:spPr>
@@ -2817,7 +2945,7 @@
           </a:ln>
           <a:extLst>
             <a:ext uri="{C572A759-6A51-4108-AA02-DFA0A04FC94B}">
-              <ma14:wrappingTextBoxFlag xmlns="" xmlns:m="http://schemas.openxmlformats.org/officeDocument/2006/math" xmlns:a14="http://schemas.microsoft.com/office/drawing/2010/main" xmlns:ma14="http://schemas.microsoft.com/office/mac/drawingml/2011/main" val="1"/>
+              <ma14:wrappingTextBoxFlag xmlns:ma14="http://schemas.microsoft.com/office/mac/drawingml/2011/main" xmlns:a14="http://schemas.microsoft.com/office/drawing/2010/main" xmlns:m="http://schemas.openxmlformats.org/officeDocument/2006/math" xmlns="" val="1"/>
             </a:ext>
           </a:extLst>
         </p:spPr>
@@ -3064,7 +3192,7 @@
             <a:effectLst/>
             <a:extLst>
               <a:ext uri="{C572A759-6A51-4108-AA02-DFA0A04FC94B}">
-                <ma14:wrappingTextBoxFlag xmlns="" xmlns:m="http://schemas.openxmlformats.org/officeDocument/2006/math" xmlns:a14="http://schemas.microsoft.com/office/drawing/2010/main" xmlns:ma14="http://schemas.microsoft.com/office/mac/drawingml/2011/main" val="1"/>
+                <ma14:wrappingTextBoxFlag xmlns:ma14="http://schemas.microsoft.com/office/mac/drawingml/2011/main" xmlns:a14="http://schemas.microsoft.com/office/drawing/2010/main" xmlns:m="http://schemas.openxmlformats.org/officeDocument/2006/math" xmlns="" val="1"/>
               </a:ext>
             </a:extLst>
           </p:spPr>
@@ -4538,7 +4666,7 @@
           </a:ln>
           <a:extLst>
             <a:ext uri="{C572A759-6A51-4108-AA02-DFA0A04FC94B}">
-              <ma14:wrappingTextBoxFlag xmlns="" xmlns:m="http://schemas.openxmlformats.org/officeDocument/2006/math" xmlns:a14="http://schemas.microsoft.com/office/drawing/2010/main" xmlns:ma14="http://schemas.microsoft.com/office/mac/drawingml/2011/main" val="1"/>
+              <ma14:wrappingTextBoxFlag xmlns:ma14="http://schemas.microsoft.com/office/mac/drawingml/2011/main" xmlns:a14="http://schemas.microsoft.com/office/drawing/2010/main" xmlns:m="http://schemas.openxmlformats.org/officeDocument/2006/math" xmlns="" val="1"/>
             </a:ext>
           </a:extLst>
         </p:spPr>
@@ -4785,7 +4913,7 @@
             <a:effectLst/>
             <a:extLst>
               <a:ext uri="{C572A759-6A51-4108-AA02-DFA0A04FC94B}">
-                <ma14:wrappingTextBoxFlag xmlns="" xmlns:m="http://schemas.openxmlformats.org/officeDocument/2006/math" xmlns:a14="http://schemas.microsoft.com/office/drawing/2010/main" xmlns:ma14="http://schemas.microsoft.com/office/mac/drawingml/2011/main" val="1"/>
+                <ma14:wrappingTextBoxFlag xmlns:ma14="http://schemas.microsoft.com/office/mac/drawingml/2011/main" xmlns:a14="http://schemas.microsoft.com/office/drawing/2010/main" xmlns:m="http://schemas.openxmlformats.org/officeDocument/2006/math" xmlns="" val="1"/>
               </a:ext>
             </a:extLst>
           </p:spPr>
@@ -6313,7 +6441,7 @@
           </a:ln>
           <a:extLst>
             <a:ext uri="{C572A759-6A51-4108-AA02-DFA0A04FC94B}">
-              <ma14:wrappingTextBoxFlag xmlns="" xmlns:m="http://schemas.openxmlformats.org/officeDocument/2006/math" xmlns:a14="http://schemas.microsoft.com/office/drawing/2010/main" xmlns:ma14="http://schemas.microsoft.com/office/mac/drawingml/2011/main" val="1"/>
+              <ma14:wrappingTextBoxFlag xmlns:ma14="http://schemas.microsoft.com/office/mac/drawingml/2011/main" xmlns:a14="http://schemas.microsoft.com/office/drawing/2010/main" xmlns:m="http://schemas.openxmlformats.org/officeDocument/2006/math" xmlns="" val="1"/>
             </a:ext>
           </a:extLst>
         </p:spPr>
@@ -6560,7 +6688,7 @@
             <a:effectLst/>
             <a:extLst>
               <a:ext uri="{C572A759-6A51-4108-AA02-DFA0A04FC94B}">
-                <ma14:wrappingTextBoxFlag xmlns="" xmlns:m="http://schemas.openxmlformats.org/officeDocument/2006/math" xmlns:a14="http://schemas.microsoft.com/office/drawing/2010/main" xmlns:ma14="http://schemas.microsoft.com/office/mac/drawingml/2011/main" val="1"/>
+                <ma14:wrappingTextBoxFlag xmlns:ma14="http://schemas.microsoft.com/office/mac/drawingml/2011/main" xmlns:a14="http://schemas.microsoft.com/office/drawing/2010/main" xmlns:m="http://schemas.openxmlformats.org/officeDocument/2006/math" xmlns="" val="1"/>
               </a:ext>
             </a:extLst>
           </p:spPr>
@@ -8088,7 +8216,7 @@
           </a:ln>
           <a:extLst>
             <a:ext uri="{C572A759-6A51-4108-AA02-DFA0A04FC94B}">
-              <ma14:wrappingTextBoxFlag xmlns="" xmlns:m="http://schemas.openxmlformats.org/officeDocument/2006/math" xmlns:a14="http://schemas.microsoft.com/office/drawing/2010/main" xmlns:ma14="http://schemas.microsoft.com/office/mac/drawingml/2011/main" val="1"/>
+              <ma14:wrappingTextBoxFlag xmlns:ma14="http://schemas.microsoft.com/office/mac/drawingml/2011/main" xmlns:a14="http://schemas.microsoft.com/office/drawing/2010/main" xmlns:m="http://schemas.openxmlformats.org/officeDocument/2006/math" xmlns="" val="1"/>
             </a:ext>
           </a:extLst>
         </p:spPr>
@@ -8362,7 +8490,7 @@
             <a:effectLst/>
             <a:extLst>
               <a:ext uri="{C572A759-6A51-4108-AA02-DFA0A04FC94B}">
-                <ma14:wrappingTextBoxFlag xmlns="" xmlns:m="http://schemas.openxmlformats.org/officeDocument/2006/math" xmlns:a14="http://schemas.microsoft.com/office/drawing/2010/main" xmlns:ma14="http://schemas.microsoft.com/office/mac/drawingml/2011/main" val="1"/>
+                <ma14:wrappingTextBoxFlag xmlns:ma14="http://schemas.microsoft.com/office/mac/drawingml/2011/main" xmlns:a14="http://schemas.microsoft.com/office/drawing/2010/main" xmlns:m="http://schemas.openxmlformats.org/officeDocument/2006/math" xmlns="" val="1"/>
               </a:ext>
             </a:extLst>
           </p:spPr>
@@ -10648,7 +10776,7 @@
           </a:ln>
           <a:extLst>
             <a:ext uri="{C572A759-6A51-4108-AA02-DFA0A04FC94B}">
-              <ma14:wrappingTextBoxFlag xmlns="" xmlns:m="http://schemas.openxmlformats.org/officeDocument/2006/math" xmlns:a14="http://schemas.microsoft.com/office/drawing/2010/main" xmlns:ma14="http://schemas.microsoft.com/office/mac/drawingml/2011/main" val="1"/>
+              <ma14:wrappingTextBoxFlag xmlns:ma14="http://schemas.microsoft.com/office/mac/drawingml/2011/main" xmlns:a14="http://schemas.microsoft.com/office/drawing/2010/main" xmlns:m="http://schemas.openxmlformats.org/officeDocument/2006/math" xmlns="" val="1"/>
             </a:ext>
           </a:extLst>
         </p:spPr>
@@ -10696,7 +10824,7 @@
           </a:ln>
           <a:extLst>
             <a:ext uri="{C572A759-6A51-4108-AA02-DFA0A04FC94B}">
-              <ma14:wrappingTextBoxFlag xmlns="" xmlns:m="http://schemas.openxmlformats.org/officeDocument/2006/math" xmlns:a14="http://schemas.microsoft.com/office/drawing/2010/main" xmlns:ma14="http://schemas.microsoft.com/office/mac/drawingml/2011/main" val="1"/>
+              <ma14:wrappingTextBoxFlag xmlns:ma14="http://schemas.microsoft.com/office/mac/drawingml/2011/main" xmlns:a14="http://schemas.microsoft.com/office/drawing/2010/main" xmlns:m="http://schemas.openxmlformats.org/officeDocument/2006/math" xmlns="" val="1"/>
             </a:ext>
           </a:extLst>
         </p:spPr>
@@ -11518,7 +11646,7 @@
           </a:ln>
           <a:extLst>
             <a:ext uri="{C572A759-6A51-4108-AA02-DFA0A04FC94B}">
-              <ma14:wrappingTextBoxFlag xmlns="" xmlns:m="http://schemas.openxmlformats.org/officeDocument/2006/math" xmlns:a14="http://schemas.microsoft.com/office/drawing/2010/main" xmlns:ma14="http://schemas.microsoft.com/office/mac/drawingml/2011/main" val="1"/>
+              <ma14:wrappingTextBoxFlag xmlns:ma14="http://schemas.microsoft.com/office/mac/drawingml/2011/main" xmlns:a14="http://schemas.microsoft.com/office/drawing/2010/main" xmlns:m="http://schemas.openxmlformats.org/officeDocument/2006/math" xmlns="" val="1"/>
             </a:ext>
           </a:extLst>
         </p:spPr>
@@ -11765,7 +11893,7 @@
             <a:effectLst/>
             <a:extLst>
               <a:ext uri="{C572A759-6A51-4108-AA02-DFA0A04FC94B}">
-                <ma14:wrappingTextBoxFlag xmlns="" xmlns:m="http://schemas.openxmlformats.org/officeDocument/2006/math" xmlns:a14="http://schemas.microsoft.com/office/drawing/2010/main" xmlns:ma14="http://schemas.microsoft.com/office/mac/drawingml/2011/main" val="1"/>
+                <ma14:wrappingTextBoxFlag xmlns:ma14="http://schemas.microsoft.com/office/mac/drawingml/2011/main" xmlns:a14="http://schemas.microsoft.com/office/drawing/2010/main" xmlns:m="http://schemas.openxmlformats.org/officeDocument/2006/math" xmlns="" val="1"/>
               </a:ext>
             </a:extLst>
           </p:spPr>
@@ -13113,7 +13241,7 @@
           </a:ln>
           <a:extLst>
             <a:ext uri="{C572A759-6A51-4108-AA02-DFA0A04FC94B}">
-              <ma14:wrappingTextBoxFlag xmlns="" xmlns:m="http://schemas.openxmlformats.org/officeDocument/2006/math" xmlns:a14="http://schemas.microsoft.com/office/drawing/2010/main" xmlns:ma14="http://schemas.microsoft.com/office/mac/drawingml/2011/main" val="1"/>
+              <ma14:wrappingTextBoxFlag xmlns:ma14="http://schemas.microsoft.com/office/mac/drawingml/2011/main" xmlns:a14="http://schemas.microsoft.com/office/drawing/2010/main" xmlns:m="http://schemas.openxmlformats.org/officeDocument/2006/math" xmlns="" val="1"/>
             </a:ext>
           </a:extLst>
         </p:spPr>
@@ -13159,7 +13287,7 @@
           </a:ln>
           <a:extLst>
             <a:ext uri="{C572A759-6A51-4108-AA02-DFA0A04FC94B}">
-              <ma14:wrappingTextBoxFlag xmlns="" xmlns:m="http://schemas.openxmlformats.org/officeDocument/2006/math" xmlns:a14="http://schemas.microsoft.com/office/drawing/2010/main" xmlns:ma14="http://schemas.microsoft.com/office/mac/drawingml/2011/main" val="1"/>
+              <ma14:wrappingTextBoxFlag xmlns:ma14="http://schemas.microsoft.com/office/mac/drawingml/2011/main" xmlns:a14="http://schemas.microsoft.com/office/drawing/2010/main" xmlns:m="http://schemas.openxmlformats.org/officeDocument/2006/math" xmlns="" val="1"/>
             </a:ext>
           </a:extLst>
         </p:spPr>
@@ -15198,7 +15326,7 @@
           </a:ln>
           <a:extLst>
             <a:ext uri="{C572A759-6A51-4108-AA02-DFA0A04FC94B}">
-              <ma14:wrappingTextBoxFlag xmlns="" xmlns:m="http://schemas.openxmlformats.org/officeDocument/2006/math" xmlns:a14="http://schemas.microsoft.com/office/drawing/2010/main" xmlns:ma14="http://schemas.microsoft.com/office/mac/drawingml/2011/main" val="1"/>
+              <ma14:wrappingTextBoxFlag xmlns:ma14="http://schemas.microsoft.com/office/mac/drawingml/2011/main" xmlns:a14="http://schemas.microsoft.com/office/drawing/2010/main" xmlns:m="http://schemas.openxmlformats.org/officeDocument/2006/math" xmlns="" val="1"/>
             </a:ext>
           </a:extLst>
         </p:spPr>
@@ -16044,7 +16172,7 @@
           </a:ln>
           <a:extLst>
             <a:ext uri="{C572A759-6A51-4108-AA02-DFA0A04FC94B}">
-              <ma14:wrappingTextBoxFlag xmlns="" xmlns:m="http://schemas.openxmlformats.org/officeDocument/2006/math" xmlns:a14="http://schemas.microsoft.com/office/drawing/2010/main" xmlns:ma14="http://schemas.microsoft.com/office/mac/drawingml/2011/main" val="1"/>
+              <ma14:wrappingTextBoxFlag xmlns:ma14="http://schemas.microsoft.com/office/mac/drawingml/2011/main" xmlns:a14="http://schemas.microsoft.com/office/drawing/2010/main" xmlns:m="http://schemas.openxmlformats.org/officeDocument/2006/math" xmlns="" val="1"/>
             </a:ext>
           </a:extLst>
         </p:spPr>
@@ -16319,7 +16447,7 @@
             <a:effectLst/>
             <a:extLst>
               <a:ext uri="{C572A759-6A51-4108-AA02-DFA0A04FC94B}">
-                <ma14:wrappingTextBoxFlag xmlns="" xmlns:m="http://schemas.openxmlformats.org/officeDocument/2006/math" xmlns:a14="http://schemas.microsoft.com/office/drawing/2010/main" xmlns:ma14="http://schemas.microsoft.com/office/mac/drawingml/2011/main" val="1"/>
+                <ma14:wrappingTextBoxFlag xmlns:ma14="http://schemas.microsoft.com/office/mac/drawingml/2011/main" xmlns:a14="http://schemas.microsoft.com/office/drawing/2010/main" xmlns:m="http://schemas.openxmlformats.org/officeDocument/2006/math" xmlns="" val="1"/>
               </a:ext>
             </a:extLst>
           </p:spPr>
@@ -17070,7 +17198,7 @@
           </a:ln>
           <a:extLst>
             <a:ext uri="{C572A759-6A51-4108-AA02-DFA0A04FC94B}">
-              <ma14:wrappingTextBoxFlag xmlns="" xmlns:m="http://schemas.openxmlformats.org/officeDocument/2006/math" xmlns:a14="http://schemas.microsoft.com/office/drawing/2010/main" xmlns:ma14="http://schemas.microsoft.com/office/mac/drawingml/2011/main" val="1"/>
+              <ma14:wrappingTextBoxFlag xmlns:ma14="http://schemas.microsoft.com/office/mac/drawingml/2011/main" xmlns:a14="http://schemas.microsoft.com/office/drawing/2010/main" xmlns:m="http://schemas.openxmlformats.org/officeDocument/2006/math" xmlns="" val="1"/>
             </a:ext>
           </a:extLst>
         </p:spPr>
@@ -17107,7 +17235,7 @@
           </a:ln>
           <a:extLst>
             <a:ext uri="{C572A759-6A51-4108-AA02-DFA0A04FC94B}">
-              <ma14:wrappingTextBoxFlag xmlns="" xmlns:m="http://schemas.openxmlformats.org/officeDocument/2006/math" xmlns:a14="http://schemas.microsoft.com/office/drawing/2010/main" xmlns:ma14="http://schemas.microsoft.com/office/mac/drawingml/2011/main" val="1"/>
+              <ma14:wrappingTextBoxFlag xmlns:ma14="http://schemas.microsoft.com/office/mac/drawingml/2011/main" xmlns:a14="http://schemas.microsoft.com/office/drawing/2010/main" xmlns:m="http://schemas.openxmlformats.org/officeDocument/2006/math" xmlns="" val="1"/>
             </a:ext>
           </a:extLst>
         </p:spPr>
@@ -17909,7 +18037,7 @@
           </a:ln>
           <a:extLst>
             <a:ext uri="{C572A759-6A51-4108-AA02-DFA0A04FC94B}">
-              <ma14:wrappingTextBoxFlag xmlns="" xmlns:m="http://schemas.openxmlformats.org/officeDocument/2006/math" xmlns:a14="http://schemas.microsoft.com/office/drawing/2010/main" xmlns:ma14="http://schemas.microsoft.com/office/mac/drawingml/2011/main" val="1"/>
+              <ma14:wrappingTextBoxFlag xmlns:ma14="http://schemas.microsoft.com/office/mac/drawingml/2011/main" xmlns:a14="http://schemas.microsoft.com/office/drawing/2010/main" xmlns:m="http://schemas.openxmlformats.org/officeDocument/2006/math" xmlns="" val="1"/>
             </a:ext>
           </a:extLst>
         </p:spPr>
@@ -17954,7 +18082,7 @@
           </a:ln>
           <a:extLst>
             <a:ext uri="{C572A759-6A51-4108-AA02-DFA0A04FC94B}">
-              <ma14:wrappingTextBoxFlag xmlns="" xmlns:m="http://schemas.openxmlformats.org/officeDocument/2006/math" xmlns:a14="http://schemas.microsoft.com/office/drawing/2010/main" xmlns:ma14="http://schemas.microsoft.com/office/mac/drawingml/2011/main" val="1"/>
+              <ma14:wrappingTextBoxFlag xmlns:ma14="http://schemas.microsoft.com/office/mac/drawingml/2011/main" xmlns:a14="http://schemas.microsoft.com/office/drawing/2010/main" xmlns:m="http://schemas.openxmlformats.org/officeDocument/2006/math" xmlns="" val="1"/>
             </a:ext>
           </a:extLst>
         </p:spPr>
@@ -17993,7 +18121,7 @@
           </a:prstGeom>
           <a:extLst>
             <a:ext uri="{C572A759-6A51-4108-AA02-DFA0A04FC94B}">
-              <ma14:wrappingTextBoxFlag xmlns="" xmlns:m="http://schemas.openxmlformats.org/officeDocument/2006/math" xmlns:a14="http://schemas.microsoft.com/office/drawing/2010/main" xmlns:ma14="http://schemas.microsoft.com/office/mac/drawingml/2011/main" val="1"/>
+              <ma14:wrappingTextBoxFlag xmlns:ma14="http://schemas.microsoft.com/office/mac/drawingml/2011/main" xmlns:a14="http://schemas.microsoft.com/office/drawing/2010/main" xmlns:m="http://schemas.openxmlformats.org/officeDocument/2006/math" xmlns="" val="1"/>
             </a:ext>
           </a:extLst>
         </p:spPr>
@@ -18057,7 +18185,7 @@
           </a:ln>
           <a:extLst>
             <a:ext uri="{C572A759-6A51-4108-AA02-DFA0A04FC94B}">
-              <ma14:wrappingTextBoxFlag xmlns="" xmlns:m="http://schemas.openxmlformats.org/officeDocument/2006/math" xmlns:a14="http://schemas.microsoft.com/office/drawing/2010/main" xmlns:ma14="http://schemas.microsoft.com/office/mac/drawingml/2011/main" val="1"/>
+              <ma14:wrappingTextBoxFlag xmlns:ma14="http://schemas.microsoft.com/office/mac/drawingml/2011/main" xmlns:a14="http://schemas.microsoft.com/office/drawing/2010/main" xmlns:m="http://schemas.openxmlformats.org/officeDocument/2006/math" xmlns="" val="1"/>
             </a:ext>
           </a:extLst>
         </p:spPr>
@@ -18093,7 +18221,7 @@
           </a:prstGeom>
           <a:extLst>
             <a:ext uri="{C572A759-6A51-4108-AA02-DFA0A04FC94B}">
-              <ma14:wrappingTextBoxFlag xmlns="" xmlns:m="http://schemas.openxmlformats.org/officeDocument/2006/math" xmlns:a14="http://schemas.microsoft.com/office/drawing/2010/main" xmlns:ma14="http://schemas.microsoft.com/office/mac/drawingml/2011/main" val="1"/>
+              <ma14:wrappingTextBoxFlag xmlns:ma14="http://schemas.microsoft.com/office/mac/drawingml/2011/main" xmlns:a14="http://schemas.microsoft.com/office/drawing/2010/main" xmlns:m="http://schemas.openxmlformats.org/officeDocument/2006/math" xmlns="" val="1"/>
             </a:ext>
           </a:extLst>
         </p:spPr>
@@ -18131,7 +18259,7 @@
           </a:ln>
           <a:extLst>
             <a:ext uri="{C572A759-6A51-4108-AA02-DFA0A04FC94B}">
-              <ma14:wrappingTextBoxFlag xmlns="" xmlns:m="http://schemas.openxmlformats.org/officeDocument/2006/math" xmlns:a14="http://schemas.microsoft.com/office/drawing/2010/main" xmlns:ma14="http://schemas.microsoft.com/office/mac/drawingml/2011/main" val="1"/>
+              <ma14:wrappingTextBoxFlag xmlns:ma14="http://schemas.microsoft.com/office/mac/drawingml/2011/main" xmlns:a14="http://schemas.microsoft.com/office/drawing/2010/main" xmlns:m="http://schemas.openxmlformats.org/officeDocument/2006/math" xmlns="" val="1"/>
             </a:ext>
           </a:extLst>
         </p:spPr>
@@ -18319,7 +18447,7 @@
           </a:ln>
           <a:extLst>
             <a:ext uri="{C572A759-6A51-4108-AA02-DFA0A04FC94B}">
-              <ma14:wrappingTextBoxFlag xmlns="" xmlns:m="http://schemas.openxmlformats.org/officeDocument/2006/math" xmlns:a14="http://schemas.microsoft.com/office/drawing/2010/main" xmlns:ma14="http://schemas.microsoft.com/office/mac/drawingml/2011/main" val="1"/>
+              <ma14:wrappingTextBoxFlag xmlns:ma14="http://schemas.microsoft.com/office/mac/drawingml/2011/main" xmlns:a14="http://schemas.microsoft.com/office/drawing/2010/main" xmlns:m="http://schemas.openxmlformats.org/officeDocument/2006/math" xmlns="" val="1"/>
             </a:ext>
           </a:extLst>
         </p:spPr>
@@ -18447,7 +18575,7 @@
             <a:effectLst/>
             <a:extLst>
               <a:ext uri="{C572A759-6A51-4108-AA02-DFA0A04FC94B}">
-                <ma14:wrappingTextBoxFlag xmlns="" xmlns:m="http://schemas.openxmlformats.org/officeDocument/2006/math" xmlns:a14="http://schemas.microsoft.com/office/drawing/2010/main" xmlns:ma14="http://schemas.microsoft.com/office/mac/drawingml/2011/main" val="1"/>
+                <ma14:wrappingTextBoxFlag xmlns:ma14="http://schemas.microsoft.com/office/mac/drawingml/2011/main" xmlns:a14="http://schemas.microsoft.com/office/drawing/2010/main" xmlns:m="http://schemas.openxmlformats.org/officeDocument/2006/math" xmlns="" val="1"/>
               </a:ext>
             </a:extLst>
           </p:spPr>
@@ -18576,7 +18704,7 @@
             <a:effectLst/>
             <a:extLst>
               <a:ext uri="{C572A759-6A51-4108-AA02-DFA0A04FC94B}">
-                <ma14:wrappingTextBoxFlag xmlns="" xmlns:m="http://schemas.openxmlformats.org/officeDocument/2006/math" xmlns:a14="http://schemas.microsoft.com/office/drawing/2010/main" xmlns:ma14="http://schemas.microsoft.com/office/mac/drawingml/2011/main" val="1"/>
+                <ma14:wrappingTextBoxFlag xmlns:ma14="http://schemas.microsoft.com/office/mac/drawingml/2011/main" xmlns:a14="http://schemas.microsoft.com/office/drawing/2010/main" xmlns:m="http://schemas.openxmlformats.org/officeDocument/2006/math" xmlns="" val="1"/>
               </a:ext>
             </a:extLst>
           </p:spPr>
@@ -18697,7 +18825,7 @@
         <p:spPr>
           <a:xfrm>
             <a:off x="2426399" y="4077360"/>
-            <a:ext cx="782281" cy="650281"/>
+            <a:ext cx="860896" cy="337098"/>
           </a:xfrm>
           <a:prstGeom prst="rect">
             <a:avLst/>
@@ -18707,12 +18835,12 @@
           </a:ln>
           <a:extLst>
             <a:ext uri="{C572A759-6A51-4108-AA02-DFA0A04FC94B}">
-              <ma14:wrappingTextBoxFlag xmlns="" xmlns:m="http://schemas.openxmlformats.org/officeDocument/2006/math" xmlns:a14="http://schemas.microsoft.com/office/drawing/2010/main" xmlns:ma14="http://schemas.microsoft.com/office/mac/drawingml/2011/main" val="1"/>
+              <ma14:wrappingTextBoxFlag xmlns:ma14="http://schemas.microsoft.com/office/mac/drawingml/2011/main" xmlns:a14="http://schemas.microsoft.com/office/drawing/2010/main" xmlns:m="http://schemas.openxmlformats.org/officeDocument/2006/math" xmlns="" val="1"/>
             </a:ext>
           </a:extLst>
         </p:spPr>
         <p:txBody>
-          <a:bodyPr lIns="44999" tIns="44999" rIns="44999" bIns="44999">
+          <a:bodyPr wrap="square" lIns="44999" tIns="44999" rIns="44999" bIns="44999">
             <a:spAutoFit/>
           </a:bodyPr>
           <a:lstStyle/>
@@ -18760,7 +18888,7 @@
         <p:spPr>
           <a:xfrm>
             <a:off x="2426399" y="5041079"/>
-            <a:ext cx="782281" cy="650282"/>
+            <a:ext cx="824612" cy="501246"/>
           </a:xfrm>
           <a:prstGeom prst="rect">
             <a:avLst/>
@@ -18770,12 +18898,12 @@
           </a:ln>
           <a:extLst>
             <a:ext uri="{C572A759-6A51-4108-AA02-DFA0A04FC94B}">
-              <ma14:wrappingTextBoxFlag xmlns="" xmlns:m="http://schemas.openxmlformats.org/officeDocument/2006/math" xmlns:a14="http://schemas.microsoft.com/office/drawing/2010/main" xmlns:ma14="http://schemas.microsoft.com/office/mac/drawingml/2011/main" val="1"/>
+              <ma14:wrappingTextBoxFlag xmlns:ma14="http://schemas.microsoft.com/office/mac/drawingml/2011/main" xmlns:a14="http://schemas.microsoft.com/office/drawing/2010/main" xmlns:m="http://schemas.openxmlformats.org/officeDocument/2006/math" xmlns="" val="1"/>
             </a:ext>
           </a:extLst>
         </p:spPr>
         <p:txBody>
-          <a:bodyPr lIns="44999" tIns="44999" rIns="44999" bIns="44999">
+          <a:bodyPr wrap="square" lIns="44999" tIns="44999" rIns="44999" bIns="44999">
             <a:spAutoFit/>
           </a:bodyPr>
           <a:lstStyle/>
@@ -18822,8 +18950,8 @@
         </p:nvSpPr>
         <p:spPr>
           <a:xfrm>
-            <a:off x="4154399" y="5162400"/>
-            <a:ext cx="782281" cy="650281"/>
+            <a:off x="4142305" y="5162400"/>
+            <a:ext cx="854848" cy="337098"/>
           </a:xfrm>
           <a:prstGeom prst="rect">
             <a:avLst/>
@@ -18833,12 +18961,12 @@
           </a:ln>
           <a:extLst>
             <a:ext uri="{C572A759-6A51-4108-AA02-DFA0A04FC94B}">
-              <ma14:wrappingTextBoxFlag xmlns="" xmlns:m="http://schemas.openxmlformats.org/officeDocument/2006/math" xmlns:a14="http://schemas.microsoft.com/office/drawing/2010/main" xmlns:ma14="http://schemas.microsoft.com/office/mac/drawingml/2011/main" val="1"/>
+              <ma14:wrappingTextBoxFlag xmlns:ma14="http://schemas.microsoft.com/office/mac/drawingml/2011/main" xmlns:a14="http://schemas.microsoft.com/office/drawing/2010/main" xmlns:m="http://schemas.openxmlformats.org/officeDocument/2006/math" xmlns="" val="1"/>
             </a:ext>
           </a:extLst>
         </p:spPr>
         <p:txBody>
-          <a:bodyPr lIns="44999" tIns="44999" rIns="44999" bIns="44999">
+          <a:bodyPr wrap="square" lIns="44999" tIns="44999" rIns="44999" bIns="44999">
             <a:spAutoFit/>
           </a:bodyPr>
           <a:lstStyle/>
@@ -18886,7 +19014,7 @@
         <p:spPr>
           <a:xfrm>
             <a:off x="4082400" y="4802399"/>
-            <a:ext cx="1818361" cy="602065"/>
+            <a:ext cx="1933259" cy="337098"/>
           </a:xfrm>
           <a:prstGeom prst="rect">
             <a:avLst/>
@@ -18896,12 +19024,12 @@
           </a:ln>
           <a:extLst>
             <a:ext uri="{C572A759-6A51-4108-AA02-DFA0A04FC94B}">
-              <ma14:wrappingTextBoxFlag xmlns="" xmlns:m="http://schemas.openxmlformats.org/officeDocument/2006/math" xmlns:a14="http://schemas.microsoft.com/office/drawing/2010/main" xmlns:ma14="http://schemas.microsoft.com/office/mac/drawingml/2011/main" val="1"/>
+              <ma14:wrappingTextBoxFlag xmlns:ma14="http://schemas.microsoft.com/office/mac/drawingml/2011/main" xmlns:a14="http://schemas.microsoft.com/office/drawing/2010/main" xmlns:m="http://schemas.openxmlformats.org/officeDocument/2006/math" xmlns="" val="1"/>
             </a:ext>
           </a:extLst>
         </p:spPr>
         <p:txBody>
-          <a:bodyPr lIns="44999" tIns="44999" rIns="44999" bIns="44999">
+          <a:bodyPr wrap="square" lIns="44999" tIns="44999" rIns="44999" bIns="44999">
             <a:spAutoFit/>
           </a:bodyPr>
           <a:lstStyle/>
@@ -18963,7 +19091,7 @@
           </a:ln>
           <a:extLst>
             <a:ext uri="{C572A759-6A51-4108-AA02-DFA0A04FC94B}">
-              <ma14:wrappingTextBoxFlag xmlns="" xmlns:m="http://schemas.openxmlformats.org/officeDocument/2006/math" xmlns:a14="http://schemas.microsoft.com/office/drawing/2010/main" xmlns:ma14="http://schemas.microsoft.com/office/mac/drawingml/2011/main" val="1"/>
+              <ma14:wrappingTextBoxFlag xmlns:ma14="http://schemas.microsoft.com/office/mac/drawingml/2011/main" xmlns:a14="http://schemas.microsoft.com/office/drawing/2010/main" xmlns:m="http://schemas.openxmlformats.org/officeDocument/2006/math" xmlns="" val="1"/>
             </a:ext>
           </a:extLst>
         </p:spPr>
@@ -19038,7 +19166,7 @@
           </a:prstGeom>
           <a:extLst>
             <a:ext uri="{C572A759-6A51-4108-AA02-DFA0A04FC94B}">
-              <ma14:wrappingTextBoxFlag xmlns="" xmlns:m="http://schemas.openxmlformats.org/officeDocument/2006/math" xmlns:a14="http://schemas.microsoft.com/office/drawing/2010/main" xmlns:ma14="http://schemas.microsoft.com/office/mac/drawingml/2011/main" val="1"/>
+              <ma14:wrappingTextBoxFlag xmlns:ma14="http://schemas.microsoft.com/office/mac/drawingml/2011/main" xmlns:a14="http://schemas.microsoft.com/office/drawing/2010/main" xmlns:m="http://schemas.openxmlformats.org/officeDocument/2006/math" xmlns="" val="1"/>
             </a:ext>
           </a:extLst>
         </p:spPr>
@@ -19076,7 +19204,7 @@
           </a:ln>
           <a:extLst>
             <a:ext uri="{C572A759-6A51-4108-AA02-DFA0A04FC94B}">
-              <ma14:wrappingTextBoxFlag xmlns="" xmlns:m="http://schemas.openxmlformats.org/officeDocument/2006/math" xmlns:a14="http://schemas.microsoft.com/office/drawing/2010/main" xmlns:ma14="http://schemas.microsoft.com/office/mac/drawingml/2011/main" val="1"/>
+              <ma14:wrappingTextBoxFlag xmlns:ma14="http://schemas.microsoft.com/office/mac/drawingml/2011/main" xmlns:a14="http://schemas.microsoft.com/office/drawing/2010/main" xmlns:m="http://schemas.openxmlformats.org/officeDocument/2006/math" xmlns="" val="1"/>
             </a:ext>
           </a:extLst>
         </p:spPr>
@@ -19292,7 +19420,7 @@
           </a:ln>
           <a:extLst>
             <a:ext uri="{C572A759-6A51-4108-AA02-DFA0A04FC94B}">
-              <ma14:wrappingTextBoxFlag xmlns="" xmlns:m="http://schemas.openxmlformats.org/officeDocument/2006/math" xmlns:a14="http://schemas.microsoft.com/office/drawing/2010/main" xmlns:ma14="http://schemas.microsoft.com/office/mac/drawingml/2011/main" val="1"/>
+              <ma14:wrappingTextBoxFlag xmlns:ma14="http://schemas.microsoft.com/office/mac/drawingml/2011/main" xmlns:a14="http://schemas.microsoft.com/office/drawing/2010/main" xmlns:m="http://schemas.openxmlformats.org/officeDocument/2006/math" xmlns="" val="1"/>
             </a:ext>
           </a:extLst>
         </p:spPr>
@@ -19420,7 +19548,7 @@
             <a:effectLst/>
             <a:extLst>
               <a:ext uri="{C572A759-6A51-4108-AA02-DFA0A04FC94B}">
-                <ma14:wrappingTextBoxFlag xmlns="" xmlns:m="http://schemas.openxmlformats.org/officeDocument/2006/math" xmlns:a14="http://schemas.microsoft.com/office/drawing/2010/main" xmlns:ma14="http://schemas.microsoft.com/office/mac/drawingml/2011/main" val="1"/>
+                <ma14:wrappingTextBoxFlag xmlns:ma14="http://schemas.microsoft.com/office/mac/drawingml/2011/main" xmlns:a14="http://schemas.microsoft.com/office/drawing/2010/main" xmlns:m="http://schemas.openxmlformats.org/officeDocument/2006/math" xmlns="" val="1"/>
               </a:ext>
             </a:extLst>
           </p:spPr>
@@ -19549,7 +19677,7 @@
             <a:effectLst/>
             <a:extLst>
               <a:ext uri="{C572A759-6A51-4108-AA02-DFA0A04FC94B}">
-                <ma14:wrappingTextBoxFlag xmlns="" xmlns:m="http://schemas.openxmlformats.org/officeDocument/2006/math" xmlns:a14="http://schemas.microsoft.com/office/drawing/2010/main" xmlns:ma14="http://schemas.microsoft.com/office/mac/drawingml/2011/main" val="1"/>
+                <ma14:wrappingTextBoxFlag xmlns:ma14="http://schemas.microsoft.com/office/mac/drawingml/2011/main" xmlns:a14="http://schemas.microsoft.com/office/drawing/2010/main" xmlns:m="http://schemas.openxmlformats.org/officeDocument/2006/math" xmlns="" val="1"/>
               </a:ext>
             </a:extLst>
           </p:spPr>
@@ -19670,7 +19798,7 @@
         <p:spPr>
           <a:xfrm>
             <a:off x="7272359" y="2472480"/>
-            <a:ext cx="782281" cy="650281"/>
+            <a:ext cx="885085" cy="337098"/>
           </a:xfrm>
           <a:prstGeom prst="rect">
             <a:avLst/>
@@ -19680,12 +19808,12 @@
           </a:ln>
           <a:extLst>
             <a:ext uri="{C572A759-6A51-4108-AA02-DFA0A04FC94B}">
-              <ma14:wrappingTextBoxFlag xmlns="" xmlns:m="http://schemas.openxmlformats.org/officeDocument/2006/math" xmlns:a14="http://schemas.microsoft.com/office/drawing/2010/main" xmlns:ma14="http://schemas.microsoft.com/office/mac/drawingml/2011/main" val="1"/>
+              <ma14:wrappingTextBoxFlag xmlns:ma14="http://schemas.microsoft.com/office/mac/drawingml/2011/main" xmlns:a14="http://schemas.microsoft.com/office/drawing/2010/main" xmlns:m="http://schemas.openxmlformats.org/officeDocument/2006/math" xmlns="" val="1"/>
             </a:ext>
           </a:extLst>
         </p:spPr>
         <p:txBody>
-          <a:bodyPr lIns="44999" tIns="44999" rIns="44999" bIns="44999">
+          <a:bodyPr wrap="square" lIns="44999" tIns="44999" rIns="44999" bIns="44999">
             <a:spAutoFit/>
           </a:bodyPr>
           <a:lstStyle/>
@@ -19732,8 +19860,8 @@
         </p:nvSpPr>
         <p:spPr>
           <a:xfrm>
-            <a:off x="7272359" y="3436199"/>
-            <a:ext cx="782281" cy="650282"/>
+            <a:off x="7272359" y="3430152"/>
+            <a:ext cx="915322" cy="337098"/>
           </a:xfrm>
           <a:prstGeom prst="rect">
             <a:avLst/>
@@ -19743,12 +19871,12 @@
           </a:ln>
           <a:extLst>
             <a:ext uri="{C572A759-6A51-4108-AA02-DFA0A04FC94B}">
-              <ma14:wrappingTextBoxFlag xmlns="" xmlns:m="http://schemas.openxmlformats.org/officeDocument/2006/math" xmlns:a14="http://schemas.microsoft.com/office/drawing/2010/main" xmlns:ma14="http://schemas.microsoft.com/office/mac/drawingml/2011/main" val="1"/>
+              <ma14:wrappingTextBoxFlag xmlns:ma14="http://schemas.microsoft.com/office/mac/drawingml/2011/main" xmlns:a14="http://schemas.microsoft.com/office/drawing/2010/main" xmlns:m="http://schemas.openxmlformats.org/officeDocument/2006/math" xmlns="" val="1"/>
             </a:ext>
           </a:extLst>
         </p:spPr>
         <p:txBody>
-          <a:bodyPr lIns="44999" tIns="44999" rIns="44999" bIns="44999">
+          <a:bodyPr wrap="square" lIns="44999" tIns="44999" rIns="44999" bIns="44999">
             <a:spAutoFit/>
           </a:bodyPr>
           <a:lstStyle/>
@@ -19795,8 +19923,8 @@
         </p:nvSpPr>
         <p:spPr>
           <a:xfrm>
-            <a:off x="9000360" y="3557520"/>
-            <a:ext cx="782281" cy="650281"/>
+            <a:off x="8988266" y="3557520"/>
+            <a:ext cx="915321" cy="337098"/>
           </a:xfrm>
           <a:prstGeom prst="rect">
             <a:avLst/>
@@ -19806,12 +19934,12 @@
           </a:ln>
           <a:extLst>
             <a:ext uri="{C572A759-6A51-4108-AA02-DFA0A04FC94B}">
-              <ma14:wrappingTextBoxFlag xmlns="" xmlns:m="http://schemas.openxmlformats.org/officeDocument/2006/math" xmlns:a14="http://schemas.microsoft.com/office/drawing/2010/main" xmlns:ma14="http://schemas.microsoft.com/office/mac/drawingml/2011/main" val="1"/>
+              <ma14:wrappingTextBoxFlag xmlns:ma14="http://schemas.microsoft.com/office/mac/drawingml/2011/main" xmlns:a14="http://schemas.microsoft.com/office/drawing/2010/main" xmlns:m="http://schemas.openxmlformats.org/officeDocument/2006/math" xmlns="" val="1"/>
             </a:ext>
           </a:extLst>
         </p:spPr>
         <p:txBody>
-          <a:bodyPr lIns="44999" tIns="44999" rIns="44999" bIns="44999">
+          <a:bodyPr wrap="square" lIns="44999" tIns="44999" rIns="44999" bIns="44999">
             <a:spAutoFit/>
           </a:bodyPr>
           <a:lstStyle/>
@@ -19945,8 +20073,8 @@
         </p:nvSpPr>
         <p:spPr>
           <a:xfrm>
-            <a:off x="8973000" y="3142800"/>
-            <a:ext cx="1607759" cy="602065"/>
+            <a:off x="8985094" y="3148847"/>
+            <a:ext cx="1728706" cy="337098"/>
           </a:xfrm>
           <a:prstGeom prst="rect">
             <a:avLst/>
@@ -19956,12 +20084,12 @@
           </a:ln>
           <a:extLst>
             <a:ext uri="{C572A759-6A51-4108-AA02-DFA0A04FC94B}">
-              <ma14:wrappingTextBoxFlag xmlns="" xmlns:m="http://schemas.openxmlformats.org/officeDocument/2006/math" xmlns:a14="http://schemas.microsoft.com/office/drawing/2010/main" xmlns:ma14="http://schemas.microsoft.com/office/mac/drawingml/2011/main" val="1"/>
+              <ma14:wrappingTextBoxFlag xmlns:ma14="http://schemas.microsoft.com/office/mac/drawingml/2011/main" xmlns:a14="http://schemas.microsoft.com/office/drawing/2010/main" xmlns:m="http://schemas.openxmlformats.org/officeDocument/2006/math" xmlns="" val="1"/>
             </a:ext>
           </a:extLst>
         </p:spPr>
         <p:txBody>
-          <a:bodyPr lIns="44999" tIns="44999" rIns="44999" bIns="44999">
+          <a:bodyPr wrap="square" lIns="44999" tIns="44999" rIns="44999" bIns="44999">
             <a:spAutoFit/>
           </a:bodyPr>
           <a:lstStyle/>
@@ -20013,7 +20141,7 @@
         <p:spPr>
           <a:xfrm>
             <a:off x="7856999" y="6010559"/>
-            <a:ext cx="1818361" cy="602065"/>
+            <a:ext cx="1951402" cy="337098"/>
           </a:xfrm>
           <a:prstGeom prst="rect">
             <a:avLst/>
@@ -20023,12 +20151,12 @@
           </a:ln>
           <a:extLst>
             <a:ext uri="{C572A759-6A51-4108-AA02-DFA0A04FC94B}">
-              <ma14:wrappingTextBoxFlag xmlns="" xmlns:m="http://schemas.openxmlformats.org/officeDocument/2006/math" xmlns:a14="http://schemas.microsoft.com/office/drawing/2010/main" xmlns:ma14="http://schemas.microsoft.com/office/mac/drawingml/2011/main" val="1"/>
+              <ma14:wrappingTextBoxFlag xmlns:ma14="http://schemas.microsoft.com/office/mac/drawingml/2011/main" xmlns:a14="http://schemas.microsoft.com/office/drawing/2010/main" xmlns:m="http://schemas.openxmlformats.org/officeDocument/2006/math" xmlns="" val="1"/>
             </a:ext>
           </a:extLst>
         </p:spPr>
         <p:txBody>
-          <a:bodyPr lIns="44999" tIns="44999" rIns="44999" bIns="44999">
+          <a:bodyPr wrap="square" lIns="44999" tIns="44999" rIns="44999" bIns="44999">
             <a:spAutoFit/>
           </a:bodyPr>
           <a:lstStyle/>
@@ -20090,7 +20218,7 @@
           </a:ln>
           <a:extLst>
             <a:ext uri="{C572A759-6A51-4108-AA02-DFA0A04FC94B}">
-              <ma14:wrappingTextBoxFlag xmlns="" xmlns:m="http://schemas.openxmlformats.org/officeDocument/2006/math" xmlns:a14="http://schemas.microsoft.com/office/drawing/2010/main" xmlns:ma14="http://schemas.microsoft.com/office/mac/drawingml/2011/main" val="1"/>
+              <ma14:wrappingTextBoxFlag xmlns:ma14="http://schemas.microsoft.com/office/mac/drawingml/2011/main" xmlns:a14="http://schemas.microsoft.com/office/drawing/2010/main" xmlns:m="http://schemas.openxmlformats.org/officeDocument/2006/math" xmlns="" val="1"/>
             </a:ext>
           </a:extLst>
         </p:spPr>
@@ -20210,7 +20338,7 @@
           </a:ln>
           <a:extLst>
             <a:ext uri="{C572A759-6A51-4108-AA02-DFA0A04FC94B}">
-              <ma14:wrappingTextBoxFlag xmlns="" xmlns:m="http://schemas.openxmlformats.org/officeDocument/2006/math" xmlns:a14="http://schemas.microsoft.com/office/drawing/2010/main" xmlns:ma14="http://schemas.microsoft.com/office/mac/drawingml/2011/main" val="1"/>
+              <ma14:wrappingTextBoxFlag xmlns:ma14="http://schemas.microsoft.com/office/mac/drawingml/2011/main" xmlns:a14="http://schemas.microsoft.com/office/drawing/2010/main" xmlns:m="http://schemas.openxmlformats.org/officeDocument/2006/math" xmlns="" val="1"/>
             </a:ext>
           </a:extLst>
         </p:spPr>
@@ -20398,7 +20526,7 @@
           </a:ln>
           <a:extLst>
             <a:ext uri="{C572A759-6A51-4108-AA02-DFA0A04FC94B}">
-              <ma14:wrappingTextBoxFlag xmlns="" xmlns:m="http://schemas.openxmlformats.org/officeDocument/2006/math" xmlns:a14="http://schemas.microsoft.com/office/drawing/2010/main" xmlns:ma14="http://schemas.microsoft.com/office/mac/drawingml/2011/main" val="1"/>
+              <ma14:wrappingTextBoxFlag xmlns:ma14="http://schemas.microsoft.com/office/mac/drawingml/2011/main" xmlns:a14="http://schemas.microsoft.com/office/drawing/2010/main" xmlns:m="http://schemas.openxmlformats.org/officeDocument/2006/math" xmlns="" val="1"/>
             </a:ext>
           </a:extLst>
         </p:spPr>
@@ -20526,7 +20654,7 @@
             <a:effectLst/>
             <a:extLst>
               <a:ext uri="{C572A759-6A51-4108-AA02-DFA0A04FC94B}">
-                <ma14:wrappingTextBoxFlag xmlns="" xmlns:m="http://schemas.openxmlformats.org/officeDocument/2006/math" xmlns:a14="http://schemas.microsoft.com/office/drawing/2010/main" xmlns:ma14="http://schemas.microsoft.com/office/mac/drawingml/2011/main" val="1"/>
+                <ma14:wrappingTextBoxFlag xmlns:ma14="http://schemas.microsoft.com/office/mac/drawingml/2011/main" xmlns:a14="http://schemas.microsoft.com/office/drawing/2010/main" xmlns:m="http://schemas.openxmlformats.org/officeDocument/2006/math" xmlns="" val="1"/>
               </a:ext>
             </a:extLst>
           </p:spPr>
@@ -20655,7 +20783,7 @@
             <a:effectLst/>
             <a:extLst>
               <a:ext uri="{C572A759-6A51-4108-AA02-DFA0A04FC94B}">
-                <ma14:wrappingTextBoxFlag xmlns="" xmlns:m="http://schemas.openxmlformats.org/officeDocument/2006/math" xmlns:a14="http://schemas.microsoft.com/office/drawing/2010/main" xmlns:ma14="http://schemas.microsoft.com/office/mac/drawingml/2011/main" val="1"/>
+                <ma14:wrappingTextBoxFlag xmlns:ma14="http://schemas.microsoft.com/office/mac/drawingml/2011/main" xmlns:a14="http://schemas.microsoft.com/office/drawing/2010/main" xmlns:m="http://schemas.openxmlformats.org/officeDocument/2006/math" xmlns="" val="1"/>
               </a:ext>
             </a:extLst>
           </p:spPr>
@@ -20776,7 +20904,7 @@
         <p:spPr>
           <a:xfrm>
             <a:off x="2030399" y="4077720"/>
-            <a:ext cx="782281" cy="650281"/>
+            <a:ext cx="836706" cy="337098"/>
           </a:xfrm>
           <a:prstGeom prst="rect">
             <a:avLst/>
@@ -20786,12 +20914,12 @@
           </a:ln>
           <a:extLst>
             <a:ext uri="{C572A759-6A51-4108-AA02-DFA0A04FC94B}">
-              <ma14:wrappingTextBoxFlag xmlns="" xmlns:m="http://schemas.openxmlformats.org/officeDocument/2006/math" xmlns:a14="http://schemas.microsoft.com/office/drawing/2010/main" xmlns:ma14="http://schemas.microsoft.com/office/mac/drawingml/2011/main" val="1"/>
+              <ma14:wrappingTextBoxFlag xmlns:ma14="http://schemas.microsoft.com/office/mac/drawingml/2011/main" xmlns:a14="http://schemas.microsoft.com/office/drawing/2010/main" xmlns:m="http://schemas.openxmlformats.org/officeDocument/2006/math" xmlns="" val="1"/>
             </a:ext>
           </a:extLst>
         </p:spPr>
         <p:txBody>
-          <a:bodyPr lIns="44999" tIns="44999" rIns="44999" bIns="44999">
+          <a:bodyPr wrap="square" lIns="44999" tIns="44999" rIns="44999" bIns="44999">
             <a:spAutoFit/>
           </a:bodyPr>
           <a:lstStyle/>
@@ -20839,7 +20967,7 @@
         <p:spPr>
           <a:xfrm>
             <a:off x="2030399" y="5041439"/>
-            <a:ext cx="782281" cy="650282"/>
+            <a:ext cx="860896" cy="337098"/>
           </a:xfrm>
           <a:prstGeom prst="rect">
             <a:avLst/>
@@ -20849,12 +20977,12 @@
           </a:ln>
           <a:extLst>
             <a:ext uri="{C572A759-6A51-4108-AA02-DFA0A04FC94B}">
-              <ma14:wrappingTextBoxFlag xmlns="" xmlns:m="http://schemas.openxmlformats.org/officeDocument/2006/math" xmlns:a14="http://schemas.microsoft.com/office/drawing/2010/main" xmlns:ma14="http://schemas.microsoft.com/office/mac/drawingml/2011/main" val="1"/>
+              <ma14:wrappingTextBoxFlag xmlns:ma14="http://schemas.microsoft.com/office/mac/drawingml/2011/main" xmlns:a14="http://schemas.microsoft.com/office/drawing/2010/main" xmlns:m="http://schemas.openxmlformats.org/officeDocument/2006/math" xmlns="" val="1"/>
             </a:ext>
           </a:extLst>
         </p:spPr>
         <p:txBody>
-          <a:bodyPr lIns="44999" tIns="44999" rIns="44999" bIns="44999">
+          <a:bodyPr wrap="square" lIns="44999" tIns="44999" rIns="44999" bIns="44999">
             <a:spAutoFit/>
           </a:bodyPr>
           <a:lstStyle/>
@@ -20901,8 +21029,8 @@
         </p:nvSpPr>
         <p:spPr>
           <a:xfrm>
-            <a:off x="3758400" y="5162760"/>
-            <a:ext cx="782281" cy="650281"/>
+            <a:off x="3746306" y="5162760"/>
+            <a:ext cx="915321" cy="337098"/>
           </a:xfrm>
           <a:prstGeom prst="rect">
             <a:avLst/>
@@ -20912,12 +21040,12 @@
           </a:ln>
           <a:extLst>
             <a:ext uri="{C572A759-6A51-4108-AA02-DFA0A04FC94B}">
-              <ma14:wrappingTextBoxFlag xmlns="" xmlns:m="http://schemas.openxmlformats.org/officeDocument/2006/math" xmlns:a14="http://schemas.microsoft.com/office/drawing/2010/main" xmlns:ma14="http://schemas.microsoft.com/office/mac/drawingml/2011/main" val="1"/>
+              <ma14:wrappingTextBoxFlag xmlns:ma14="http://schemas.microsoft.com/office/mac/drawingml/2011/main" xmlns:a14="http://schemas.microsoft.com/office/drawing/2010/main" xmlns:m="http://schemas.openxmlformats.org/officeDocument/2006/math" xmlns="" val="1"/>
             </a:ext>
           </a:extLst>
         </p:spPr>
         <p:txBody>
-          <a:bodyPr lIns="44999" tIns="44999" rIns="44999" bIns="44999">
+          <a:bodyPr wrap="square" lIns="44999" tIns="44999" rIns="44999" bIns="44999">
             <a:spAutoFit/>
           </a:bodyPr>
           <a:lstStyle/>
@@ -20964,8 +21092,8 @@
         </p:nvSpPr>
         <p:spPr>
           <a:xfrm>
-            <a:off x="3686399" y="4802759"/>
-            <a:ext cx="1818361" cy="602065"/>
+            <a:off x="3686399" y="4796712"/>
+            <a:ext cx="1963496" cy="337098"/>
           </a:xfrm>
           <a:prstGeom prst="rect">
             <a:avLst/>
@@ -20975,12 +21103,12 @@
           </a:ln>
           <a:extLst>
             <a:ext uri="{C572A759-6A51-4108-AA02-DFA0A04FC94B}">
-              <ma14:wrappingTextBoxFlag xmlns="" xmlns:m="http://schemas.openxmlformats.org/officeDocument/2006/math" xmlns:a14="http://schemas.microsoft.com/office/drawing/2010/main" xmlns:ma14="http://schemas.microsoft.com/office/mac/drawingml/2011/main" val="1"/>
+              <ma14:wrappingTextBoxFlag xmlns:ma14="http://schemas.microsoft.com/office/mac/drawingml/2011/main" xmlns:a14="http://schemas.microsoft.com/office/drawing/2010/main" xmlns:m="http://schemas.openxmlformats.org/officeDocument/2006/math" xmlns="" val="1"/>
             </a:ext>
           </a:extLst>
         </p:spPr>
         <p:txBody>
-          <a:bodyPr lIns="44999" tIns="44999" rIns="44999" bIns="44999">
+          <a:bodyPr wrap="square" lIns="44999" tIns="44999" rIns="44999" bIns="44999">
             <a:spAutoFit/>
           </a:bodyPr>
           <a:lstStyle/>
@@ -21042,7 +21170,7 @@
           </a:ln>
           <a:extLst>
             <a:ext uri="{C572A759-6A51-4108-AA02-DFA0A04FC94B}">
-              <ma14:wrappingTextBoxFlag xmlns="" xmlns:m="http://schemas.openxmlformats.org/officeDocument/2006/math" xmlns:a14="http://schemas.microsoft.com/office/drawing/2010/main" xmlns:ma14="http://schemas.microsoft.com/office/mac/drawingml/2011/main" val="1"/>
+              <ma14:wrappingTextBoxFlag xmlns:ma14="http://schemas.microsoft.com/office/mac/drawingml/2011/main" xmlns:a14="http://schemas.microsoft.com/office/drawing/2010/main" xmlns:m="http://schemas.openxmlformats.org/officeDocument/2006/math" xmlns="" val="1"/>
             </a:ext>
           </a:extLst>
         </p:spPr>
@@ -21094,7 +21222,7 @@
           </a:ln>
           <a:extLst>
             <a:ext uri="{C572A759-6A51-4108-AA02-DFA0A04FC94B}">
-              <ma14:wrappingTextBoxFlag xmlns="" xmlns:m="http://schemas.openxmlformats.org/officeDocument/2006/math" xmlns:a14="http://schemas.microsoft.com/office/drawing/2010/main" xmlns:ma14="http://schemas.microsoft.com/office/mac/drawingml/2011/main" val="1"/>
+              <ma14:wrappingTextBoxFlag xmlns:ma14="http://schemas.microsoft.com/office/mac/drawingml/2011/main" xmlns:a14="http://schemas.microsoft.com/office/drawing/2010/main" xmlns:m="http://schemas.openxmlformats.org/officeDocument/2006/math" xmlns="" val="1"/>
             </a:ext>
           </a:extLst>
         </p:spPr>
@@ -21159,7 +21287,7 @@
           </a:ln>
           <a:extLst>
             <a:ext uri="{C572A759-6A51-4108-AA02-DFA0A04FC94B}">
-              <ma14:wrappingTextBoxFlag xmlns="" xmlns:m="http://schemas.openxmlformats.org/officeDocument/2006/math" xmlns:a14="http://schemas.microsoft.com/office/drawing/2010/main" xmlns:ma14="http://schemas.microsoft.com/office/mac/drawingml/2011/main" val="1"/>
+              <ma14:wrappingTextBoxFlag xmlns:ma14="http://schemas.microsoft.com/office/mac/drawingml/2011/main" xmlns:a14="http://schemas.microsoft.com/office/drawing/2010/main" xmlns:m="http://schemas.openxmlformats.org/officeDocument/2006/math" xmlns="" val="1"/>
             </a:ext>
           </a:extLst>
         </p:spPr>
@@ -21195,7 +21323,7 @@
           </a:prstGeom>
           <a:extLst>
             <a:ext uri="{C572A759-6A51-4108-AA02-DFA0A04FC94B}">
-              <ma14:wrappingTextBoxFlag xmlns="" xmlns:m="http://schemas.openxmlformats.org/officeDocument/2006/math" xmlns:a14="http://schemas.microsoft.com/office/drawing/2010/main" xmlns:ma14="http://schemas.microsoft.com/office/mac/drawingml/2011/main" val="1"/>
+              <ma14:wrappingTextBoxFlag xmlns:ma14="http://schemas.microsoft.com/office/mac/drawingml/2011/main" xmlns:a14="http://schemas.microsoft.com/office/drawing/2010/main" xmlns:m="http://schemas.openxmlformats.org/officeDocument/2006/math" xmlns="" val="1"/>
             </a:ext>
           </a:extLst>
         </p:spPr>
@@ -21233,7 +21361,7 @@
           </a:ln>
           <a:extLst>
             <a:ext uri="{C572A759-6A51-4108-AA02-DFA0A04FC94B}">
-              <ma14:wrappingTextBoxFlag xmlns="" xmlns:m="http://schemas.openxmlformats.org/officeDocument/2006/math" xmlns:a14="http://schemas.microsoft.com/office/drawing/2010/main" xmlns:ma14="http://schemas.microsoft.com/office/mac/drawingml/2011/main" val="1"/>
+              <ma14:wrappingTextBoxFlag xmlns:ma14="http://schemas.microsoft.com/office/mac/drawingml/2011/main" xmlns:a14="http://schemas.microsoft.com/office/drawing/2010/main" xmlns:m="http://schemas.openxmlformats.org/officeDocument/2006/math" xmlns="" val="1"/>
             </a:ext>
           </a:extLst>
         </p:spPr>
@@ -21430,7 +21558,7 @@
             <a:effectLst/>
             <a:extLst>
               <a:ext uri="{C572A759-6A51-4108-AA02-DFA0A04FC94B}">
-                <ma14:wrappingTextBoxFlag xmlns="" xmlns:m="http://schemas.openxmlformats.org/officeDocument/2006/math" xmlns:a14="http://schemas.microsoft.com/office/drawing/2010/main" xmlns:ma14="http://schemas.microsoft.com/office/mac/drawingml/2011/main" val="1"/>
+                <ma14:wrappingTextBoxFlag xmlns:ma14="http://schemas.microsoft.com/office/mac/drawingml/2011/main" xmlns:a14="http://schemas.microsoft.com/office/drawing/2010/main" xmlns:m="http://schemas.openxmlformats.org/officeDocument/2006/math" xmlns="" val="1"/>
               </a:ext>
             </a:extLst>
           </p:spPr>
@@ -21628,7 +21756,7 @@
           </a:prstGeom>
           <a:extLst>
             <a:ext uri="{C572A759-6A51-4108-AA02-DFA0A04FC94B}">
-              <ma14:wrappingTextBoxFlag xmlns="" xmlns:m="http://schemas.openxmlformats.org/officeDocument/2006/math" xmlns:a14="http://schemas.microsoft.com/office/drawing/2010/main" xmlns:ma14="http://schemas.microsoft.com/office/mac/drawingml/2011/main" val="1"/>
+              <ma14:wrappingTextBoxFlag xmlns:ma14="http://schemas.microsoft.com/office/mac/drawingml/2011/main" xmlns:a14="http://schemas.microsoft.com/office/drawing/2010/main" xmlns:m="http://schemas.openxmlformats.org/officeDocument/2006/math" xmlns="" val="1"/>
             </a:ext>
           </a:extLst>
         </p:spPr>
@@ -21753,7 +21881,7 @@
             <a:effectLst/>
             <a:extLst>
               <a:ext uri="{C572A759-6A51-4108-AA02-DFA0A04FC94B}">
-                <ma14:wrappingTextBoxFlag xmlns="" xmlns:m="http://schemas.openxmlformats.org/officeDocument/2006/math" xmlns:a14="http://schemas.microsoft.com/office/drawing/2010/main" xmlns:ma14="http://schemas.microsoft.com/office/mac/drawingml/2011/main" val="1"/>
+                <ma14:wrappingTextBoxFlag xmlns:ma14="http://schemas.microsoft.com/office/mac/drawingml/2011/main" xmlns:a14="http://schemas.microsoft.com/office/drawing/2010/main" xmlns:m="http://schemas.openxmlformats.org/officeDocument/2006/math" xmlns="" val="1"/>
               </a:ext>
             </a:extLst>
           </p:spPr>
@@ -21965,7 +22093,7 @@
           </a:ln>
           <a:extLst>
             <a:ext uri="{C572A759-6A51-4108-AA02-DFA0A04FC94B}">
-              <ma14:wrappingTextBoxFlag xmlns="" xmlns:m="http://schemas.openxmlformats.org/officeDocument/2006/math" xmlns:a14="http://schemas.microsoft.com/office/drawing/2010/main" xmlns:ma14="http://schemas.microsoft.com/office/mac/drawingml/2011/main" val="1"/>
+              <ma14:wrappingTextBoxFlag xmlns:ma14="http://schemas.microsoft.com/office/mac/drawingml/2011/main" xmlns:a14="http://schemas.microsoft.com/office/drawing/2010/main" xmlns:m="http://schemas.openxmlformats.org/officeDocument/2006/math" xmlns="" val="1"/>
             </a:ext>
           </a:extLst>
         </p:spPr>
@@ -22004,7 +22132,7 @@
           </a:ln>
           <a:extLst>
             <a:ext uri="{C572A759-6A51-4108-AA02-DFA0A04FC94B}">
-              <ma14:wrappingTextBoxFlag xmlns="" xmlns:m="http://schemas.openxmlformats.org/officeDocument/2006/math" xmlns:a14="http://schemas.microsoft.com/office/drawing/2010/main" xmlns:ma14="http://schemas.microsoft.com/office/mac/drawingml/2011/main" val="1"/>
+              <ma14:wrappingTextBoxFlag xmlns:ma14="http://schemas.microsoft.com/office/mac/drawingml/2011/main" xmlns:a14="http://schemas.microsoft.com/office/drawing/2010/main" xmlns:m="http://schemas.openxmlformats.org/officeDocument/2006/math" xmlns="" val="1"/>
             </a:ext>
           </a:extLst>
         </p:spPr>
@@ -22166,7 +22294,7 @@
           </a:prstGeom>
           <a:extLst>
             <a:ext uri="{C572A759-6A51-4108-AA02-DFA0A04FC94B}">
-              <ma14:wrappingTextBoxFlag xmlns="" xmlns:m="http://schemas.openxmlformats.org/officeDocument/2006/math" xmlns:a14="http://schemas.microsoft.com/office/drawing/2010/main" xmlns:ma14="http://schemas.microsoft.com/office/mac/drawingml/2011/main" val="1"/>
+              <ma14:wrappingTextBoxFlag xmlns:ma14="http://schemas.microsoft.com/office/mac/drawingml/2011/main" xmlns:a14="http://schemas.microsoft.com/office/drawing/2010/main" xmlns:m="http://schemas.openxmlformats.org/officeDocument/2006/math" xmlns="" val="1"/>
             </a:ext>
           </a:extLst>
         </p:spPr>
@@ -22291,7 +22419,7 @@
             <a:effectLst/>
             <a:extLst>
               <a:ext uri="{C572A759-6A51-4108-AA02-DFA0A04FC94B}">
-                <ma14:wrappingTextBoxFlag xmlns="" xmlns:m="http://schemas.openxmlformats.org/officeDocument/2006/math" xmlns:a14="http://schemas.microsoft.com/office/drawing/2010/main" xmlns:ma14="http://schemas.microsoft.com/office/mac/drawingml/2011/main" val="1"/>
+                <ma14:wrappingTextBoxFlag xmlns:ma14="http://schemas.microsoft.com/office/mac/drawingml/2011/main" xmlns:a14="http://schemas.microsoft.com/office/drawing/2010/main" xmlns:m="http://schemas.openxmlformats.org/officeDocument/2006/math" xmlns="" val="1"/>
               </a:ext>
             </a:extLst>
           </p:spPr>
@@ -22503,7 +22631,7 @@
           </a:ln>
           <a:extLst>
             <a:ext uri="{C572A759-6A51-4108-AA02-DFA0A04FC94B}">
-              <ma14:wrappingTextBoxFlag xmlns="" xmlns:m="http://schemas.openxmlformats.org/officeDocument/2006/math" xmlns:a14="http://schemas.microsoft.com/office/drawing/2010/main" xmlns:ma14="http://schemas.microsoft.com/office/mac/drawingml/2011/main" val="1"/>
+              <ma14:wrappingTextBoxFlag xmlns:ma14="http://schemas.microsoft.com/office/mac/drawingml/2011/main" xmlns:a14="http://schemas.microsoft.com/office/drawing/2010/main" xmlns:m="http://schemas.openxmlformats.org/officeDocument/2006/math" xmlns="" val="1"/>
             </a:ext>
           </a:extLst>
         </p:spPr>
@@ -22542,7 +22670,7 @@
           </a:ln>
           <a:extLst>
             <a:ext uri="{C572A759-6A51-4108-AA02-DFA0A04FC94B}">
-              <ma14:wrappingTextBoxFlag xmlns="" xmlns:m="http://schemas.openxmlformats.org/officeDocument/2006/math" xmlns:a14="http://schemas.microsoft.com/office/drawing/2010/main" xmlns:ma14="http://schemas.microsoft.com/office/mac/drawingml/2011/main" val="1"/>
+              <ma14:wrappingTextBoxFlag xmlns:ma14="http://schemas.microsoft.com/office/mac/drawingml/2011/main" xmlns:a14="http://schemas.microsoft.com/office/drawing/2010/main" xmlns:m="http://schemas.openxmlformats.org/officeDocument/2006/math" xmlns="" val="1"/>
             </a:ext>
           </a:extLst>
         </p:spPr>
@@ -22708,7 +22836,7 @@
             <a:effectLst/>
             <a:extLst>
               <a:ext uri="{C572A759-6A51-4108-AA02-DFA0A04FC94B}">
-                <ma14:wrappingTextBoxFlag xmlns="" xmlns:m="http://schemas.openxmlformats.org/officeDocument/2006/math" xmlns:a14="http://schemas.microsoft.com/office/drawing/2010/main" xmlns:ma14="http://schemas.microsoft.com/office/mac/drawingml/2011/main" val="1"/>
+                <ma14:wrappingTextBoxFlag xmlns:ma14="http://schemas.microsoft.com/office/mac/drawingml/2011/main" xmlns:a14="http://schemas.microsoft.com/office/drawing/2010/main" xmlns:m="http://schemas.openxmlformats.org/officeDocument/2006/math" xmlns="" val="1"/>
               </a:ext>
             </a:extLst>
           </p:spPr>
@@ -22787,7 +22915,7 @@
           </a:ln>
           <a:extLst>
             <a:ext uri="{C572A759-6A51-4108-AA02-DFA0A04FC94B}">
-              <ma14:wrappingTextBoxFlag xmlns="" xmlns:m="http://schemas.openxmlformats.org/officeDocument/2006/math" xmlns:a14="http://schemas.microsoft.com/office/drawing/2010/main" xmlns:ma14="http://schemas.microsoft.com/office/mac/drawingml/2011/main" val="1"/>
+              <ma14:wrappingTextBoxFlag xmlns:ma14="http://schemas.microsoft.com/office/mac/drawingml/2011/main" xmlns:a14="http://schemas.microsoft.com/office/drawing/2010/main" xmlns:m="http://schemas.openxmlformats.org/officeDocument/2006/math" xmlns="" val="1"/>
             </a:ext>
           </a:extLst>
         </p:spPr>
@@ -22823,7 +22951,7 @@
           </a:prstGeom>
           <a:extLst>
             <a:ext uri="{C572A759-6A51-4108-AA02-DFA0A04FC94B}">
-              <ma14:wrappingTextBoxFlag xmlns="" xmlns:m="http://schemas.openxmlformats.org/officeDocument/2006/math" xmlns:a14="http://schemas.microsoft.com/office/drawing/2010/main" xmlns:ma14="http://schemas.microsoft.com/office/mac/drawingml/2011/main" val="1"/>
+              <ma14:wrappingTextBoxFlag xmlns:ma14="http://schemas.microsoft.com/office/mac/drawingml/2011/main" xmlns:a14="http://schemas.microsoft.com/office/drawing/2010/main" xmlns:m="http://schemas.openxmlformats.org/officeDocument/2006/math" xmlns="" val="1"/>
             </a:ext>
           </a:extLst>
         </p:spPr>
@@ -22861,7 +22989,7 @@
           </a:ln>
           <a:extLst>
             <a:ext uri="{C572A759-6A51-4108-AA02-DFA0A04FC94B}">
-              <ma14:wrappingTextBoxFlag xmlns="" xmlns:m="http://schemas.openxmlformats.org/officeDocument/2006/math" xmlns:a14="http://schemas.microsoft.com/office/drawing/2010/main" xmlns:ma14="http://schemas.microsoft.com/office/mac/drawingml/2011/main" val="1"/>
+              <ma14:wrappingTextBoxFlag xmlns:ma14="http://schemas.microsoft.com/office/mac/drawingml/2011/main" xmlns:a14="http://schemas.microsoft.com/office/drawing/2010/main" xmlns:m="http://schemas.openxmlformats.org/officeDocument/2006/math" xmlns="" val="1"/>
             </a:ext>
           </a:extLst>
         </p:spPr>
@@ -22902,7 +23030,7 @@
               </a:ln>
               <a:extLst>
                 <a:ext uri="{C572A759-6A51-4108-AA02-DFA0A04FC94B}">
-                  <ma14:wrappingTextBoxFlag xmlns="" xmlns:m="http://schemas.openxmlformats.org/officeDocument/2006/math" xmlns:ma14="http://schemas.microsoft.com/office/mac/drawingml/2011/main" val="1"/>
+                  <ma14:wrappingTextBoxFlag xmlns:ma14="http://schemas.microsoft.com/office/mac/drawingml/2011/main" xmlns:m="http://schemas.openxmlformats.org/officeDocument/2006/math" xmlns="" val="1"/>
                 </a:ext>
               </a:extLst>
             </p:spPr>
@@ -23277,7 +23405,7 @@
               </a:ln>
               <a:extLst>
                 <a:ext uri="{C572A759-6A51-4108-AA02-DFA0A04FC94B}">
-                  <ma14:wrappingTextBoxFlag xmlns="" xmlns:m="http://schemas.openxmlformats.org/officeDocument/2006/math" xmlns:ma14="http://schemas.microsoft.com/office/mac/drawingml/2011/main" val="1"/>
+                  <ma14:wrappingTextBoxFlag xmlns:ma14="http://schemas.microsoft.com/office/mac/drawingml/2011/main" xmlns:m="http://schemas.openxmlformats.org/officeDocument/2006/math" xmlns="" val="1"/>
                 </a:ext>
               </a:extLst>
             </p:spPr>
@@ -23569,7 +23697,7 @@
           </a:ln>
           <a:extLst>
             <a:ext uri="{C572A759-6A51-4108-AA02-DFA0A04FC94B}">
-              <ma14:wrappingTextBoxFlag xmlns="" xmlns:m="http://schemas.openxmlformats.org/officeDocument/2006/math" xmlns:a14="http://schemas.microsoft.com/office/drawing/2010/main" xmlns:ma14="http://schemas.microsoft.com/office/mac/drawingml/2011/main" val="1"/>
+              <ma14:wrappingTextBoxFlag xmlns:ma14="http://schemas.microsoft.com/office/mac/drawingml/2011/main" xmlns:a14="http://schemas.microsoft.com/office/drawing/2010/main" xmlns:m="http://schemas.openxmlformats.org/officeDocument/2006/math" xmlns="" val="1"/>
             </a:ext>
           </a:extLst>
         </p:spPr>
@@ -23610,7 +23738,7 @@
               </a:ln>
               <a:extLst>
                 <a:ext uri="{C572A759-6A51-4108-AA02-DFA0A04FC94B}">
-                  <ma14:wrappingTextBoxFlag xmlns="" xmlns:m="http://schemas.openxmlformats.org/officeDocument/2006/math" xmlns:ma14="http://schemas.microsoft.com/office/mac/drawingml/2011/main" val="1"/>
+                  <ma14:wrappingTextBoxFlag xmlns:ma14="http://schemas.microsoft.com/office/mac/drawingml/2011/main" xmlns:m="http://schemas.openxmlformats.org/officeDocument/2006/math" xmlns="" val="1"/>
                 </a:ext>
               </a:extLst>
             </p:spPr>
@@ -23855,7 +23983,7 @@
               </a:ln>
               <a:extLst>
                 <a:ext uri="{C572A759-6A51-4108-AA02-DFA0A04FC94B}">
-                  <ma14:wrappingTextBoxFlag xmlns="" xmlns:m="http://schemas.openxmlformats.org/officeDocument/2006/math" xmlns:ma14="http://schemas.microsoft.com/office/mac/drawingml/2011/main" val="1"/>
+                  <ma14:wrappingTextBoxFlag xmlns:ma14="http://schemas.microsoft.com/office/mac/drawingml/2011/main" xmlns:m="http://schemas.openxmlformats.org/officeDocument/2006/math" xmlns="" val="1"/>
                 </a:ext>
               </a:extLst>
             </p:spPr>
@@ -24379,7 +24507,7 @@
           </a:ln>
           <a:extLst>
             <a:ext uri="{C572A759-6A51-4108-AA02-DFA0A04FC94B}">
-              <ma14:wrappingTextBoxFlag xmlns:ma14="http://schemas.microsoft.com/office/mac/drawingml/2011/main" xmlns:a14="http://schemas.microsoft.com/office/drawing/2010/main" xmlns:m="http://schemas.openxmlformats.org/officeDocument/2006/math" xmlns="" val="1"/>
+              <ma14:wrappingTextBoxFlag xmlns="" xmlns:m="http://schemas.openxmlformats.org/officeDocument/2006/math" xmlns:a14="http://schemas.microsoft.com/office/drawing/2010/main" xmlns:ma14="http://schemas.microsoft.com/office/mac/drawingml/2011/main" val="1"/>
             </a:ext>
           </a:extLst>
         </p:spPr>
@@ -24424,7 +24552,7 @@
           </a:prstGeom>
           <a:extLst>
             <a:ext uri="{C572A759-6A51-4108-AA02-DFA0A04FC94B}">
-              <ma14:wrappingTextBoxFlag xmlns:ma14="http://schemas.microsoft.com/office/mac/drawingml/2011/main" xmlns:a14="http://schemas.microsoft.com/office/drawing/2010/main" xmlns:m="http://schemas.openxmlformats.org/officeDocument/2006/math" xmlns="" val="1"/>
+              <ma14:wrappingTextBoxFlag xmlns="" xmlns:m="http://schemas.openxmlformats.org/officeDocument/2006/math" xmlns:a14="http://schemas.microsoft.com/office/drawing/2010/main" xmlns:ma14="http://schemas.microsoft.com/office/mac/drawingml/2011/main" val="1"/>
             </a:ext>
           </a:extLst>
         </p:spPr>
@@ -24462,7 +24590,7 @@
           </a:ln>
           <a:extLst>
             <a:ext uri="{C572A759-6A51-4108-AA02-DFA0A04FC94B}">
-              <ma14:wrappingTextBoxFlag xmlns:ma14="http://schemas.microsoft.com/office/mac/drawingml/2011/main" xmlns:a14="http://schemas.microsoft.com/office/drawing/2010/main" xmlns:m="http://schemas.openxmlformats.org/officeDocument/2006/math" xmlns="" val="1"/>
+              <ma14:wrappingTextBoxFlag xmlns="" xmlns:m="http://schemas.openxmlformats.org/officeDocument/2006/math" xmlns:a14="http://schemas.microsoft.com/office/drawing/2010/main" xmlns:ma14="http://schemas.microsoft.com/office/mac/drawingml/2011/main" val="1"/>
             </a:ext>
           </a:extLst>
         </p:spPr>
@@ -24570,7 +24698,7 @@
           </a:ln>
           <a:extLst>
             <a:ext uri="{C572A759-6A51-4108-AA02-DFA0A04FC94B}">
-              <ma14:wrappingTextBoxFlag xmlns:ma14="http://schemas.microsoft.com/office/mac/drawingml/2011/main" xmlns:a14="http://schemas.microsoft.com/office/drawing/2010/main" xmlns:m="http://schemas.openxmlformats.org/officeDocument/2006/math" xmlns="" val="1"/>
+              <ma14:wrappingTextBoxFlag xmlns="" xmlns:m="http://schemas.openxmlformats.org/officeDocument/2006/math" xmlns:a14="http://schemas.microsoft.com/office/drawing/2010/main" xmlns:ma14="http://schemas.microsoft.com/office/mac/drawingml/2011/main" val="1"/>
             </a:ext>
           </a:extLst>
         </p:spPr>
@@ -24615,7 +24743,7 @@
           </a:prstGeom>
           <a:extLst>
             <a:ext uri="{C572A759-6A51-4108-AA02-DFA0A04FC94B}">
-              <ma14:wrappingTextBoxFlag xmlns:ma14="http://schemas.microsoft.com/office/mac/drawingml/2011/main" xmlns:a14="http://schemas.microsoft.com/office/drawing/2010/main" xmlns:m="http://schemas.openxmlformats.org/officeDocument/2006/math" xmlns="" val="1"/>
+              <ma14:wrappingTextBoxFlag xmlns="" xmlns:m="http://schemas.openxmlformats.org/officeDocument/2006/math" xmlns:a14="http://schemas.microsoft.com/office/drawing/2010/main" xmlns:ma14="http://schemas.microsoft.com/office/mac/drawingml/2011/main" val="1"/>
             </a:ext>
           </a:extLst>
         </p:spPr>
@@ -24878,7 +25006,7 @@
           </a:ln>
           <a:extLst>
             <a:ext uri="{C572A759-6A51-4108-AA02-DFA0A04FC94B}">
-              <ma14:wrappingTextBoxFlag xmlns="" xmlns:m="http://schemas.openxmlformats.org/officeDocument/2006/math" xmlns:a14="http://schemas.microsoft.com/office/drawing/2010/main" xmlns:ma14="http://schemas.microsoft.com/office/mac/drawingml/2011/main" val="1"/>
+              <ma14:wrappingTextBoxFlag xmlns:ma14="http://schemas.microsoft.com/office/mac/drawingml/2011/main" xmlns:a14="http://schemas.microsoft.com/office/drawing/2010/main" xmlns:m="http://schemas.openxmlformats.org/officeDocument/2006/math" xmlns="" val="1"/>
             </a:ext>
           </a:extLst>
         </p:spPr>
@@ -24923,7 +25051,7 @@
           </a:prstGeom>
           <a:extLst>
             <a:ext uri="{C572A759-6A51-4108-AA02-DFA0A04FC94B}">
-              <ma14:wrappingTextBoxFlag xmlns="" xmlns:m="http://schemas.openxmlformats.org/officeDocument/2006/math" xmlns:a14="http://schemas.microsoft.com/office/drawing/2010/main" xmlns:ma14="http://schemas.microsoft.com/office/mac/drawingml/2011/main" val="1"/>
+              <ma14:wrappingTextBoxFlag xmlns:ma14="http://schemas.microsoft.com/office/mac/drawingml/2011/main" xmlns:a14="http://schemas.microsoft.com/office/drawing/2010/main" xmlns:m="http://schemas.openxmlformats.org/officeDocument/2006/math" xmlns="" val="1"/>
             </a:ext>
           </a:extLst>
         </p:spPr>
@@ -25285,7 +25413,7 @@
           </a:ln>
           <a:extLst>
             <a:ext uri="{C572A759-6A51-4108-AA02-DFA0A04FC94B}">
-              <ma14:wrappingTextBoxFlag xmlns:ma14="http://schemas.microsoft.com/office/mac/drawingml/2011/main" xmlns:a14="http://schemas.microsoft.com/office/drawing/2010/main" xmlns:m="http://schemas.openxmlformats.org/officeDocument/2006/math" xmlns="" val="1"/>
+              <ma14:wrappingTextBoxFlag xmlns="" xmlns:m="http://schemas.openxmlformats.org/officeDocument/2006/math" xmlns:a14="http://schemas.microsoft.com/office/drawing/2010/main" xmlns:ma14="http://schemas.microsoft.com/office/mac/drawingml/2011/main" val="1"/>
             </a:ext>
           </a:extLst>
         </p:spPr>
@@ -25330,7 +25458,7 @@
           </a:prstGeom>
           <a:extLst>
             <a:ext uri="{C572A759-6A51-4108-AA02-DFA0A04FC94B}">
-              <ma14:wrappingTextBoxFlag xmlns:ma14="http://schemas.microsoft.com/office/mac/drawingml/2011/main" xmlns:a14="http://schemas.microsoft.com/office/drawing/2010/main" xmlns:m="http://schemas.openxmlformats.org/officeDocument/2006/math" xmlns="" val="1"/>
+              <ma14:wrappingTextBoxFlag xmlns="" xmlns:m="http://schemas.openxmlformats.org/officeDocument/2006/math" xmlns:a14="http://schemas.microsoft.com/office/drawing/2010/main" xmlns:ma14="http://schemas.microsoft.com/office/mac/drawingml/2011/main" val="1"/>
             </a:ext>
           </a:extLst>
         </p:spPr>
@@ -25722,7 +25850,7 @@
           </a:ln>
           <a:extLst>
             <a:ext uri="{C572A759-6A51-4108-AA02-DFA0A04FC94B}">
-              <ma14:wrappingTextBoxFlag xmlns="" xmlns:m="http://schemas.openxmlformats.org/officeDocument/2006/math" xmlns:a14="http://schemas.microsoft.com/office/drawing/2010/main" xmlns:ma14="http://schemas.microsoft.com/office/mac/drawingml/2011/main" val="1"/>
+              <ma14:wrappingTextBoxFlag xmlns:ma14="http://schemas.microsoft.com/office/mac/drawingml/2011/main" xmlns:a14="http://schemas.microsoft.com/office/drawing/2010/main" xmlns:m="http://schemas.openxmlformats.org/officeDocument/2006/math" xmlns="" val="1"/>
             </a:ext>
           </a:extLst>
         </p:spPr>
@@ -25758,7 +25886,7 @@
           </a:prstGeom>
           <a:extLst>
             <a:ext uri="{C572A759-6A51-4108-AA02-DFA0A04FC94B}">
-              <ma14:wrappingTextBoxFlag xmlns="" xmlns:m="http://schemas.openxmlformats.org/officeDocument/2006/math" xmlns:a14="http://schemas.microsoft.com/office/drawing/2010/main" xmlns:ma14="http://schemas.microsoft.com/office/mac/drawingml/2011/main" val="1"/>
+              <ma14:wrappingTextBoxFlag xmlns:ma14="http://schemas.microsoft.com/office/mac/drawingml/2011/main" xmlns:a14="http://schemas.microsoft.com/office/drawing/2010/main" xmlns:m="http://schemas.openxmlformats.org/officeDocument/2006/math" xmlns="" val="1"/>
             </a:ext>
           </a:extLst>
         </p:spPr>
@@ -25796,7 +25924,7 @@
           </a:ln>
           <a:extLst>
             <a:ext uri="{C572A759-6A51-4108-AA02-DFA0A04FC94B}">
-              <ma14:wrappingTextBoxFlag xmlns="" xmlns:m="http://schemas.openxmlformats.org/officeDocument/2006/math" xmlns:a14="http://schemas.microsoft.com/office/drawing/2010/main" xmlns:ma14="http://schemas.microsoft.com/office/mac/drawingml/2011/main" val="1"/>
+              <ma14:wrappingTextBoxFlag xmlns:ma14="http://schemas.microsoft.com/office/mac/drawingml/2011/main" xmlns:a14="http://schemas.microsoft.com/office/drawing/2010/main" xmlns:m="http://schemas.openxmlformats.org/officeDocument/2006/math" xmlns="" val="1"/>
             </a:ext>
           </a:extLst>
         </p:spPr>
@@ -25936,7 +26064,7 @@
           </a:ln>
           <a:extLst>
             <a:ext uri="{C572A759-6A51-4108-AA02-DFA0A04FC94B}">
-              <ma14:wrappingTextBoxFlag xmlns="" xmlns:m="http://schemas.openxmlformats.org/officeDocument/2006/math" xmlns:a14="http://schemas.microsoft.com/office/drawing/2010/main" xmlns:ma14="http://schemas.microsoft.com/office/mac/drawingml/2011/main" val="1"/>
+              <ma14:wrappingTextBoxFlag xmlns:ma14="http://schemas.microsoft.com/office/mac/drawingml/2011/main" xmlns:a14="http://schemas.microsoft.com/office/drawing/2010/main" xmlns:m="http://schemas.openxmlformats.org/officeDocument/2006/math" xmlns="" val="1"/>
             </a:ext>
           </a:extLst>
         </p:spPr>
@@ -26231,7 +26359,7 @@
           </a:ln>
           <a:extLst>
             <a:ext uri="{C572A759-6A51-4108-AA02-DFA0A04FC94B}">
-              <ma14:wrappingTextBoxFlag xmlns="" xmlns:m="http://schemas.openxmlformats.org/officeDocument/2006/math" xmlns:a14="http://schemas.microsoft.com/office/drawing/2010/main" xmlns:ma14="http://schemas.microsoft.com/office/mac/drawingml/2011/main" val="1"/>
+              <ma14:wrappingTextBoxFlag xmlns:ma14="http://schemas.microsoft.com/office/mac/drawingml/2011/main" xmlns:a14="http://schemas.microsoft.com/office/drawing/2010/main" xmlns:m="http://schemas.openxmlformats.org/officeDocument/2006/math" xmlns="" val="1"/>
             </a:ext>
           </a:extLst>
         </p:spPr>
@@ -26395,7 +26523,7 @@
           </a:ln>
           <a:extLst>
             <a:ext uri="{C572A759-6A51-4108-AA02-DFA0A04FC94B}">
-              <ma14:wrappingTextBoxFlag xmlns="" xmlns:m="http://schemas.openxmlformats.org/officeDocument/2006/math" xmlns:a14="http://schemas.microsoft.com/office/drawing/2010/main" xmlns:ma14="http://schemas.microsoft.com/office/mac/drawingml/2011/main" val="1"/>
+              <ma14:wrappingTextBoxFlag xmlns:ma14="http://schemas.microsoft.com/office/mac/drawingml/2011/main" xmlns:a14="http://schemas.microsoft.com/office/drawing/2010/main" xmlns:m="http://schemas.openxmlformats.org/officeDocument/2006/math" xmlns="" val="1"/>
             </a:ext>
           </a:extLst>
         </p:spPr>
@@ -26440,7 +26568,7 @@
           </a:prstGeom>
           <a:extLst>
             <a:ext uri="{C572A759-6A51-4108-AA02-DFA0A04FC94B}">
-              <ma14:wrappingTextBoxFlag xmlns="" xmlns:m="http://schemas.openxmlformats.org/officeDocument/2006/math" xmlns:a14="http://schemas.microsoft.com/office/drawing/2010/main" xmlns:ma14="http://schemas.microsoft.com/office/mac/drawingml/2011/main" val="1"/>
+              <ma14:wrappingTextBoxFlag xmlns:ma14="http://schemas.microsoft.com/office/mac/drawingml/2011/main" xmlns:a14="http://schemas.microsoft.com/office/drawing/2010/main" xmlns:m="http://schemas.openxmlformats.org/officeDocument/2006/math" xmlns="" val="1"/>
             </a:ext>
           </a:extLst>
         </p:spPr>
@@ -26996,7 +27124,7 @@
           </a:ln>
           <a:extLst>
             <a:ext uri="{C572A759-6A51-4108-AA02-DFA0A04FC94B}">
-              <ma14:wrappingTextBoxFlag xmlns="" xmlns:m="http://schemas.openxmlformats.org/officeDocument/2006/math" xmlns:a14="http://schemas.microsoft.com/office/drawing/2010/main" xmlns:ma14="http://schemas.microsoft.com/office/mac/drawingml/2011/main" val="1"/>
+              <ma14:wrappingTextBoxFlag xmlns:ma14="http://schemas.microsoft.com/office/mac/drawingml/2011/main" xmlns:a14="http://schemas.microsoft.com/office/drawing/2010/main" xmlns:m="http://schemas.openxmlformats.org/officeDocument/2006/math" xmlns="" val="1"/>
             </a:ext>
           </a:extLst>
         </p:spPr>
@@ -27041,7 +27169,7 @@
           </a:prstGeom>
           <a:extLst>
             <a:ext uri="{C572A759-6A51-4108-AA02-DFA0A04FC94B}">
-              <ma14:wrappingTextBoxFlag xmlns="" xmlns:m="http://schemas.openxmlformats.org/officeDocument/2006/math" xmlns:a14="http://schemas.microsoft.com/office/drawing/2010/main" xmlns:ma14="http://schemas.microsoft.com/office/mac/drawingml/2011/main" val="1"/>
+              <ma14:wrappingTextBoxFlag xmlns:ma14="http://schemas.microsoft.com/office/mac/drawingml/2011/main" xmlns:a14="http://schemas.microsoft.com/office/drawing/2010/main" xmlns:m="http://schemas.openxmlformats.org/officeDocument/2006/math" xmlns="" val="1"/>
             </a:ext>
           </a:extLst>
         </p:spPr>
@@ -27239,7 +27367,7 @@
           </a:ln>
           <a:extLst>
             <a:ext uri="{C572A759-6A51-4108-AA02-DFA0A04FC94B}">
-              <ma14:wrappingTextBoxFlag xmlns="" xmlns:m="http://schemas.openxmlformats.org/officeDocument/2006/math" xmlns:a14="http://schemas.microsoft.com/office/drawing/2010/main" xmlns:ma14="http://schemas.microsoft.com/office/mac/drawingml/2011/main" val="1"/>
+              <ma14:wrappingTextBoxFlag xmlns:ma14="http://schemas.microsoft.com/office/mac/drawingml/2011/main" xmlns:a14="http://schemas.microsoft.com/office/drawing/2010/main" xmlns:m="http://schemas.openxmlformats.org/officeDocument/2006/math" xmlns="" val="1"/>
             </a:ext>
           </a:extLst>
         </p:spPr>
@@ -27284,7 +27412,7 @@
           </a:prstGeom>
           <a:extLst>
             <a:ext uri="{C572A759-6A51-4108-AA02-DFA0A04FC94B}">
-              <ma14:wrappingTextBoxFlag xmlns="" xmlns:m="http://schemas.openxmlformats.org/officeDocument/2006/math" xmlns:a14="http://schemas.microsoft.com/office/drawing/2010/main" xmlns:ma14="http://schemas.microsoft.com/office/mac/drawingml/2011/main" val="1"/>
+              <ma14:wrappingTextBoxFlag xmlns:ma14="http://schemas.microsoft.com/office/mac/drawingml/2011/main" xmlns:a14="http://schemas.microsoft.com/office/drawing/2010/main" xmlns:m="http://schemas.openxmlformats.org/officeDocument/2006/math" xmlns="" val="1"/>
             </a:ext>
           </a:extLst>
         </p:spPr>
@@ -27715,7 +27843,7 @@
           </a:ln>
           <a:extLst>
             <a:ext uri="{C572A759-6A51-4108-AA02-DFA0A04FC94B}">
-              <ma14:wrappingTextBoxFlag xmlns:ma14="http://schemas.microsoft.com/office/mac/drawingml/2011/main" xmlns:a14="http://schemas.microsoft.com/office/drawing/2010/main" xmlns:m="http://schemas.openxmlformats.org/officeDocument/2006/math" xmlns="" val="1"/>
+              <ma14:wrappingTextBoxFlag xmlns="" xmlns:m="http://schemas.openxmlformats.org/officeDocument/2006/math" xmlns:a14="http://schemas.microsoft.com/office/drawing/2010/main" xmlns:ma14="http://schemas.microsoft.com/office/mac/drawingml/2011/main" val="1"/>
             </a:ext>
           </a:extLst>
         </p:spPr>
@@ -27872,7 +28000,7 @@
           </a:prstGeom>
           <a:extLst>
             <a:ext uri="{C572A759-6A51-4108-AA02-DFA0A04FC94B}">
-              <ma14:wrappingTextBoxFlag xmlns:ma14="http://schemas.microsoft.com/office/mac/drawingml/2011/main" xmlns:a14="http://schemas.microsoft.com/office/drawing/2010/main" xmlns:m="http://schemas.openxmlformats.org/officeDocument/2006/math" xmlns="" val="1"/>
+              <ma14:wrappingTextBoxFlag xmlns="" xmlns:m="http://schemas.openxmlformats.org/officeDocument/2006/math" xmlns:a14="http://schemas.microsoft.com/office/drawing/2010/main" xmlns:ma14="http://schemas.microsoft.com/office/mac/drawingml/2011/main" val="1"/>
             </a:ext>
           </a:extLst>
         </p:spPr>
@@ -28333,7 +28461,7 @@
           </a:ln>
           <a:extLst>
             <a:ext uri="{C572A759-6A51-4108-AA02-DFA0A04FC94B}">
-              <ma14:wrappingTextBoxFlag xmlns="" xmlns:m="http://schemas.openxmlformats.org/officeDocument/2006/math" xmlns:a14="http://schemas.microsoft.com/office/drawing/2010/main" xmlns:ma14="http://schemas.microsoft.com/office/mac/drawingml/2011/main" val="1"/>
+              <ma14:wrappingTextBoxFlag xmlns:ma14="http://schemas.microsoft.com/office/mac/drawingml/2011/main" xmlns:a14="http://schemas.microsoft.com/office/drawing/2010/main" xmlns:m="http://schemas.openxmlformats.org/officeDocument/2006/math" xmlns="" val="1"/>
             </a:ext>
           </a:extLst>
         </p:spPr>
@@ -28369,7 +28497,7 @@
           </a:prstGeom>
           <a:extLst>
             <a:ext uri="{C572A759-6A51-4108-AA02-DFA0A04FC94B}">
-              <ma14:wrappingTextBoxFlag xmlns="" xmlns:m="http://schemas.openxmlformats.org/officeDocument/2006/math" xmlns:a14="http://schemas.microsoft.com/office/drawing/2010/main" xmlns:ma14="http://schemas.microsoft.com/office/mac/drawingml/2011/main" val="1"/>
+              <ma14:wrappingTextBoxFlag xmlns:ma14="http://schemas.microsoft.com/office/mac/drawingml/2011/main" xmlns:a14="http://schemas.microsoft.com/office/drawing/2010/main" xmlns:m="http://schemas.openxmlformats.org/officeDocument/2006/math" xmlns="" val="1"/>
             </a:ext>
           </a:extLst>
         </p:spPr>
@@ -28407,7 +28535,7 @@
           </a:ln>
           <a:extLst>
             <a:ext uri="{C572A759-6A51-4108-AA02-DFA0A04FC94B}">
-              <ma14:wrappingTextBoxFlag xmlns="" xmlns:m="http://schemas.openxmlformats.org/officeDocument/2006/math" xmlns:a14="http://schemas.microsoft.com/office/drawing/2010/main" xmlns:ma14="http://schemas.microsoft.com/office/mac/drawingml/2011/main" val="1"/>
+              <ma14:wrappingTextBoxFlag xmlns:ma14="http://schemas.microsoft.com/office/mac/drawingml/2011/main" xmlns:a14="http://schemas.microsoft.com/office/drawing/2010/main" xmlns:m="http://schemas.openxmlformats.org/officeDocument/2006/math" xmlns="" val="1"/>
             </a:ext>
           </a:extLst>
         </p:spPr>
@@ -28497,7 +28625,7 @@
           </a:ln>
           <a:extLst>
             <a:ext uri="{C572A759-6A51-4108-AA02-DFA0A04FC94B}">
-              <ma14:wrappingTextBoxFlag xmlns="" xmlns:m="http://schemas.openxmlformats.org/officeDocument/2006/math" xmlns:a14="http://schemas.microsoft.com/office/drawing/2010/main" xmlns:ma14="http://schemas.microsoft.com/office/mac/drawingml/2011/main" val="1"/>
+              <ma14:wrappingTextBoxFlag xmlns:ma14="http://schemas.microsoft.com/office/mac/drawingml/2011/main" xmlns:a14="http://schemas.microsoft.com/office/drawing/2010/main" xmlns:m="http://schemas.openxmlformats.org/officeDocument/2006/math" xmlns="" val="1"/>
             </a:ext>
           </a:extLst>
         </p:spPr>
@@ -28533,7 +28661,7 @@
           </a:prstGeom>
           <a:extLst>
             <a:ext uri="{C572A759-6A51-4108-AA02-DFA0A04FC94B}">
-              <ma14:wrappingTextBoxFlag xmlns="" xmlns:m="http://schemas.openxmlformats.org/officeDocument/2006/math" xmlns:a14="http://schemas.microsoft.com/office/drawing/2010/main" xmlns:ma14="http://schemas.microsoft.com/office/mac/drawingml/2011/main" val="1"/>
+              <ma14:wrappingTextBoxFlag xmlns:ma14="http://schemas.microsoft.com/office/mac/drawingml/2011/main" xmlns:a14="http://schemas.microsoft.com/office/drawing/2010/main" xmlns:m="http://schemas.openxmlformats.org/officeDocument/2006/math" xmlns="" val="1"/>
             </a:ext>
           </a:extLst>
         </p:spPr>
@@ -28571,7 +28699,7 @@
           </a:ln>
           <a:extLst>
             <a:ext uri="{C572A759-6A51-4108-AA02-DFA0A04FC94B}">
-              <ma14:wrappingTextBoxFlag xmlns="" xmlns:m="http://schemas.openxmlformats.org/officeDocument/2006/math" xmlns:a14="http://schemas.microsoft.com/office/drawing/2010/main" xmlns:ma14="http://schemas.microsoft.com/office/mac/drawingml/2011/main" val="1"/>
+              <ma14:wrappingTextBoxFlag xmlns:ma14="http://schemas.microsoft.com/office/mac/drawingml/2011/main" xmlns:a14="http://schemas.microsoft.com/office/drawing/2010/main" xmlns:m="http://schemas.openxmlformats.org/officeDocument/2006/math" xmlns="" val="1"/>
             </a:ext>
           </a:extLst>
         </p:spPr>
@@ -28662,7 +28790,7 @@
           </a:ln>
           <a:extLst>
             <a:ext uri="{C572A759-6A51-4108-AA02-DFA0A04FC94B}">
-              <ma14:wrappingTextBoxFlag xmlns="" xmlns:m="http://schemas.openxmlformats.org/officeDocument/2006/math" xmlns:a14="http://schemas.microsoft.com/office/drawing/2010/main" xmlns:ma14="http://schemas.microsoft.com/office/mac/drawingml/2011/main" val="1"/>
+              <ma14:wrappingTextBoxFlag xmlns:ma14="http://schemas.microsoft.com/office/mac/drawingml/2011/main" xmlns:a14="http://schemas.microsoft.com/office/drawing/2010/main" xmlns:m="http://schemas.openxmlformats.org/officeDocument/2006/math" xmlns="" val="1"/>
             </a:ext>
           </a:extLst>
         </p:spPr>
@@ -28731,7 +28859,7 @@
           </a:ln>
           <a:extLst>
             <a:ext uri="{C572A759-6A51-4108-AA02-DFA0A04FC94B}">
-              <ma14:wrappingTextBoxFlag xmlns="" xmlns:m="http://schemas.openxmlformats.org/officeDocument/2006/math" xmlns:a14="http://schemas.microsoft.com/office/drawing/2010/main" xmlns:ma14="http://schemas.microsoft.com/office/mac/drawingml/2011/main" val="1"/>
+              <ma14:wrappingTextBoxFlag xmlns:ma14="http://schemas.microsoft.com/office/mac/drawingml/2011/main" xmlns:a14="http://schemas.microsoft.com/office/drawing/2010/main" xmlns:m="http://schemas.openxmlformats.org/officeDocument/2006/math" xmlns="" val="1"/>
             </a:ext>
           </a:extLst>
         </p:spPr>
@@ -28767,7 +28895,7 @@
           </a:prstGeom>
           <a:extLst>
             <a:ext uri="{C572A759-6A51-4108-AA02-DFA0A04FC94B}">
-              <ma14:wrappingTextBoxFlag xmlns="" xmlns:m="http://schemas.openxmlformats.org/officeDocument/2006/math" xmlns:a14="http://schemas.microsoft.com/office/drawing/2010/main" xmlns:ma14="http://schemas.microsoft.com/office/mac/drawingml/2011/main" val="1"/>
+              <ma14:wrappingTextBoxFlag xmlns:ma14="http://schemas.microsoft.com/office/mac/drawingml/2011/main" xmlns:a14="http://schemas.microsoft.com/office/drawing/2010/main" xmlns:m="http://schemas.openxmlformats.org/officeDocument/2006/math" xmlns="" val="1"/>
             </a:ext>
           </a:extLst>
         </p:spPr>
@@ -28805,7 +28933,7 @@
           </a:ln>
           <a:extLst>
             <a:ext uri="{C572A759-6A51-4108-AA02-DFA0A04FC94B}">
-              <ma14:wrappingTextBoxFlag xmlns="" xmlns:m="http://schemas.openxmlformats.org/officeDocument/2006/math" xmlns:a14="http://schemas.microsoft.com/office/drawing/2010/main" xmlns:ma14="http://schemas.microsoft.com/office/mac/drawingml/2011/main" val="1"/>
+              <ma14:wrappingTextBoxFlag xmlns:ma14="http://schemas.microsoft.com/office/mac/drawingml/2011/main" xmlns:a14="http://schemas.microsoft.com/office/drawing/2010/main" xmlns:m="http://schemas.openxmlformats.org/officeDocument/2006/math" xmlns="" val="1"/>
             </a:ext>
           </a:extLst>
         </p:spPr>
@@ -28917,7 +29045,7 @@
           </a:ln>
           <a:extLst>
             <a:ext uri="{C572A759-6A51-4108-AA02-DFA0A04FC94B}">
-              <ma14:wrappingTextBoxFlag xmlns="" xmlns:m="http://schemas.openxmlformats.org/officeDocument/2006/math" xmlns:a14="http://schemas.microsoft.com/office/drawing/2010/main" xmlns:ma14="http://schemas.microsoft.com/office/mac/drawingml/2011/main" val="1"/>
+              <ma14:wrappingTextBoxFlag xmlns:ma14="http://schemas.microsoft.com/office/mac/drawingml/2011/main" xmlns:a14="http://schemas.microsoft.com/office/drawing/2010/main" xmlns:m="http://schemas.openxmlformats.org/officeDocument/2006/math" xmlns="" val="1"/>
             </a:ext>
           </a:extLst>
         </p:spPr>
@@ -28953,7 +29081,7 @@
           </a:prstGeom>
           <a:extLst>
             <a:ext uri="{C572A759-6A51-4108-AA02-DFA0A04FC94B}">
-              <ma14:wrappingTextBoxFlag xmlns="" xmlns:m="http://schemas.openxmlformats.org/officeDocument/2006/math" xmlns:a14="http://schemas.microsoft.com/office/drawing/2010/main" xmlns:ma14="http://schemas.microsoft.com/office/mac/drawingml/2011/main" val="1"/>
+              <ma14:wrappingTextBoxFlag xmlns:ma14="http://schemas.microsoft.com/office/mac/drawingml/2011/main" xmlns:a14="http://schemas.microsoft.com/office/drawing/2010/main" xmlns:m="http://schemas.openxmlformats.org/officeDocument/2006/math" xmlns="" val="1"/>
             </a:ext>
           </a:extLst>
         </p:spPr>
@@ -28991,7 +29119,7 @@
           </a:ln>
           <a:extLst>
             <a:ext uri="{C572A759-6A51-4108-AA02-DFA0A04FC94B}">
-              <ma14:wrappingTextBoxFlag xmlns="" xmlns:m="http://schemas.openxmlformats.org/officeDocument/2006/math" xmlns:a14="http://schemas.microsoft.com/office/drawing/2010/main" xmlns:ma14="http://schemas.microsoft.com/office/mac/drawingml/2011/main" val="1"/>
+              <ma14:wrappingTextBoxFlag xmlns:ma14="http://schemas.microsoft.com/office/mac/drawingml/2011/main" xmlns:a14="http://schemas.microsoft.com/office/drawing/2010/main" xmlns:m="http://schemas.openxmlformats.org/officeDocument/2006/math" xmlns="" val="1"/>
             </a:ext>
           </a:extLst>
         </p:spPr>
@@ -29120,7 +29248,7 @@
           </a:ln>
           <a:extLst>
             <a:ext uri="{C572A759-6A51-4108-AA02-DFA0A04FC94B}">
-              <ma14:wrappingTextBoxFlag xmlns="" xmlns:m="http://schemas.openxmlformats.org/officeDocument/2006/math" xmlns:a14="http://schemas.microsoft.com/office/drawing/2010/main" xmlns:ma14="http://schemas.microsoft.com/office/mac/drawingml/2011/main" val="1"/>
+              <ma14:wrappingTextBoxFlag xmlns:ma14="http://schemas.microsoft.com/office/mac/drawingml/2011/main" xmlns:a14="http://schemas.microsoft.com/office/drawing/2010/main" xmlns:m="http://schemas.openxmlformats.org/officeDocument/2006/math" xmlns="" val="1"/>
             </a:ext>
           </a:extLst>
         </p:spPr>
@@ -29156,7 +29284,7 @@
           </a:prstGeom>
           <a:extLst>
             <a:ext uri="{C572A759-6A51-4108-AA02-DFA0A04FC94B}">
-              <ma14:wrappingTextBoxFlag xmlns="" xmlns:m="http://schemas.openxmlformats.org/officeDocument/2006/math" xmlns:a14="http://schemas.microsoft.com/office/drawing/2010/main" xmlns:ma14="http://schemas.microsoft.com/office/mac/drawingml/2011/main" val="1"/>
+              <ma14:wrappingTextBoxFlag xmlns:ma14="http://schemas.microsoft.com/office/mac/drawingml/2011/main" xmlns:a14="http://schemas.microsoft.com/office/drawing/2010/main" xmlns:m="http://schemas.openxmlformats.org/officeDocument/2006/math" xmlns="" val="1"/>
             </a:ext>
           </a:extLst>
         </p:spPr>
@@ -29194,7 +29322,7 @@
           </a:ln>
           <a:extLst>
             <a:ext uri="{C572A759-6A51-4108-AA02-DFA0A04FC94B}">
-              <ma14:wrappingTextBoxFlag xmlns="" xmlns:m="http://schemas.openxmlformats.org/officeDocument/2006/math" xmlns:a14="http://schemas.microsoft.com/office/drawing/2010/main" xmlns:ma14="http://schemas.microsoft.com/office/mac/drawingml/2011/main" val="1"/>
+              <ma14:wrappingTextBoxFlag xmlns:ma14="http://schemas.microsoft.com/office/mac/drawingml/2011/main" xmlns:a14="http://schemas.microsoft.com/office/drawing/2010/main" xmlns:m="http://schemas.openxmlformats.org/officeDocument/2006/math" xmlns="" val="1"/>
             </a:ext>
           </a:extLst>
         </p:spPr>
@@ -29312,7 +29440,7 @@
           </a:ln>
           <a:extLst>
             <a:ext uri="{C572A759-6A51-4108-AA02-DFA0A04FC94B}">
-              <ma14:wrappingTextBoxFlag xmlns="" xmlns:m="http://schemas.openxmlformats.org/officeDocument/2006/math" xmlns:a14="http://schemas.microsoft.com/office/drawing/2010/main" xmlns:ma14="http://schemas.microsoft.com/office/mac/drawingml/2011/main" val="1"/>
+              <ma14:wrappingTextBoxFlag xmlns:ma14="http://schemas.microsoft.com/office/mac/drawingml/2011/main" xmlns:a14="http://schemas.microsoft.com/office/drawing/2010/main" xmlns:m="http://schemas.openxmlformats.org/officeDocument/2006/math" xmlns="" val="1"/>
             </a:ext>
           </a:extLst>
         </p:spPr>
@@ -29348,7 +29476,7 @@
           </a:prstGeom>
           <a:extLst>
             <a:ext uri="{C572A759-6A51-4108-AA02-DFA0A04FC94B}">
-              <ma14:wrappingTextBoxFlag xmlns="" xmlns:m="http://schemas.openxmlformats.org/officeDocument/2006/math" xmlns:a14="http://schemas.microsoft.com/office/drawing/2010/main" xmlns:ma14="http://schemas.microsoft.com/office/mac/drawingml/2011/main" val="1"/>
+              <ma14:wrappingTextBoxFlag xmlns:ma14="http://schemas.microsoft.com/office/mac/drawingml/2011/main" xmlns:a14="http://schemas.microsoft.com/office/drawing/2010/main" xmlns:m="http://schemas.openxmlformats.org/officeDocument/2006/math" xmlns="" val="1"/>
             </a:ext>
           </a:extLst>
         </p:spPr>
@@ -29386,7 +29514,7 @@
           </a:ln>
           <a:extLst>
             <a:ext uri="{C572A759-6A51-4108-AA02-DFA0A04FC94B}">
-              <ma14:wrappingTextBoxFlag xmlns="" xmlns:m="http://schemas.openxmlformats.org/officeDocument/2006/math" xmlns:a14="http://schemas.microsoft.com/office/drawing/2010/main" xmlns:ma14="http://schemas.microsoft.com/office/mac/drawingml/2011/main" val="1"/>
+              <ma14:wrappingTextBoxFlag xmlns:ma14="http://schemas.microsoft.com/office/mac/drawingml/2011/main" xmlns:a14="http://schemas.microsoft.com/office/drawing/2010/main" xmlns:m="http://schemas.openxmlformats.org/officeDocument/2006/math" xmlns="" val="1"/>
             </a:ext>
           </a:extLst>
         </p:spPr>
@@ -29524,7 +29652,7 @@
           </a:ln>
           <a:extLst>
             <a:ext uri="{C572A759-6A51-4108-AA02-DFA0A04FC94B}">
-              <ma14:wrappingTextBoxFlag xmlns="" xmlns:m="http://schemas.openxmlformats.org/officeDocument/2006/math" xmlns:a14="http://schemas.microsoft.com/office/drawing/2010/main" xmlns:ma14="http://schemas.microsoft.com/office/mac/drawingml/2011/main" val="1"/>
+              <ma14:wrappingTextBoxFlag xmlns:ma14="http://schemas.microsoft.com/office/mac/drawingml/2011/main" xmlns:a14="http://schemas.microsoft.com/office/drawing/2010/main" xmlns:m="http://schemas.openxmlformats.org/officeDocument/2006/math" xmlns="" val="1"/>
             </a:ext>
           </a:extLst>
         </p:spPr>
@@ -29662,7 +29790,7 @@
           </a:ln>
           <a:extLst>
             <a:ext uri="{C572A759-6A51-4108-AA02-DFA0A04FC94B}">
-              <ma14:wrappingTextBoxFlag xmlns="" xmlns:m="http://schemas.openxmlformats.org/officeDocument/2006/math" xmlns:a14="http://schemas.microsoft.com/office/drawing/2010/main" xmlns:ma14="http://schemas.microsoft.com/office/mac/drawingml/2011/main" val="1"/>
+              <ma14:wrappingTextBoxFlag xmlns:ma14="http://schemas.microsoft.com/office/mac/drawingml/2011/main" xmlns:a14="http://schemas.microsoft.com/office/drawing/2010/main" xmlns:m="http://schemas.openxmlformats.org/officeDocument/2006/math" xmlns="" val="1"/>
             </a:ext>
           </a:extLst>
         </p:spPr>
@@ -29721,7 +29849,7 @@
               </a:ln>
               <a:extLst>
                 <a:ext uri="{C572A759-6A51-4108-AA02-DFA0A04FC94B}">
-                  <ma14:wrappingTextBoxFlag xmlns="" xmlns:m="http://schemas.openxmlformats.org/officeDocument/2006/math" xmlns:ma14="http://schemas.microsoft.com/office/mac/drawingml/2011/main" val="1"/>
+                  <ma14:wrappingTextBoxFlag xmlns:ma14="http://schemas.microsoft.com/office/mac/drawingml/2011/main" xmlns:m="http://schemas.openxmlformats.org/officeDocument/2006/math" xmlns="" val="1"/>
                 </a:ext>
               </a:extLst>
             </p:spPr>
@@ -29846,7 +29974,7 @@
               </a:ln>
               <a:extLst>
                 <a:ext uri="{C572A759-6A51-4108-AA02-DFA0A04FC94B}">
-                  <ma14:wrappingTextBoxFlag xmlns="" xmlns:m="http://schemas.openxmlformats.org/officeDocument/2006/math" xmlns:ma14="http://schemas.microsoft.com/office/mac/drawingml/2011/main" val="1"/>
+                  <ma14:wrappingTextBoxFlag xmlns:ma14="http://schemas.microsoft.com/office/mac/drawingml/2011/main" xmlns:m="http://schemas.openxmlformats.org/officeDocument/2006/math" xmlns="" val="1"/>
                 </a:ext>
               </a:extLst>
             </p:spPr>
@@ -29971,7 +30099,7 @@
               </a:ln>
               <a:extLst>
                 <a:ext uri="{C572A759-6A51-4108-AA02-DFA0A04FC94B}">
-                  <ma14:wrappingTextBoxFlag xmlns="" xmlns:m="http://schemas.openxmlformats.org/officeDocument/2006/math" xmlns:ma14="http://schemas.microsoft.com/office/mac/drawingml/2011/main" val="1"/>
+                  <ma14:wrappingTextBoxFlag xmlns:ma14="http://schemas.microsoft.com/office/mac/drawingml/2011/main" xmlns:m="http://schemas.openxmlformats.org/officeDocument/2006/math" xmlns="" val="1"/>
                 </a:ext>
               </a:extLst>
             </p:spPr>
@@ -30136,7 +30264,7 @@
               </a:ln>
               <a:extLst>
                 <a:ext uri="{C572A759-6A51-4108-AA02-DFA0A04FC94B}">
-                  <ma14:wrappingTextBoxFlag xmlns="" xmlns:m="http://schemas.openxmlformats.org/officeDocument/2006/math" xmlns:ma14="http://schemas.microsoft.com/office/mac/drawingml/2011/main" val="1"/>
+                  <ma14:wrappingTextBoxFlag xmlns:ma14="http://schemas.microsoft.com/office/mac/drawingml/2011/main" xmlns:m="http://schemas.openxmlformats.org/officeDocument/2006/math" xmlns="" val="1"/>
                 </a:ext>
               </a:extLst>
             </p:spPr>
@@ -30302,7 +30430,7 @@
               </a:ln>
               <a:extLst>
                 <a:ext uri="{C572A759-6A51-4108-AA02-DFA0A04FC94B}">
-                  <ma14:wrappingTextBoxFlag xmlns="" xmlns:m="http://schemas.openxmlformats.org/officeDocument/2006/math" xmlns:ma14="http://schemas.microsoft.com/office/mac/drawingml/2011/main" val="1"/>
+                  <ma14:wrappingTextBoxFlag xmlns:ma14="http://schemas.microsoft.com/office/mac/drawingml/2011/main" xmlns:m="http://schemas.openxmlformats.org/officeDocument/2006/math" xmlns="" val="1"/>
                 </a:ext>
               </a:extLst>
             </p:spPr>
@@ -30427,7 +30555,7 @@
               </a:ln>
               <a:extLst>
                 <a:ext uri="{C572A759-6A51-4108-AA02-DFA0A04FC94B}">
-                  <ma14:wrappingTextBoxFlag xmlns="" xmlns:m="http://schemas.openxmlformats.org/officeDocument/2006/math" xmlns:ma14="http://schemas.microsoft.com/office/mac/drawingml/2011/main" val="1"/>
+                  <ma14:wrappingTextBoxFlag xmlns:ma14="http://schemas.microsoft.com/office/mac/drawingml/2011/main" xmlns:m="http://schemas.openxmlformats.org/officeDocument/2006/math" xmlns="" val="1"/>
                 </a:ext>
               </a:extLst>
             </p:spPr>
@@ -30549,8 +30677,8 @@
           </p:sp>
         </mc:Fallback>
       </mc:AlternateContent>
-      <mc:AlternateContent xmlns:mc="http://schemas.openxmlformats.org/markup-compatibility/2006">
-        <mc:Choice xmlns:a14="http://schemas.microsoft.com/office/drawing/2010/main" Requires="a14">
+      <mc:AlternateContent xmlns:mc="http://schemas.openxmlformats.org/markup-compatibility/2006" xmlns:a14="http://schemas.microsoft.com/office/drawing/2010/main">
+        <mc:Choice Requires="a14">
           <p:sp>
             <p:nvSpPr>
               <p:cNvPr id="504" name="Text"/>
@@ -30570,7 +30698,7 @@
               </a:ln>
               <a:extLst>
                 <a:ext uri="{C572A759-6A51-4108-AA02-DFA0A04FC94B}">
-                  <ma14:wrappingTextBoxFlag xmlns="" xmlns:m="http://schemas.openxmlformats.org/officeDocument/2006/math" xmlns:ma14="http://schemas.microsoft.com/office/mac/drawingml/2011/main" val="1"/>
+                  <ma14:wrappingTextBoxFlag xmlns:ma14="http://schemas.microsoft.com/office/mac/drawingml/2011/main" xmlns:m="http://schemas.openxmlformats.org/officeDocument/2006/math" xmlns="" val="1"/>
                 </a:ext>
               </a:extLst>
             </p:spPr>
@@ -30645,7 +30773,7 @@
             </p:txBody>
           </p:sp>
         </mc:Choice>
-        <mc:Fallback>
+        <mc:Fallback xmlns="">
           <p:sp>
             <p:nvSpPr>
               <p:cNvPr id="504" name="Text"/>
@@ -30692,8 +30820,8 @@
           </p:sp>
         </mc:Fallback>
       </mc:AlternateContent>
-      <mc:AlternateContent xmlns:mc="http://schemas.openxmlformats.org/markup-compatibility/2006">
-        <mc:Choice xmlns:a14="http://schemas.microsoft.com/office/drawing/2010/main" Requires="a14">
+      <mc:AlternateContent xmlns:mc="http://schemas.openxmlformats.org/markup-compatibility/2006" xmlns:a14="http://schemas.microsoft.com/office/drawing/2010/main">
+        <mc:Choice Requires="a14">
           <p:sp>
             <p:nvSpPr>
               <p:cNvPr id="505" name="Text"/>
@@ -30713,7 +30841,7 @@
               </a:ln>
               <a:extLst>
                 <a:ext uri="{C572A759-6A51-4108-AA02-DFA0A04FC94B}">
-                  <ma14:wrappingTextBoxFlag xmlns="" xmlns:m="http://schemas.openxmlformats.org/officeDocument/2006/math" xmlns:ma14="http://schemas.microsoft.com/office/mac/drawingml/2011/main" val="1"/>
+                  <ma14:wrappingTextBoxFlag xmlns:ma14="http://schemas.microsoft.com/office/mac/drawingml/2011/main" xmlns:m="http://schemas.openxmlformats.org/officeDocument/2006/math" xmlns="" val="1"/>
                 </a:ext>
               </a:extLst>
             </p:spPr>
@@ -30813,7 +30941,7 @@
             </p:txBody>
           </p:sp>
         </mc:Choice>
-        <mc:Fallback>
+        <mc:Fallback xmlns="">
           <p:sp>
             <p:nvSpPr>
               <p:cNvPr id="505" name="Text"/>
@@ -30860,8 +30988,8 @@
           </p:sp>
         </mc:Fallback>
       </mc:AlternateContent>
-      <mc:AlternateContent xmlns:mc="http://schemas.openxmlformats.org/markup-compatibility/2006">
-        <mc:Choice xmlns:a14="http://schemas.microsoft.com/office/drawing/2010/main" Requires="a14">
+      <mc:AlternateContent xmlns:mc="http://schemas.openxmlformats.org/markup-compatibility/2006" xmlns:a14="http://schemas.microsoft.com/office/drawing/2010/main">
+        <mc:Choice Requires="a14">
           <p:sp>
             <p:nvSpPr>
               <p:cNvPr id="506" name="Text"/>
@@ -30881,7 +31009,7 @@
               </a:ln>
               <a:extLst>
                 <a:ext uri="{C572A759-6A51-4108-AA02-DFA0A04FC94B}">
-                  <ma14:wrappingTextBoxFlag xmlns="" xmlns:m="http://schemas.openxmlformats.org/officeDocument/2006/math" xmlns:ma14="http://schemas.microsoft.com/office/mac/drawingml/2011/main" val="1"/>
+                  <ma14:wrappingTextBoxFlag xmlns:ma14="http://schemas.microsoft.com/office/mac/drawingml/2011/main" xmlns:m="http://schemas.openxmlformats.org/officeDocument/2006/math" xmlns="" val="1"/>
                 </a:ext>
               </a:extLst>
             </p:spPr>
@@ -30938,7 +31066,7 @@
             </p:txBody>
           </p:sp>
         </mc:Choice>
-        <mc:Fallback>
+        <mc:Fallback xmlns="">
           <p:sp>
             <p:nvSpPr>
               <p:cNvPr id="506" name="Text"/>
@@ -30985,8 +31113,8 @@
           </p:sp>
         </mc:Fallback>
       </mc:AlternateContent>
-      <mc:AlternateContent xmlns:mc="http://schemas.openxmlformats.org/markup-compatibility/2006">
-        <mc:Choice xmlns:a14="http://schemas.microsoft.com/office/drawing/2010/main" Requires="a14">
+      <mc:AlternateContent xmlns:mc="http://schemas.openxmlformats.org/markup-compatibility/2006" xmlns:a14="http://schemas.microsoft.com/office/drawing/2010/main">
+        <mc:Choice Requires="a14">
           <p:sp>
             <p:nvSpPr>
               <p:cNvPr id="507" name="Text"/>
@@ -31006,7 +31134,7 @@
               </a:ln>
               <a:extLst>
                 <a:ext uri="{C572A759-6A51-4108-AA02-DFA0A04FC94B}">
-                  <ma14:wrappingTextBoxFlag xmlns="" xmlns:m="http://schemas.openxmlformats.org/officeDocument/2006/math" xmlns:ma14="http://schemas.microsoft.com/office/mac/drawingml/2011/main" val="1"/>
+                  <ma14:wrappingTextBoxFlag xmlns:ma14="http://schemas.microsoft.com/office/mac/drawingml/2011/main" xmlns:m="http://schemas.openxmlformats.org/officeDocument/2006/math" xmlns="" val="1"/>
                 </a:ext>
               </a:extLst>
             </p:spPr>
@@ -31081,7 +31209,7 @@
             </p:txBody>
           </p:sp>
         </mc:Choice>
-        <mc:Fallback>
+        <mc:Fallback xmlns="">
           <p:sp>
             <p:nvSpPr>
               <p:cNvPr id="507" name="Text"/>
@@ -31128,8 +31256,8 @@
           </p:sp>
         </mc:Fallback>
       </mc:AlternateContent>
-      <mc:AlternateContent xmlns:mc="http://schemas.openxmlformats.org/markup-compatibility/2006">
-        <mc:Choice xmlns:a14="http://schemas.microsoft.com/office/drawing/2010/main" Requires="a14">
+      <mc:AlternateContent xmlns:mc="http://schemas.openxmlformats.org/markup-compatibility/2006" xmlns:a14="http://schemas.microsoft.com/office/drawing/2010/main">
+        <mc:Choice Requires="a14">
           <p:sp>
             <p:nvSpPr>
               <p:cNvPr id="508" name="Text"/>
@@ -31149,7 +31277,7 @@
               </a:ln>
               <a:extLst>
                 <a:ext uri="{C572A759-6A51-4108-AA02-DFA0A04FC94B}">
-                  <ma14:wrappingTextBoxFlag xmlns="" xmlns:m="http://schemas.openxmlformats.org/officeDocument/2006/math" xmlns:ma14="http://schemas.microsoft.com/office/mac/drawingml/2011/main" val="1"/>
+                  <ma14:wrappingTextBoxFlag xmlns:ma14="http://schemas.microsoft.com/office/mac/drawingml/2011/main" xmlns:m="http://schemas.openxmlformats.org/officeDocument/2006/math" xmlns="" val="1"/>
                 </a:ext>
               </a:extLst>
             </p:spPr>
@@ -31242,7 +31370,7 @@
             </p:txBody>
           </p:sp>
         </mc:Choice>
-        <mc:Fallback>
+        <mc:Fallback xmlns="">
           <p:sp>
             <p:nvSpPr>
               <p:cNvPr id="508" name="Text"/>
@@ -31308,7 +31436,7 @@
           </a:ln>
           <a:extLst>
             <a:ext uri="{C572A759-6A51-4108-AA02-DFA0A04FC94B}">
-              <ma14:wrappingTextBoxFlag xmlns="" xmlns:m="http://schemas.openxmlformats.org/officeDocument/2006/math" xmlns:a14="http://schemas.microsoft.com/office/drawing/2010/main" xmlns:ma14="http://schemas.microsoft.com/office/mac/drawingml/2011/main" val="1"/>
+              <ma14:wrappingTextBoxFlag xmlns:ma14="http://schemas.microsoft.com/office/mac/drawingml/2011/main" xmlns:a14="http://schemas.microsoft.com/office/drawing/2010/main" xmlns:m="http://schemas.openxmlformats.org/officeDocument/2006/math" xmlns="" val="1"/>
             </a:ext>
           </a:extLst>
         </p:spPr>
@@ -31347,7 +31475,7 @@
           </a:ln>
           <a:extLst>
             <a:ext uri="{C572A759-6A51-4108-AA02-DFA0A04FC94B}">
-              <ma14:wrappingTextBoxFlag xmlns="" xmlns:m="http://schemas.openxmlformats.org/officeDocument/2006/math" xmlns:a14="http://schemas.microsoft.com/office/drawing/2010/main" xmlns:ma14="http://schemas.microsoft.com/office/mac/drawingml/2011/main" val="1"/>
+              <ma14:wrappingTextBoxFlag xmlns:ma14="http://schemas.microsoft.com/office/mac/drawingml/2011/main" xmlns:a14="http://schemas.microsoft.com/office/drawing/2010/main" xmlns:m="http://schemas.openxmlformats.org/officeDocument/2006/math" xmlns="" val="1"/>
             </a:ext>
           </a:extLst>
         </p:spPr>
@@ -31442,7 +31570,7 @@
           </a:ln>
           <a:extLst>
             <a:ext uri="{C572A759-6A51-4108-AA02-DFA0A04FC94B}">
-              <ma14:wrappingTextBoxFlag xmlns="" xmlns:m="http://schemas.openxmlformats.org/officeDocument/2006/math" xmlns:a14="http://schemas.microsoft.com/office/drawing/2010/main" xmlns:ma14="http://schemas.microsoft.com/office/mac/drawingml/2011/main" val="1"/>
+              <ma14:wrappingTextBoxFlag xmlns:ma14="http://schemas.microsoft.com/office/mac/drawingml/2011/main" xmlns:a14="http://schemas.microsoft.com/office/drawing/2010/main" xmlns:m="http://schemas.openxmlformats.org/officeDocument/2006/math" xmlns="" val="1"/>
             </a:ext>
           </a:extLst>
         </p:spPr>
@@ -31483,7 +31611,7 @@
               </a:ln>
               <a:extLst>
                 <a:ext uri="{C572A759-6A51-4108-AA02-DFA0A04FC94B}">
-                  <ma14:wrappingTextBoxFlag xmlns="" xmlns:m="http://schemas.openxmlformats.org/officeDocument/2006/math" xmlns:ma14="http://schemas.microsoft.com/office/mac/drawingml/2011/main" val="1"/>
+                  <ma14:wrappingTextBoxFlag xmlns:ma14="http://schemas.microsoft.com/office/mac/drawingml/2011/main" xmlns:m="http://schemas.openxmlformats.org/officeDocument/2006/math" xmlns="" val="1"/>
                 </a:ext>
               </a:extLst>
             </p:spPr>
@@ -31706,7 +31834,7 @@
               </a:ln>
               <a:extLst>
                 <a:ext uri="{C572A759-6A51-4108-AA02-DFA0A04FC94B}">
-                  <ma14:wrappingTextBoxFlag xmlns="" xmlns:m="http://schemas.openxmlformats.org/officeDocument/2006/math" xmlns:ma14="http://schemas.microsoft.com/office/mac/drawingml/2011/main" val="1"/>
+                  <ma14:wrappingTextBoxFlag xmlns:ma14="http://schemas.microsoft.com/office/mac/drawingml/2011/main" xmlns:m="http://schemas.openxmlformats.org/officeDocument/2006/math" xmlns="" val="1"/>
                 </a:ext>
               </a:extLst>
             </p:spPr>
@@ -31980,7 +32108,7 @@
           </a:ln>
           <a:extLst>
             <a:ext uri="{C572A759-6A51-4108-AA02-DFA0A04FC94B}">
-              <ma14:wrappingTextBoxFlag xmlns="" xmlns:m="http://schemas.openxmlformats.org/officeDocument/2006/math" xmlns:a14="http://schemas.microsoft.com/office/drawing/2010/main" xmlns:ma14="http://schemas.microsoft.com/office/mac/drawingml/2011/main" val="1"/>
+              <ma14:wrappingTextBoxFlag xmlns:ma14="http://schemas.microsoft.com/office/mac/drawingml/2011/main" xmlns:a14="http://schemas.microsoft.com/office/drawing/2010/main" xmlns:m="http://schemas.openxmlformats.org/officeDocument/2006/math" xmlns="" val="1"/>
             </a:ext>
           </a:extLst>
         </p:spPr>
@@ -32016,7 +32144,7 @@
           </a:prstGeom>
           <a:extLst>
             <a:ext uri="{C572A759-6A51-4108-AA02-DFA0A04FC94B}">
-              <ma14:wrappingTextBoxFlag xmlns="" xmlns:m="http://schemas.openxmlformats.org/officeDocument/2006/math" xmlns:a14="http://schemas.microsoft.com/office/drawing/2010/main" xmlns:ma14="http://schemas.microsoft.com/office/mac/drawingml/2011/main" val="1"/>
+              <ma14:wrappingTextBoxFlag xmlns:ma14="http://schemas.microsoft.com/office/mac/drawingml/2011/main" xmlns:a14="http://schemas.microsoft.com/office/drawing/2010/main" xmlns:m="http://schemas.openxmlformats.org/officeDocument/2006/math" xmlns="" val="1"/>
             </a:ext>
           </a:extLst>
         </p:spPr>
@@ -32054,7 +32182,7 @@
           </a:ln>
           <a:extLst>
             <a:ext uri="{C572A759-6A51-4108-AA02-DFA0A04FC94B}">
-              <ma14:wrappingTextBoxFlag xmlns="" xmlns:m="http://schemas.openxmlformats.org/officeDocument/2006/math" xmlns:a14="http://schemas.microsoft.com/office/drawing/2010/main" xmlns:ma14="http://schemas.microsoft.com/office/mac/drawingml/2011/main" val="1"/>
+              <ma14:wrappingTextBoxFlag xmlns:ma14="http://schemas.microsoft.com/office/mac/drawingml/2011/main" xmlns:a14="http://schemas.microsoft.com/office/drawing/2010/main" xmlns:m="http://schemas.openxmlformats.org/officeDocument/2006/math" xmlns="" val="1"/>
             </a:ext>
           </a:extLst>
         </p:spPr>
@@ -32372,7 +32500,7 @@
           </a:ln>
           <a:extLst>
             <a:ext uri="{C572A759-6A51-4108-AA02-DFA0A04FC94B}">
-              <ma14:wrappingTextBoxFlag xmlns="" xmlns:m="http://schemas.openxmlformats.org/officeDocument/2006/math" xmlns:a14="http://schemas.microsoft.com/office/drawing/2010/main" xmlns:ma14="http://schemas.microsoft.com/office/mac/drawingml/2011/main" val="1"/>
+              <ma14:wrappingTextBoxFlag xmlns:ma14="http://schemas.microsoft.com/office/mac/drawingml/2011/main" xmlns:a14="http://schemas.microsoft.com/office/drawing/2010/main" xmlns:m="http://schemas.openxmlformats.org/officeDocument/2006/math" xmlns="" val="1"/>
             </a:ext>
           </a:extLst>
         </p:spPr>
@@ -32483,7 +32611,7 @@
           </a:ln>
           <a:extLst>
             <a:ext uri="{C572A759-6A51-4108-AA02-DFA0A04FC94B}">
-              <ma14:wrappingTextBoxFlag xmlns="" xmlns:m="http://schemas.openxmlformats.org/officeDocument/2006/math" xmlns:a14="http://schemas.microsoft.com/office/drawing/2010/main" xmlns:ma14="http://schemas.microsoft.com/office/mac/drawingml/2011/main" val="1"/>
+              <ma14:wrappingTextBoxFlag xmlns:ma14="http://schemas.microsoft.com/office/mac/drawingml/2011/main" xmlns:a14="http://schemas.microsoft.com/office/drawing/2010/main" xmlns:m="http://schemas.openxmlformats.org/officeDocument/2006/math" xmlns="" val="1"/>
             </a:ext>
           </a:extLst>
         </p:spPr>
@@ -32548,7 +32676,7 @@
           </a:ln>
           <a:extLst>
             <a:ext uri="{C572A759-6A51-4108-AA02-DFA0A04FC94B}">
-              <ma14:wrappingTextBoxFlag xmlns="" xmlns:m="http://schemas.openxmlformats.org/officeDocument/2006/math" xmlns:a14="http://schemas.microsoft.com/office/drawing/2010/main" xmlns:ma14="http://schemas.microsoft.com/office/mac/drawingml/2011/main" val="1"/>
+              <ma14:wrappingTextBoxFlag xmlns:ma14="http://schemas.microsoft.com/office/mac/drawingml/2011/main" xmlns:a14="http://schemas.microsoft.com/office/drawing/2010/main" xmlns:m="http://schemas.openxmlformats.org/officeDocument/2006/math" xmlns="" val="1"/>
             </a:ext>
           </a:extLst>
         </p:spPr>
@@ -32584,7 +32712,7 @@
           </a:prstGeom>
           <a:extLst>
             <a:ext uri="{C572A759-6A51-4108-AA02-DFA0A04FC94B}">
-              <ma14:wrappingTextBoxFlag xmlns="" xmlns:m="http://schemas.openxmlformats.org/officeDocument/2006/math" xmlns:a14="http://schemas.microsoft.com/office/drawing/2010/main" xmlns:ma14="http://schemas.microsoft.com/office/mac/drawingml/2011/main" val="1"/>
+              <ma14:wrappingTextBoxFlag xmlns:ma14="http://schemas.microsoft.com/office/mac/drawingml/2011/main" xmlns:a14="http://schemas.microsoft.com/office/drawing/2010/main" xmlns:m="http://schemas.openxmlformats.org/officeDocument/2006/math" xmlns="" val="1"/>
             </a:ext>
           </a:extLst>
         </p:spPr>
@@ -32622,7 +32750,7 @@
           </a:ln>
           <a:extLst>
             <a:ext uri="{C572A759-6A51-4108-AA02-DFA0A04FC94B}">
-              <ma14:wrappingTextBoxFlag xmlns="" xmlns:m="http://schemas.openxmlformats.org/officeDocument/2006/math" xmlns:a14="http://schemas.microsoft.com/office/drawing/2010/main" xmlns:ma14="http://schemas.microsoft.com/office/mac/drawingml/2011/main" val="1"/>
+              <ma14:wrappingTextBoxFlag xmlns:ma14="http://schemas.microsoft.com/office/mac/drawingml/2011/main" xmlns:a14="http://schemas.microsoft.com/office/drawing/2010/main" xmlns:m="http://schemas.openxmlformats.org/officeDocument/2006/math" xmlns="" val="1"/>
             </a:ext>
           </a:extLst>
         </p:spPr>
@@ -32734,7 +32862,7 @@
           </a:prstGeom>
           <a:extLst>
             <a:ext uri="{C572A759-6A51-4108-AA02-DFA0A04FC94B}">
-              <ma14:wrappingTextBoxFlag xmlns="" xmlns:m="http://schemas.openxmlformats.org/officeDocument/2006/math" xmlns:a14="http://schemas.microsoft.com/office/drawing/2010/main" xmlns:ma14="http://schemas.microsoft.com/office/mac/drawingml/2011/main" val="1"/>
+              <ma14:wrappingTextBoxFlag xmlns:ma14="http://schemas.microsoft.com/office/mac/drawingml/2011/main" xmlns:a14="http://schemas.microsoft.com/office/drawing/2010/main" xmlns:m="http://schemas.openxmlformats.org/officeDocument/2006/math" xmlns="" val="1"/>
             </a:ext>
           </a:extLst>
         </p:spPr>
@@ -32768,7 +32896,7 @@
           </a:ln>
           <a:extLst>
             <a:ext uri="{C572A759-6A51-4108-AA02-DFA0A04FC94B}">
-              <ma14:wrappingTextBoxFlag xmlns="" xmlns:m="http://schemas.openxmlformats.org/officeDocument/2006/math" xmlns:a14="http://schemas.microsoft.com/office/drawing/2010/main" xmlns:ma14="http://schemas.microsoft.com/office/mac/drawingml/2011/main" val="1"/>
+              <ma14:wrappingTextBoxFlag xmlns:ma14="http://schemas.microsoft.com/office/mac/drawingml/2011/main" xmlns:a14="http://schemas.microsoft.com/office/drawing/2010/main" xmlns:m="http://schemas.openxmlformats.org/officeDocument/2006/math" xmlns="" val="1"/>
             </a:ext>
           </a:extLst>
         </p:spPr>
@@ -32914,7 +33042,7 @@
           </a:ln>
           <a:extLst>
             <a:ext uri="{C572A759-6A51-4108-AA02-DFA0A04FC94B}">
-              <ma14:wrappingTextBoxFlag xmlns="" xmlns:m="http://schemas.openxmlformats.org/officeDocument/2006/math" xmlns:a14="http://schemas.microsoft.com/office/drawing/2010/main" xmlns:ma14="http://schemas.microsoft.com/office/mac/drawingml/2011/main" val="1"/>
+              <ma14:wrappingTextBoxFlag xmlns:ma14="http://schemas.microsoft.com/office/mac/drawingml/2011/main" xmlns:a14="http://schemas.microsoft.com/office/drawing/2010/main" xmlns:m="http://schemas.openxmlformats.org/officeDocument/2006/math" xmlns="" val="1"/>
             </a:ext>
           </a:extLst>
         </p:spPr>
@@ -33170,7 +33298,7 @@
           </a:ln>
           <a:extLst>
             <a:ext uri="{C572A759-6A51-4108-AA02-DFA0A04FC94B}">
-              <ma14:wrappingTextBoxFlag xmlns="" xmlns:m="http://schemas.openxmlformats.org/officeDocument/2006/math" xmlns:a14="http://schemas.microsoft.com/office/drawing/2010/main" xmlns:ma14="http://schemas.microsoft.com/office/mac/drawingml/2011/main" val="1"/>
+              <ma14:wrappingTextBoxFlag xmlns:ma14="http://schemas.microsoft.com/office/mac/drawingml/2011/main" xmlns:a14="http://schemas.microsoft.com/office/drawing/2010/main" xmlns:m="http://schemas.openxmlformats.org/officeDocument/2006/math" xmlns="" val="1"/>
             </a:ext>
           </a:extLst>
         </p:spPr>
@@ -33209,7 +33337,7 @@
           </a:ln>
           <a:extLst>
             <a:ext uri="{C572A759-6A51-4108-AA02-DFA0A04FC94B}">
-              <ma14:wrappingTextBoxFlag xmlns="" xmlns:m="http://schemas.openxmlformats.org/officeDocument/2006/math" xmlns:a14="http://schemas.microsoft.com/office/drawing/2010/main" xmlns:ma14="http://schemas.microsoft.com/office/mac/drawingml/2011/main" val="1"/>
+              <ma14:wrappingTextBoxFlag xmlns:ma14="http://schemas.microsoft.com/office/mac/drawingml/2011/main" xmlns:a14="http://schemas.microsoft.com/office/drawing/2010/main" xmlns:m="http://schemas.openxmlformats.org/officeDocument/2006/math" xmlns="" val="1"/>
             </a:ext>
           </a:extLst>
         </p:spPr>
@@ -33313,7 +33441,7 @@
           </a:ln>
           <a:extLst>
             <a:ext uri="{C572A759-6A51-4108-AA02-DFA0A04FC94B}">
-              <ma14:wrappingTextBoxFlag xmlns="" xmlns:m="http://schemas.openxmlformats.org/officeDocument/2006/math" xmlns:a14="http://schemas.microsoft.com/office/drawing/2010/main" xmlns:ma14="http://schemas.microsoft.com/office/mac/drawingml/2011/main" val="1"/>
+              <ma14:wrappingTextBoxFlag xmlns:ma14="http://schemas.microsoft.com/office/mac/drawingml/2011/main" xmlns:a14="http://schemas.microsoft.com/office/drawing/2010/main" xmlns:m="http://schemas.openxmlformats.org/officeDocument/2006/math" xmlns="" val="1"/>
             </a:ext>
           </a:extLst>
         </p:spPr>
@@ -33392,7 +33520,7 @@
           </a:ln>
           <a:extLst>
             <a:ext uri="{C572A759-6A51-4108-AA02-DFA0A04FC94B}">
-              <ma14:wrappingTextBoxFlag xmlns="" xmlns:m="http://schemas.openxmlformats.org/officeDocument/2006/math" xmlns:a14="http://schemas.microsoft.com/office/drawing/2010/main" xmlns:ma14="http://schemas.microsoft.com/office/mac/drawingml/2011/main" val="1"/>
+              <ma14:wrappingTextBoxFlag xmlns:ma14="http://schemas.microsoft.com/office/mac/drawingml/2011/main" xmlns:a14="http://schemas.microsoft.com/office/drawing/2010/main" xmlns:m="http://schemas.openxmlformats.org/officeDocument/2006/math" xmlns="" val="1"/>
             </a:ext>
           </a:extLst>
         </p:spPr>
@@ -33431,7 +33559,7 @@
           </a:ln>
           <a:extLst>
             <a:ext uri="{C572A759-6A51-4108-AA02-DFA0A04FC94B}">
-              <ma14:wrappingTextBoxFlag xmlns="" xmlns:m="http://schemas.openxmlformats.org/officeDocument/2006/math" xmlns:a14="http://schemas.microsoft.com/office/drawing/2010/main" xmlns:ma14="http://schemas.microsoft.com/office/mac/drawingml/2011/main" val="1"/>
+              <ma14:wrappingTextBoxFlag xmlns:ma14="http://schemas.microsoft.com/office/mac/drawingml/2011/main" xmlns:a14="http://schemas.microsoft.com/office/drawing/2010/main" xmlns:m="http://schemas.openxmlformats.org/officeDocument/2006/math" xmlns="" val="1"/>
             </a:ext>
           </a:extLst>
         </p:spPr>
@@ -33470,7 +33598,7 @@
           </a:ln>
           <a:extLst>
             <a:ext uri="{C572A759-6A51-4108-AA02-DFA0A04FC94B}">
-              <ma14:wrappingTextBoxFlag xmlns="" xmlns:m="http://schemas.openxmlformats.org/officeDocument/2006/math" xmlns:a14="http://schemas.microsoft.com/office/drawing/2010/main" xmlns:ma14="http://schemas.microsoft.com/office/mac/drawingml/2011/main" val="1"/>
+              <ma14:wrappingTextBoxFlag xmlns:ma14="http://schemas.microsoft.com/office/mac/drawingml/2011/main" xmlns:a14="http://schemas.microsoft.com/office/drawing/2010/main" xmlns:m="http://schemas.openxmlformats.org/officeDocument/2006/math" xmlns="" val="1"/>
             </a:ext>
           </a:extLst>
         </p:spPr>
@@ -33509,7 +33637,7 @@
           </a:ln>
           <a:extLst>
             <a:ext uri="{C572A759-6A51-4108-AA02-DFA0A04FC94B}">
-              <ma14:wrappingTextBoxFlag xmlns="" xmlns:m="http://schemas.openxmlformats.org/officeDocument/2006/math" xmlns:a14="http://schemas.microsoft.com/office/drawing/2010/main" xmlns:ma14="http://schemas.microsoft.com/office/mac/drawingml/2011/main" val="1"/>
+              <ma14:wrappingTextBoxFlag xmlns:ma14="http://schemas.microsoft.com/office/mac/drawingml/2011/main" xmlns:a14="http://schemas.microsoft.com/office/drawing/2010/main" xmlns:m="http://schemas.openxmlformats.org/officeDocument/2006/math" xmlns="" val="1"/>
             </a:ext>
           </a:extLst>
         </p:spPr>
@@ -33548,7 +33676,7 @@
           </a:ln>
           <a:extLst>
             <a:ext uri="{C572A759-6A51-4108-AA02-DFA0A04FC94B}">
-              <ma14:wrappingTextBoxFlag xmlns="" xmlns:m="http://schemas.openxmlformats.org/officeDocument/2006/math" xmlns:a14="http://schemas.microsoft.com/office/drawing/2010/main" xmlns:ma14="http://schemas.microsoft.com/office/mac/drawingml/2011/main" val="1"/>
+              <ma14:wrappingTextBoxFlag xmlns:ma14="http://schemas.microsoft.com/office/mac/drawingml/2011/main" xmlns:a14="http://schemas.microsoft.com/office/drawing/2010/main" xmlns:m="http://schemas.openxmlformats.org/officeDocument/2006/math" xmlns="" val="1"/>
             </a:ext>
           </a:extLst>
         </p:spPr>
@@ -33686,7 +33814,7 @@
           </a:ln>
           <a:extLst>
             <a:ext uri="{C572A759-6A51-4108-AA02-DFA0A04FC94B}">
-              <ma14:wrappingTextBoxFlag xmlns="" xmlns:m="http://schemas.openxmlformats.org/officeDocument/2006/math" xmlns:a14="http://schemas.microsoft.com/office/drawing/2010/main" xmlns:ma14="http://schemas.microsoft.com/office/mac/drawingml/2011/main" val="1"/>
+              <ma14:wrappingTextBoxFlag xmlns:ma14="http://schemas.microsoft.com/office/mac/drawingml/2011/main" xmlns:a14="http://schemas.microsoft.com/office/drawing/2010/main" xmlns:m="http://schemas.openxmlformats.org/officeDocument/2006/math" xmlns="" val="1"/>
             </a:ext>
           </a:extLst>
         </p:spPr>
@@ -33832,7 +33960,7 @@
           </a:ln>
           <a:extLst>
             <a:ext uri="{C572A759-6A51-4108-AA02-DFA0A04FC94B}">
-              <ma14:wrappingTextBoxFlag xmlns="" xmlns:m="http://schemas.openxmlformats.org/officeDocument/2006/math" xmlns:a14="http://schemas.microsoft.com/office/drawing/2010/main" xmlns:ma14="http://schemas.microsoft.com/office/mac/drawingml/2011/main" val="1"/>
+              <ma14:wrappingTextBoxFlag xmlns:ma14="http://schemas.microsoft.com/office/mac/drawingml/2011/main" xmlns:a14="http://schemas.microsoft.com/office/drawing/2010/main" xmlns:m="http://schemas.openxmlformats.org/officeDocument/2006/math" xmlns="" val="1"/>
             </a:ext>
           </a:extLst>
         </p:spPr>
@@ -34088,7 +34216,7 @@
           </a:ln>
           <a:extLst>
             <a:ext uri="{C572A759-6A51-4108-AA02-DFA0A04FC94B}">
-              <ma14:wrappingTextBoxFlag xmlns="" xmlns:m="http://schemas.openxmlformats.org/officeDocument/2006/math" xmlns:a14="http://schemas.microsoft.com/office/drawing/2010/main" xmlns:ma14="http://schemas.microsoft.com/office/mac/drawingml/2011/main" val="1"/>
+              <ma14:wrappingTextBoxFlag xmlns:ma14="http://schemas.microsoft.com/office/mac/drawingml/2011/main" xmlns:a14="http://schemas.microsoft.com/office/drawing/2010/main" xmlns:m="http://schemas.openxmlformats.org/officeDocument/2006/math" xmlns="" val="1"/>
             </a:ext>
           </a:extLst>
         </p:spPr>
@@ -34127,7 +34255,7 @@
           </a:ln>
           <a:extLst>
             <a:ext uri="{C572A759-6A51-4108-AA02-DFA0A04FC94B}">
-              <ma14:wrappingTextBoxFlag xmlns="" xmlns:m="http://schemas.openxmlformats.org/officeDocument/2006/math" xmlns:a14="http://schemas.microsoft.com/office/drawing/2010/main" xmlns:ma14="http://schemas.microsoft.com/office/mac/drawingml/2011/main" val="1"/>
+              <ma14:wrappingTextBoxFlag xmlns:ma14="http://schemas.microsoft.com/office/mac/drawingml/2011/main" xmlns:a14="http://schemas.microsoft.com/office/drawing/2010/main" xmlns:m="http://schemas.openxmlformats.org/officeDocument/2006/math" xmlns="" val="1"/>
             </a:ext>
           </a:extLst>
         </p:spPr>
@@ -34231,7 +34359,7 @@
           </a:ln>
           <a:extLst>
             <a:ext uri="{C572A759-6A51-4108-AA02-DFA0A04FC94B}">
-              <ma14:wrappingTextBoxFlag xmlns="" xmlns:m="http://schemas.openxmlformats.org/officeDocument/2006/math" xmlns:a14="http://schemas.microsoft.com/office/drawing/2010/main" xmlns:ma14="http://schemas.microsoft.com/office/mac/drawingml/2011/main" val="1"/>
+              <ma14:wrappingTextBoxFlag xmlns:ma14="http://schemas.microsoft.com/office/mac/drawingml/2011/main" xmlns:a14="http://schemas.microsoft.com/office/drawing/2010/main" xmlns:m="http://schemas.openxmlformats.org/officeDocument/2006/math" xmlns="" val="1"/>
             </a:ext>
           </a:extLst>
         </p:spPr>
@@ -34306,7 +34434,7 @@
           </a:ln>
           <a:extLst>
             <a:ext uri="{C572A759-6A51-4108-AA02-DFA0A04FC94B}">
-              <ma14:wrappingTextBoxFlag xmlns="" xmlns:m="http://schemas.openxmlformats.org/officeDocument/2006/math" xmlns:a14="http://schemas.microsoft.com/office/drawing/2010/main" xmlns:ma14="http://schemas.microsoft.com/office/mac/drawingml/2011/main" val="1"/>
+              <ma14:wrappingTextBoxFlag xmlns:ma14="http://schemas.microsoft.com/office/mac/drawingml/2011/main" xmlns:a14="http://schemas.microsoft.com/office/drawing/2010/main" xmlns:m="http://schemas.openxmlformats.org/officeDocument/2006/math" xmlns="" val="1"/>
             </a:ext>
           </a:extLst>
         </p:spPr>
@@ -34345,7 +34473,7 @@
           </a:ln>
           <a:extLst>
             <a:ext uri="{C572A759-6A51-4108-AA02-DFA0A04FC94B}">
-              <ma14:wrappingTextBoxFlag xmlns="" xmlns:m="http://schemas.openxmlformats.org/officeDocument/2006/math" xmlns:a14="http://schemas.microsoft.com/office/drawing/2010/main" xmlns:ma14="http://schemas.microsoft.com/office/mac/drawingml/2011/main" val="1"/>
+              <ma14:wrappingTextBoxFlag xmlns:ma14="http://schemas.microsoft.com/office/mac/drawingml/2011/main" xmlns:a14="http://schemas.microsoft.com/office/drawing/2010/main" xmlns:m="http://schemas.openxmlformats.org/officeDocument/2006/math" xmlns="" val="1"/>
             </a:ext>
           </a:extLst>
         </p:spPr>
@@ -34384,7 +34512,7 @@
           </a:ln>
           <a:extLst>
             <a:ext uri="{C572A759-6A51-4108-AA02-DFA0A04FC94B}">
-              <ma14:wrappingTextBoxFlag xmlns="" xmlns:m="http://schemas.openxmlformats.org/officeDocument/2006/math" xmlns:a14="http://schemas.microsoft.com/office/drawing/2010/main" xmlns:ma14="http://schemas.microsoft.com/office/mac/drawingml/2011/main" val="1"/>
+              <ma14:wrappingTextBoxFlag xmlns:ma14="http://schemas.microsoft.com/office/mac/drawingml/2011/main" xmlns:a14="http://schemas.microsoft.com/office/drawing/2010/main" xmlns:m="http://schemas.openxmlformats.org/officeDocument/2006/math" xmlns="" val="1"/>
             </a:ext>
           </a:extLst>
         </p:spPr>
@@ -34423,7 +34551,7 @@
           </a:ln>
           <a:extLst>
             <a:ext uri="{C572A759-6A51-4108-AA02-DFA0A04FC94B}">
-              <ma14:wrappingTextBoxFlag xmlns="" xmlns:m="http://schemas.openxmlformats.org/officeDocument/2006/math" xmlns:a14="http://schemas.microsoft.com/office/drawing/2010/main" xmlns:ma14="http://schemas.microsoft.com/office/mac/drawingml/2011/main" val="1"/>
+              <ma14:wrappingTextBoxFlag xmlns:ma14="http://schemas.microsoft.com/office/mac/drawingml/2011/main" xmlns:a14="http://schemas.microsoft.com/office/drawing/2010/main" xmlns:m="http://schemas.openxmlformats.org/officeDocument/2006/math" xmlns="" val="1"/>
             </a:ext>
           </a:extLst>
         </p:spPr>
@@ -34462,7 +34590,7 @@
           </a:ln>
           <a:extLst>
             <a:ext uri="{C572A759-6A51-4108-AA02-DFA0A04FC94B}">
-              <ma14:wrappingTextBoxFlag xmlns="" xmlns:m="http://schemas.openxmlformats.org/officeDocument/2006/math" xmlns:a14="http://schemas.microsoft.com/office/drawing/2010/main" xmlns:ma14="http://schemas.microsoft.com/office/mac/drawingml/2011/main" val="1"/>
+              <ma14:wrappingTextBoxFlag xmlns:ma14="http://schemas.microsoft.com/office/mac/drawingml/2011/main" xmlns:a14="http://schemas.microsoft.com/office/drawing/2010/main" xmlns:m="http://schemas.openxmlformats.org/officeDocument/2006/math" xmlns="" val="1"/>
             </a:ext>
           </a:extLst>
         </p:spPr>
@@ -34501,7 +34629,7 @@
           </a:ln>
           <a:extLst>
             <a:ext uri="{C572A759-6A51-4108-AA02-DFA0A04FC94B}">
-              <ma14:wrappingTextBoxFlag xmlns="" xmlns:m="http://schemas.openxmlformats.org/officeDocument/2006/math" xmlns:a14="http://schemas.microsoft.com/office/drawing/2010/main" xmlns:ma14="http://schemas.microsoft.com/office/mac/drawingml/2011/main" val="1"/>
+              <ma14:wrappingTextBoxFlag xmlns:ma14="http://schemas.microsoft.com/office/mac/drawingml/2011/main" xmlns:a14="http://schemas.microsoft.com/office/drawing/2010/main" xmlns:m="http://schemas.openxmlformats.org/officeDocument/2006/math" xmlns="" val="1"/>
             </a:ext>
           </a:extLst>
         </p:spPr>
@@ -34548,7 +34676,7 @@
           </a:ln>
           <a:extLst>
             <a:ext uri="{C572A759-6A51-4108-AA02-DFA0A04FC94B}">
-              <ma14:wrappingTextBoxFlag xmlns="" xmlns:m="http://schemas.openxmlformats.org/officeDocument/2006/math" xmlns:a14="http://schemas.microsoft.com/office/drawing/2010/main" xmlns:ma14="http://schemas.microsoft.com/office/mac/drawingml/2011/main" val="1"/>
+              <ma14:wrappingTextBoxFlag xmlns:ma14="http://schemas.microsoft.com/office/mac/drawingml/2011/main" xmlns:a14="http://schemas.microsoft.com/office/drawing/2010/main" xmlns:m="http://schemas.openxmlformats.org/officeDocument/2006/math" xmlns="" val="1"/>
             </a:ext>
           </a:extLst>
         </p:spPr>
@@ -34595,7 +34723,7 @@
           </a:ln>
           <a:extLst>
             <a:ext uri="{C572A759-6A51-4108-AA02-DFA0A04FC94B}">
-              <ma14:wrappingTextBoxFlag xmlns="" xmlns:m="http://schemas.openxmlformats.org/officeDocument/2006/math" xmlns:a14="http://schemas.microsoft.com/office/drawing/2010/main" xmlns:ma14="http://schemas.microsoft.com/office/mac/drawingml/2011/main" val="1"/>
+              <ma14:wrappingTextBoxFlag xmlns:ma14="http://schemas.microsoft.com/office/mac/drawingml/2011/main" xmlns:a14="http://schemas.microsoft.com/office/drawing/2010/main" xmlns:m="http://schemas.openxmlformats.org/officeDocument/2006/math" xmlns="" val="1"/>
             </a:ext>
           </a:extLst>
         </p:spPr>
@@ -34669,7 +34797,7 @@
           </a:ln>
           <a:extLst>
             <a:ext uri="{C572A759-6A51-4108-AA02-DFA0A04FC94B}">
-              <ma14:wrappingTextBoxFlag xmlns="" xmlns:m="http://schemas.openxmlformats.org/officeDocument/2006/math" xmlns:a14="http://schemas.microsoft.com/office/drawing/2010/main" xmlns:ma14="http://schemas.microsoft.com/office/mac/drawingml/2011/main" val="1"/>
+              <ma14:wrappingTextBoxFlag xmlns:ma14="http://schemas.microsoft.com/office/mac/drawingml/2011/main" xmlns:a14="http://schemas.microsoft.com/office/drawing/2010/main" xmlns:m="http://schemas.openxmlformats.org/officeDocument/2006/math" xmlns="" val="1"/>
             </a:ext>
           </a:extLst>
         </p:spPr>
@@ -34705,7 +34833,7 @@
           </a:prstGeom>
           <a:extLst>
             <a:ext uri="{C572A759-6A51-4108-AA02-DFA0A04FC94B}">
-              <ma14:wrappingTextBoxFlag xmlns="" xmlns:m="http://schemas.openxmlformats.org/officeDocument/2006/math" xmlns:a14="http://schemas.microsoft.com/office/drawing/2010/main" xmlns:ma14="http://schemas.microsoft.com/office/mac/drawingml/2011/main" val="1"/>
+              <ma14:wrappingTextBoxFlag xmlns:ma14="http://schemas.microsoft.com/office/mac/drawingml/2011/main" xmlns:a14="http://schemas.microsoft.com/office/drawing/2010/main" xmlns:m="http://schemas.openxmlformats.org/officeDocument/2006/math" xmlns="" val="1"/>
             </a:ext>
           </a:extLst>
         </p:spPr>
@@ -34798,7 +34926,7 @@
           </a:ln>
           <a:extLst>
             <a:ext uri="{C572A759-6A51-4108-AA02-DFA0A04FC94B}">
-              <ma14:wrappingTextBoxFlag xmlns="" xmlns:m="http://schemas.openxmlformats.org/officeDocument/2006/math" xmlns:a14="http://schemas.microsoft.com/office/drawing/2010/main" xmlns:ma14="http://schemas.microsoft.com/office/mac/drawingml/2011/main" val="1"/>
+              <ma14:wrappingTextBoxFlag xmlns:ma14="http://schemas.microsoft.com/office/mac/drawingml/2011/main" xmlns:a14="http://schemas.microsoft.com/office/drawing/2010/main" xmlns:m="http://schemas.openxmlformats.org/officeDocument/2006/math" xmlns="" val="1"/>
             </a:ext>
           </a:extLst>
         </p:spPr>
@@ -34841,7 +34969,7 @@
           </a:ln>
           <a:extLst>
             <a:ext uri="{C572A759-6A51-4108-AA02-DFA0A04FC94B}">
-              <ma14:wrappingTextBoxFlag xmlns="" xmlns:m="http://schemas.openxmlformats.org/officeDocument/2006/math" xmlns:a14="http://schemas.microsoft.com/office/drawing/2010/main" xmlns:ma14="http://schemas.microsoft.com/office/mac/drawingml/2011/main" val="1"/>
+              <ma14:wrappingTextBoxFlag xmlns:ma14="http://schemas.microsoft.com/office/mac/drawingml/2011/main" xmlns:a14="http://schemas.microsoft.com/office/drawing/2010/main" xmlns:m="http://schemas.openxmlformats.org/officeDocument/2006/math" xmlns="" val="1"/>
             </a:ext>
           </a:extLst>
         </p:spPr>
@@ -34884,7 +35012,7 @@
           </a:ln>
           <a:extLst>
             <a:ext uri="{C572A759-6A51-4108-AA02-DFA0A04FC94B}">
-              <ma14:wrappingTextBoxFlag xmlns="" xmlns:m="http://schemas.openxmlformats.org/officeDocument/2006/math" xmlns:a14="http://schemas.microsoft.com/office/drawing/2010/main" xmlns:ma14="http://schemas.microsoft.com/office/mac/drawingml/2011/main" val="1"/>
+              <ma14:wrappingTextBoxFlag xmlns:ma14="http://schemas.microsoft.com/office/mac/drawingml/2011/main" xmlns:a14="http://schemas.microsoft.com/office/drawing/2010/main" xmlns:m="http://schemas.openxmlformats.org/officeDocument/2006/math" xmlns="" val="1"/>
             </a:ext>
           </a:extLst>
         </p:spPr>
@@ -34927,7 +35055,7 @@
           </a:ln>
           <a:extLst>
             <a:ext uri="{C572A759-6A51-4108-AA02-DFA0A04FC94B}">
-              <ma14:wrappingTextBoxFlag xmlns="" xmlns:m="http://schemas.openxmlformats.org/officeDocument/2006/math" xmlns:a14="http://schemas.microsoft.com/office/drawing/2010/main" xmlns:ma14="http://schemas.microsoft.com/office/mac/drawingml/2011/main" val="1"/>
+              <ma14:wrappingTextBoxFlag xmlns:ma14="http://schemas.microsoft.com/office/mac/drawingml/2011/main" xmlns:a14="http://schemas.microsoft.com/office/drawing/2010/main" xmlns:m="http://schemas.openxmlformats.org/officeDocument/2006/math" xmlns="" val="1"/>
             </a:ext>
           </a:extLst>
         </p:spPr>
@@ -34970,7 +35098,7 @@
           </a:ln>
           <a:extLst>
             <a:ext uri="{C572A759-6A51-4108-AA02-DFA0A04FC94B}">
-              <ma14:wrappingTextBoxFlag xmlns="" xmlns:m="http://schemas.openxmlformats.org/officeDocument/2006/math" xmlns:a14="http://schemas.microsoft.com/office/drawing/2010/main" xmlns:ma14="http://schemas.microsoft.com/office/mac/drawingml/2011/main" val="1"/>
+              <ma14:wrappingTextBoxFlag xmlns:ma14="http://schemas.microsoft.com/office/mac/drawingml/2011/main" xmlns:a14="http://schemas.microsoft.com/office/drawing/2010/main" xmlns:m="http://schemas.openxmlformats.org/officeDocument/2006/math" xmlns="" val="1"/>
             </a:ext>
           </a:extLst>
         </p:spPr>
@@ -35243,7 +35371,7 @@
           </a:ln>
           <a:extLst>
             <a:ext uri="{C572A759-6A51-4108-AA02-DFA0A04FC94B}">
-              <ma14:wrappingTextBoxFlag xmlns="" xmlns:m="http://schemas.openxmlformats.org/officeDocument/2006/math" xmlns:a14="http://schemas.microsoft.com/office/drawing/2010/main" xmlns:ma14="http://schemas.microsoft.com/office/mac/drawingml/2011/main" val="1"/>
+              <ma14:wrappingTextBoxFlag xmlns:ma14="http://schemas.microsoft.com/office/mac/drawingml/2011/main" xmlns:a14="http://schemas.microsoft.com/office/drawing/2010/main" xmlns:m="http://schemas.openxmlformats.org/officeDocument/2006/math" xmlns="" val="1"/>
             </a:ext>
           </a:extLst>
         </p:spPr>
@@ -35389,7 +35517,7 @@
           </a:ln>
           <a:extLst>
             <a:ext uri="{C572A759-6A51-4108-AA02-DFA0A04FC94B}">
-              <ma14:wrappingTextBoxFlag xmlns="" xmlns:m="http://schemas.openxmlformats.org/officeDocument/2006/math" xmlns:a14="http://schemas.microsoft.com/office/drawing/2010/main" xmlns:ma14="http://schemas.microsoft.com/office/mac/drawingml/2011/main" val="1"/>
+              <ma14:wrappingTextBoxFlag xmlns:ma14="http://schemas.microsoft.com/office/mac/drawingml/2011/main" xmlns:a14="http://schemas.microsoft.com/office/drawing/2010/main" xmlns:m="http://schemas.openxmlformats.org/officeDocument/2006/math" xmlns="" val="1"/>
             </a:ext>
           </a:extLst>
         </p:spPr>
@@ -35645,7 +35773,7 @@
           </a:ln>
           <a:extLst>
             <a:ext uri="{C572A759-6A51-4108-AA02-DFA0A04FC94B}">
-              <ma14:wrappingTextBoxFlag xmlns="" xmlns:m="http://schemas.openxmlformats.org/officeDocument/2006/math" xmlns:a14="http://schemas.microsoft.com/office/drawing/2010/main" xmlns:ma14="http://schemas.microsoft.com/office/mac/drawingml/2011/main" val="1"/>
+              <ma14:wrappingTextBoxFlag xmlns:ma14="http://schemas.microsoft.com/office/mac/drawingml/2011/main" xmlns:a14="http://schemas.microsoft.com/office/drawing/2010/main" xmlns:m="http://schemas.openxmlformats.org/officeDocument/2006/math" xmlns="" val="1"/>
             </a:ext>
           </a:extLst>
         </p:spPr>
@@ -35684,7 +35812,7 @@
           </a:ln>
           <a:extLst>
             <a:ext uri="{C572A759-6A51-4108-AA02-DFA0A04FC94B}">
-              <ma14:wrappingTextBoxFlag xmlns="" xmlns:m="http://schemas.openxmlformats.org/officeDocument/2006/math" xmlns:a14="http://schemas.microsoft.com/office/drawing/2010/main" xmlns:ma14="http://schemas.microsoft.com/office/mac/drawingml/2011/main" val="1"/>
+              <ma14:wrappingTextBoxFlag xmlns:ma14="http://schemas.microsoft.com/office/mac/drawingml/2011/main" xmlns:a14="http://schemas.microsoft.com/office/drawing/2010/main" xmlns:m="http://schemas.openxmlformats.org/officeDocument/2006/math" xmlns="" val="1"/>
             </a:ext>
           </a:extLst>
         </p:spPr>
@@ -35788,7 +35916,7 @@
           </a:ln>
           <a:extLst>
             <a:ext uri="{C572A759-6A51-4108-AA02-DFA0A04FC94B}">
-              <ma14:wrappingTextBoxFlag xmlns="" xmlns:m="http://schemas.openxmlformats.org/officeDocument/2006/math" xmlns:a14="http://schemas.microsoft.com/office/drawing/2010/main" xmlns:ma14="http://schemas.microsoft.com/office/mac/drawingml/2011/main" val="1"/>
+              <ma14:wrappingTextBoxFlag xmlns:ma14="http://schemas.microsoft.com/office/mac/drawingml/2011/main" xmlns:a14="http://schemas.microsoft.com/office/drawing/2010/main" xmlns:m="http://schemas.openxmlformats.org/officeDocument/2006/math" xmlns="" val="1"/>
             </a:ext>
           </a:extLst>
         </p:spPr>
@@ -35863,7 +35991,7 @@
           </a:ln>
           <a:extLst>
             <a:ext uri="{C572A759-6A51-4108-AA02-DFA0A04FC94B}">
-              <ma14:wrappingTextBoxFlag xmlns="" xmlns:m="http://schemas.openxmlformats.org/officeDocument/2006/math" xmlns:a14="http://schemas.microsoft.com/office/drawing/2010/main" xmlns:ma14="http://schemas.microsoft.com/office/mac/drawingml/2011/main" val="1"/>
+              <ma14:wrappingTextBoxFlag xmlns:ma14="http://schemas.microsoft.com/office/mac/drawingml/2011/main" xmlns:a14="http://schemas.microsoft.com/office/drawing/2010/main" xmlns:m="http://schemas.openxmlformats.org/officeDocument/2006/math" xmlns="" val="1"/>
             </a:ext>
           </a:extLst>
         </p:spPr>
@@ -35902,7 +36030,7 @@
           </a:ln>
           <a:extLst>
             <a:ext uri="{C572A759-6A51-4108-AA02-DFA0A04FC94B}">
-              <ma14:wrappingTextBoxFlag xmlns="" xmlns:m="http://schemas.openxmlformats.org/officeDocument/2006/math" xmlns:a14="http://schemas.microsoft.com/office/drawing/2010/main" xmlns:ma14="http://schemas.microsoft.com/office/mac/drawingml/2011/main" val="1"/>
+              <ma14:wrappingTextBoxFlag xmlns:ma14="http://schemas.microsoft.com/office/mac/drawingml/2011/main" xmlns:a14="http://schemas.microsoft.com/office/drawing/2010/main" xmlns:m="http://schemas.openxmlformats.org/officeDocument/2006/math" xmlns="" val="1"/>
             </a:ext>
           </a:extLst>
         </p:spPr>
@@ -35941,7 +36069,7 @@
           </a:ln>
           <a:extLst>
             <a:ext uri="{C572A759-6A51-4108-AA02-DFA0A04FC94B}">
-              <ma14:wrappingTextBoxFlag xmlns="" xmlns:m="http://schemas.openxmlformats.org/officeDocument/2006/math" xmlns:a14="http://schemas.microsoft.com/office/drawing/2010/main" xmlns:ma14="http://schemas.microsoft.com/office/mac/drawingml/2011/main" val="1"/>
+              <ma14:wrappingTextBoxFlag xmlns:ma14="http://schemas.microsoft.com/office/mac/drawingml/2011/main" xmlns:a14="http://schemas.microsoft.com/office/drawing/2010/main" xmlns:m="http://schemas.openxmlformats.org/officeDocument/2006/math" xmlns="" val="1"/>
             </a:ext>
           </a:extLst>
         </p:spPr>
@@ -35980,7 +36108,7 @@
           </a:ln>
           <a:extLst>
             <a:ext uri="{C572A759-6A51-4108-AA02-DFA0A04FC94B}">
-              <ma14:wrappingTextBoxFlag xmlns="" xmlns:m="http://schemas.openxmlformats.org/officeDocument/2006/math" xmlns:a14="http://schemas.microsoft.com/office/drawing/2010/main" xmlns:ma14="http://schemas.microsoft.com/office/mac/drawingml/2011/main" val="1"/>
+              <ma14:wrappingTextBoxFlag xmlns:ma14="http://schemas.microsoft.com/office/mac/drawingml/2011/main" xmlns:a14="http://schemas.microsoft.com/office/drawing/2010/main" xmlns:m="http://schemas.openxmlformats.org/officeDocument/2006/math" xmlns="" val="1"/>
             </a:ext>
           </a:extLst>
         </p:spPr>
@@ -36019,7 +36147,7 @@
           </a:ln>
           <a:extLst>
             <a:ext uri="{C572A759-6A51-4108-AA02-DFA0A04FC94B}">
-              <ma14:wrappingTextBoxFlag xmlns="" xmlns:m="http://schemas.openxmlformats.org/officeDocument/2006/math" xmlns:a14="http://schemas.microsoft.com/office/drawing/2010/main" xmlns:ma14="http://schemas.microsoft.com/office/mac/drawingml/2011/main" val="1"/>
+              <ma14:wrappingTextBoxFlag xmlns:ma14="http://schemas.microsoft.com/office/mac/drawingml/2011/main" xmlns:a14="http://schemas.microsoft.com/office/drawing/2010/main" xmlns:m="http://schemas.openxmlformats.org/officeDocument/2006/math" xmlns="" val="1"/>
             </a:ext>
           </a:extLst>
         </p:spPr>
@@ -36058,7 +36186,7 @@
           </a:ln>
           <a:extLst>
             <a:ext uri="{C572A759-6A51-4108-AA02-DFA0A04FC94B}">
-              <ma14:wrappingTextBoxFlag xmlns="" xmlns:m="http://schemas.openxmlformats.org/officeDocument/2006/math" xmlns:a14="http://schemas.microsoft.com/office/drawing/2010/main" xmlns:ma14="http://schemas.microsoft.com/office/mac/drawingml/2011/main" val="1"/>
+              <ma14:wrappingTextBoxFlag xmlns:ma14="http://schemas.microsoft.com/office/mac/drawingml/2011/main" xmlns:a14="http://schemas.microsoft.com/office/drawing/2010/main" xmlns:m="http://schemas.openxmlformats.org/officeDocument/2006/math" xmlns="" val="1"/>
             </a:ext>
           </a:extLst>
         </p:spPr>
@@ -36105,7 +36233,7 @@
           </a:ln>
           <a:extLst>
             <a:ext uri="{C572A759-6A51-4108-AA02-DFA0A04FC94B}">
-              <ma14:wrappingTextBoxFlag xmlns="" xmlns:m="http://schemas.openxmlformats.org/officeDocument/2006/math" xmlns:a14="http://schemas.microsoft.com/office/drawing/2010/main" xmlns:ma14="http://schemas.microsoft.com/office/mac/drawingml/2011/main" val="1"/>
+              <ma14:wrappingTextBoxFlag xmlns:ma14="http://schemas.microsoft.com/office/mac/drawingml/2011/main" xmlns:a14="http://schemas.microsoft.com/office/drawing/2010/main" xmlns:m="http://schemas.openxmlformats.org/officeDocument/2006/math" xmlns="" val="1"/>
             </a:ext>
           </a:extLst>
         </p:spPr>
@@ -36152,7 +36280,7 @@
           </a:ln>
           <a:extLst>
             <a:ext uri="{C572A759-6A51-4108-AA02-DFA0A04FC94B}">
-              <ma14:wrappingTextBoxFlag xmlns="" xmlns:m="http://schemas.openxmlformats.org/officeDocument/2006/math" xmlns:a14="http://schemas.microsoft.com/office/drawing/2010/main" xmlns:ma14="http://schemas.microsoft.com/office/mac/drawingml/2011/main" val="1"/>
+              <ma14:wrappingTextBoxFlag xmlns:ma14="http://schemas.microsoft.com/office/mac/drawingml/2011/main" xmlns:a14="http://schemas.microsoft.com/office/drawing/2010/main" xmlns:m="http://schemas.openxmlformats.org/officeDocument/2006/math" xmlns="" val="1"/>
             </a:ext>
           </a:extLst>
         </p:spPr>
@@ -36226,7 +36354,7 @@
           </a:ln>
           <a:extLst>
             <a:ext uri="{C572A759-6A51-4108-AA02-DFA0A04FC94B}">
-              <ma14:wrappingTextBoxFlag xmlns="" xmlns:m="http://schemas.openxmlformats.org/officeDocument/2006/math" xmlns:a14="http://schemas.microsoft.com/office/drawing/2010/main" xmlns:ma14="http://schemas.microsoft.com/office/mac/drawingml/2011/main" val="1"/>
+              <ma14:wrappingTextBoxFlag xmlns:ma14="http://schemas.microsoft.com/office/mac/drawingml/2011/main" xmlns:a14="http://schemas.microsoft.com/office/drawing/2010/main" xmlns:m="http://schemas.openxmlformats.org/officeDocument/2006/math" xmlns="" val="1"/>
             </a:ext>
           </a:extLst>
         </p:spPr>
@@ -36262,7 +36390,7 @@
           </a:prstGeom>
           <a:extLst>
             <a:ext uri="{C572A759-6A51-4108-AA02-DFA0A04FC94B}">
-              <ma14:wrappingTextBoxFlag xmlns="" xmlns:m="http://schemas.openxmlformats.org/officeDocument/2006/math" xmlns:a14="http://schemas.microsoft.com/office/drawing/2010/main" xmlns:ma14="http://schemas.microsoft.com/office/mac/drawingml/2011/main" val="1"/>
+              <ma14:wrappingTextBoxFlag xmlns:ma14="http://schemas.microsoft.com/office/mac/drawingml/2011/main" xmlns:a14="http://schemas.microsoft.com/office/drawing/2010/main" xmlns:m="http://schemas.openxmlformats.org/officeDocument/2006/math" xmlns="" val="1"/>
             </a:ext>
           </a:extLst>
         </p:spPr>
@@ -36355,7 +36483,7 @@
           </a:ln>
           <a:extLst>
             <a:ext uri="{C572A759-6A51-4108-AA02-DFA0A04FC94B}">
-              <ma14:wrappingTextBoxFlag xmlns="" xmlns:m="http://schemas.openxmlformats.org/officeDocument/2006/math" xmlns:a14="http://schemas.microsoft.com/office/drawing/2010/main" xmlns:ma14="http://schemas.microsoft.com/office/mac/drawingml/2011/main" val="1"/>
+              <ma14:wrappingTextBoxFlag xmlns:ma14="http://schemas.microsoft.com/office/mac/drawingml/2011/main" xmlns:a14="http://schemas.microsoft.com/office/drawing/2010/main" xmlns:m="http://schemas.openxmlformats.org/officeDocument/2006/math" xmlns="" val="1"/>
             </a:ext>
           </a:extLst>
         </p:spPr>
@@ -36398,7 +36526,7 @@
           </a:ln>
           <a:extLst>
             <a:ext uri="{C572A759-6A51-4108-AA02-DFA0A04FC94B}">
-              <ma14:wrappingTextBoxFlag xmlns="" xmlns:m="http://schemas.openxmlformats.org/officeDocument/2006/math" xmlns:a14="http://schemas.microsoft.com/office/drawing/2010/main" xmlns:ma14="http://schemas.microsoft.com/office/mac/drawingml/2011/main" val="1"/>
+              <ma14:wrappingTextBoxFlag xmlns:ma14="http://schemas.microsoft.com/office/mac/drawingml/2011/main" xmlns:a14="http://schemas.microsoft.com/office/drawing/2010/main" xmlns:m="http://schemas.openxmlformats.org/officeDocument/2006/math" xmlns="" val="1"/>
             </a:ext>
           </a:extLst>
         </p:spPr>
@@ -36441,7 +36569,7 @@
           </a:ln>
           <a:extLst>
             <a:ext uri="{C572A759-6A51-4108-AA02-DFA0A04FC94B}">
-              <ma14:wrappingTextBoxFlag xmlns="" xmlns:m="http://schemas.openxmlformats.org/officeDocument/2006/math" xmlns:a14="http://schemas.microsoft.com/office/drawing/2010/main" xmlns:ma14="http://schemas.microsoft.com/office/mac/drawingml/2011/main" val="1"/>
+              <ma14:wrappingTextBoxFlag xmlns:ma14="http://schemas.microsoft.com/office/mac/drawingml/2011/main" xmlns:a14="http://schemas.microsoft.com/office/drawing/2010/main" xmlns:m="http://schemas.openxmlformats.org/officeDocument/2006/math" xmlns="" val="1"/>
             </a:ext>
           </a:extLst>
         </p:spPr>
@@ -36484,7 +36612,7 @@
           </a:ln>
           <a:extLst>
             <a:ext uri="{C572A759-6A51-4108-AA02-DFA0A04FC94B}">
-              <ma14:wrappingTextBoxFlag xmlns="" xmlns:m="http://schemas.openxmlformats.org/officeDocument/2006/math" xmlns:a14="http://schemas.microsoft.com/office/drawing/2010/main" xmlns:ma14="http://schemas.microsoft.com/office/mac/drawingml/2011/main" val="1"/>
+              <ma14:wrappingTextBoxFlag xmlns:ma14="http://schemas.microsoft.com/office/mac/drawingml/2011/main" xmlns:a14="http://schemas.microsoft.com/office/drawing/2010/main" xmlns:m="http://schemas.openxmlformats.org/officeDocument/2006/math" xmlns="" val="1"/>
             </a:ext>
           </a:extLst>
         </p:spPr>
@@ -36527,7 +36655,7 @@
           </a:ln>
           <a:extLst>
             <a:ext uri="{C572A759-6A51-4108-AA02-DFA0A04FC94B}">
-              <ma14:wrappingTextBoxFlag xmlns="" xmlns:m="http://schemas.openxmlformats.org/officeDocument/2006/math" xmlns:a14="http://schemas.microsoft.com/office/drawing/2010/main" xmlns:ma14="http://schemas.microsoft.com/office/mac/drawingml/2011/main" val="1"/>
+              <ma14:wrappingTextBoxFlag xmlns:ma14="http://schemas.microsoft.com/office/mac/drawingml/2011/main" xmlns:a14="http://schemas.microsoft.com/office/drawing/2010/main" xmlns:m="http://schemas.openxmlformats.org/officeDocument/2006/math" xmlns="" val="1"/>
             </a:ext>
           </a:extLst>
         </p:spPr>
@@ -36728,7 +36856,7 @@
           </a:ln>
           <a:extLst>
             <a:ext uri="{C572A759-6A51-4108-AA02-DFA0A04FC94B}">
-              <ma14:wrappingTextBoxFlag xmlns="" xmlns:m="http://schemas.openxmlformats.org/officeDocument/2006/math" xmlns:a14="http://schemas.microsoft.com/office/drawing/2010/main" xmlns:ma14="http://schemas.microsoft.com/office/mac/drawingml/2011/main" val="1"/>
+              <ma14:wrappingTextBoxFlag xmlns:ma14="http://schemas.microsoft.com/office/mac/drawingml/2011/main" xmlns:a14="http://schemas.microsoft.com/office/drawing/2010/main" xmlns:m="http://schemas.openxmlformats.org/officeDocument/2006/math" xmlns="" val="1"/>
             </a:ext>
           </a:extLst>
         </p:spPr>
@@ -36872,7 +37000,7 @@
           </a:ln>
           <a:extLst>
             <a:ext uri="{C572A759-6A51-4108-AA02-DFA0A04FC94B}">
-              <ma14:wrappingTextBoxFlag xmlns="" xmlns:m="http://schemas.openxmlformats.org/officeDocument/2006/math" xmlns:a14="http://schemas.microsoft.com/office/drawing/2010/main" xmlns:ma14="http://schemas.microsoft.com/office/mac/drawingml/2011/main" val="1"/>
+              <ma14:wrappingTextBoxFlag xmlns:ma14="http://schemas.microsoft.com/office/mac/drawingml/2011/main" xmlns:a14="http://schemas.microsoft.com/office/drawing/2010/main" xmlns:m="http://schemas.openxmlformats.org/officeDocument/2006/math" xmlns="" val="1"/>
             </a:ext>
           </a:extLst>
         </p:spPr>
@@ -36935,7 +37063,7 @@
           </a:prstGeom>
           <a:extLst>
             <a:ext uri="{C572A759-6A51-4108-AA02-DFA0A04FC94B}">
-              <ma14:wrappingTextBoxFlag xmlns="" xmlns:m="http://schemas.openxmlformats.org/officeDocument/2006/math" xmlns:a14="http://schemas.microsoft.com/office/drawing/2010/main" xmlns:ma14="http://schemas.microsoft.com/office/mac/drawingml/2011/main" val="1"/>
+              <ma14:wrappingTextBoxFlag xmlns:ma14="http://schemas.microsoft.com/office/mac/drawingml/2011/main" xmlns:a14="http://schemas.microsoft.com/office/drawing/2010/main" xmlns:m="http://schemas.openxmlformats.org/officeDocument/2006/math" xmlns="" val="1"/>
             </a:ext>
           </a:extLst>
         </p:spPr>
@@ -36973,7 +37101,7 @@
           </a:ln>
           <a:extLst>
             <a:ext uri="{C572A759-6A51-4108-AA02-DFA0A04FC94B}">
-              <ma14:wrappingTextBoxFlag xmlns="" xmlns:m="http://schemas.openxmlformats.org/officeDocument/2006/math" xmlns:a14="http://schemas.microsoft.com/office/drawing/2010/main" xmlns:ma14="http://schemas.microsoft.com/office/mac/drawingml/2011/main" val="1"/>
+              <ma14:wrappingTextBoxFlag xmlns:ma14="http://schemas.microsoft.com/office/mac/drawingml/2011/main" xmlns:a14="http://schemas.microsoft.com/office/drawing/2010/main" xmlns:m="http://schemas.openxmlformats.org/officeDocument/2006/math" xmlns="" val="1"/>
             </a:ext>
           </a:extLst>
         </p:spPr>
@@ -37016,7 +37144,7 @@
           </a:ln>
           <a:extLst>
             <a:ext uri="{C572A759-6A51-4108-AA02-DFA0A04FC94B}">
-              <ma14:wrappingTextBoxFlag xmlns="" xmlns:m="http://schemas.openxmlformats.org/officeDocument/2006/math" xmlns:a14="http://schemas.microsoft.com/office/drawing/2010/main" xmlns:ma14="http://schemas.microsoft.com/office/mac/drawingml/2011/main" val="1"/>
+              <ma14:wrappingTextBoxFlag xmlns:ma14="http://schemas.microsoft.com/office/mac/drawingml/2011/main" xmlns:a14="http://schemas.microsoft.com/office/drawing/2010/main" xmlns:m="http://schemas.openxmlformats.org/officeDocument/2006/math" xmlns="" val="1"/>
             </a:ext>
           </a:extLst>
         </p:spPr>
@@ -37241,7 +37369,7 @@
           </a:prstGeom>
           <a:extLst>
             <a:ext uri="{C572A759-6A51-4108-AA02-DFA0A04FC94B}">
-              <ma14:wrappingTextBoxFlag xmlns="" xmlns:m="http://schemas.openxmlformats.org/officeDocument/2006/math" xmlns:a14="http://schemas.microsoft.com/office/drawing/2010/main" xmlns:ma14="http://schemas.microsoft.com/office/mac/drawingml/2011/main" val="1"/>
+              <ma14:wrappingTextBoxFlag xmlns:ma14="http://schemas.microsoft.com/office/mac/drawingml/2011/main" xmlns:a14="http://schemas.microsoft.com/office/drawing/2010/main" xmlns:m="http://schemas.openxmlformats.org/officeDocument/2006/math" xmlns="" val="1"/>
             </a:ext>
           </a:extLst>
         </p:spPr>
@@ -37275,7 +37403,7 @@
           </a:ln>
           <a:extLst>
             <a:ext uri="{C572A759-6A51-4108-AA02-DFA0A04FC94B}">
-              <ma14:wrappingTextBoxFlag xmlns="" xmlns:m="http://schemas.openxmlformats.org/officeDocument/2006/math" xmlns:a14="http://schemas.microsoft.com/office/drawing/2010/main" xmlns:ma14="http://schemas.microsoft.com/office/mac/drawingml/2011/main" val="1"/>
+              <ma14:wrappingTextBoxFlag xmlns:ma14="http://schemas.microsoft.com/office/mac/drawingml/2011/main" xmlns:a14="http://schemas.microsoft.com/office/drawing/2010/main" xmlns:m="http://schemas.openxmlformats.org/officeDocument/2006/math" xmlns="" val="1"/>
             </a:ext>
           </a:extLst>
         </p:spPr>
@@ -37450,7 +37578,7 @@
           </a:prstGeom>
           <a:extLst>
             <a:ext uri="{C572A759-6A51-4108-AA02-DFA0A04FC94B}">
-              <ma14:wrappingTextBoxFlag xmlns="" xmlns:m="http://schemas.openxmlformats.org/officeDocument/2006/math" xmlns:a14="http://schemas.microsoft.com/office/drawing/2010/main" xmlns:ma14="http://schemas.microsoft.com/office/mac/drawingml/2011/main" val="1"/>
+              <ma14:wrappingTextBoxFlag xmlns:ma14="http://schemas.microsoft.com/office/mac/drawingml/2011/main" xmlns:a14="http://schemas.microsoft.com/office/drawing/2010/main" xmlns:m="http://schemas.openxmlformats.org/officeDocument/2006/math" xmlns="" val="1"/>
             </a:ext>
           </a:extLst>
         </p:spPr>
@@ -37484,7 +37612,7 @@
           </a:ln>
           <a:extLst>
             <a:ext uri="{C572A759-6A51-4108-AA02-DFA0A04FC94B}">
-              <ma14:wrappingTextBoxFlag xmlns="" xmlns:m="http://schemas.openxmlformats.org/officeDocument/2006/math" xmlns:a14="http://schemas.microsoft.com/office/drawing/2010/main" xmlns:ma14="http://schemas.microsoft.com/office/mac/drawingml/2011/main" val="1"/>
+              <ma14:wrappingTextBoxFlag xmlns:ma14="http://schemas.microsoft.com/office/mac/drawingml/2011/main" xmlns:a14="http://schemas.microsoft.com/office/drawing/2010/main" xmlns:m="http://schemas.openxmlformats.org/officeDocument/2006/math" xmlns="" val="1"/>
             </a:ext>
           </a:extLst>
         </p:spPr>
@@ -37624,7 +37752,7 @@
           </a:prstGeom>
           <a:extLst>
             <a:ext uri="{C572A759-6A51-4108-AA02-DFA0A04FC94B}">
-              <ma14:wrappingTextBoxFlag xmlns="" xmlns:m="http://schemas.openxmlformats.org/officeDocument/2006/math" xmlns:a14="http://schemas.microsoft.com/office/drawing/2010/main" xmlns:ma14="http://schemas.microsoft.com/office/mac/drawingml/2011/main" val="1"/>
+              <ma14:wrappingTextBoxFlag xmlns:ma14="http://schemas.microsoft.com/office/mac/drawingml/2011/main" xmlns:a14="http://schemas.microsoft.com/office/drawing/2010/main" xmlns:m="http://schemas.openxmlformats.org/officeDocument/2006/math" xmlns="" val="1"/>
             </a:ext>
           </a:extLst>
         </p:spPr>
@@ -37658,7 +37786,7 @@
           </a:ln>
           <a:extLst>
             <a:ext uri="{C572A759-6A51-4108-AA02-DFA0A04FC94B}">
-              <ma14:wrappingTextBoxFlag xmlns="" xmlns:m="http://schemas.openxmlformats.org/officeDocument/2006/math" xmlns:a14="http://schemas.microsoft.com/office/drawing/2010/main" xmlns:ma14="http://schemas.microsoft.com/office/mac/drawingml/2011/main" val="1"/>
+              <ma14:wrappingTextBoxFlag xmlns:ma14="http://schemas.microsoft.com/office/mac/drawingml/2011/main" xmlns:a14="http://schemas.microsoft.com/office/drawing/2010/main" xmlns:m="http://schemas.openxmlformats.org/officeDocument/2006/math" xmlns="" val="1"/>
             </a:ext>
           </a:extLst>
         </p:spPr>
@@ -37802,7 +37930,7 @@
           </a:ln>
           <a:extLst>
             <a:ext uri="{C572A759-6A51-4108-AA02-DFA0A04FC94B}">
-              <ma14:wrappingTextBoxFlag xmlns="" xmlns:m="http://schemas.openxmlformats.org/officeDocument/2006/math" xmlns:a14="http://schemas.microsoft.com/office/drawing/2010/main" xmlns:ma14="http://schemas.microsoft.com/office/mac/drawingml/2011/main" val="1"/>
+              <ma14:wrappingTextBoxFlag xmlns:ma14="http://schemas.microsoft.com/office/mac/drawingml/2011/main" xmlns:a14="http://schemas.microsoft.com/office/drawing/2010/main" xmlns:m="http://schemas.openxmlformats.org/officeDocument/2006/math" xmlns="" val="1"/>
             </a:ext>
           </a:extLst>
         </p:spPr>
@@ -37891,7 +38019,7 @@
           </a:prstGeom>
           <a:extLst>
             <a:ext uri="{C572A759-6A51-4108-AA02-DFA0A04FC94B}">
-              <ma14:wrappingTextBoxFlag xmlns="" xmlns:m="http://schemas.openxmlformats.org/officeDocument/2006/math" xmlns:a14="http://schemas.microsoft.com/office/drawing/2010/main" xmlns:ma14="http://schemas.microsoft.com/office/mac/drawingml/2011/main" val="1"/>
+              <ma14:wrappingTextBoxFlag xmlns:ma14="http://schemas.microsoft.com/office/mac/drawingml/2011/main" xmlns:a14="http://schemas.microsoft.com/office/drawing/2010/main" xmlns:m="http://schemas.openxmlformats.org/officeDocument/2006/math" xmlns="" val="1"/>
             </a:ext>
           </a:extLst>
         </p:spPr>
@@ -37925,7 +38053,7 @@
           </a:ln>
           <a:extLst>
             <a:ext uri="{C572A759-6A51-4108-AA02-DFA0A04FC94B}">
-              <ma14:wrappingTextBoxFlag xmlns="" xmlns:m="http://schemas.openxmlformats.org/officeDocument/2006/math" xmlns:a14="http://schemas.microsoft.com/office/drawing/2010/main" xmlns:ma14="http://schemas.microsoft.com/office/mac/drawingml/2011/main" val="1"/>
+              <ma14:wrappingTextBoxFlag xmlns:ma14="http://schemas.microsoft.com/office/mac/drawingml/2011/main" xmlns:a14="http://schemas.microsoft.com/office/drawing/2010/main" xmlns:m="http://schemas.openxmlformats.org/officeDocument/2006/math" xmlns="" val="1"/>
             </a:ext>
           </a:extLst>
         </p:spPr>
@@ -37967,7 +38095,7 @@
           </a:ln>
           <a:extLst>
             <a:ext uri="{C572A759-6A51-4108-AA02-DFA0A04FC94B}">
-              <ma14:wrappingTextBoxFlag xmlns="" xmlns:m="http://schemas.openxmlformats.org/officeDocument/2006/math" xmlns:a14="http://schemas.microsoft.com/office/drawing/2010/main" xmlns:ma14="http://schemas.microsoft.com/office/mac/drawingml/2011/main" val="1"/>
+              <ma14:wrappingTextBoxFlag xmlns:ma14="http://schemas.microsoft.com/office/mac/drawingml/2011/main" xmlns:a14="http://schemas.microsoft.com/office/drawing/2010/main" xmlns:m="http://schemas.openxmlformats.org/officeDocument/2006/math" xmlns="" val="1"/>
             </a:ext>
           </a:extLst>
         </p:spPr>
@@ -38010,7 +38138,7 @@
           </a:ln>
           <a:extLst>
             <a:ext uri="{C572A759-6A51-4108-AA02-DFA0A04FC94B}">
-              <ma14:wrappingTextBoxFlag xmlns="" xmlns:m="http://schemas.openxmlformats.org/officeDocument/2006/math" xmlns:a14="http://schemas.microsoft.com/office/drawing/2010/main" xmlns:ma14="http://schemas.microsoft.com/office/mac/drawingml/2011/main" val="1"/>
+              <ma14:wrappingTextBoxFlag xmlns:ma14="http://schemas.microsoft.com/office/mac/drawingml/2011/main" xmlns:a14="http://schemas.microsoft.com/office/drawing/2010/main" xmlns:m="http://schemas.openxmlformats.org/officeDocument/2006/math" xmlns="" val="1"/>
             </a:ext>
           </a:extLst>
         </p:spPr>
@@ -38049,7 +38177,7 @@
           </a:ln>
           <a:extLst>
             <a:ext uri="{C572A759-6A51-4108-AA02-DFA0A04FC94B}">
-              <ma14:wrappingTextBoxFlag xmlns="" xmlns:m="http://schemas.openxmlformats.org/officeDocument/2006/math" xmlns:a14="http://schemas.microsoft.com/office/drawing/2010/main" xmlns:ma14="http://schemas.microsoft.com/office/mac/drawingml/2011/main" val="1"/>
+              <ma14:wrappingTextBoxFlag xmlns:ma14="http://schemas.microsoft.com/office/mac/drawingml/2011/main" xmlns:a14="http://schemas.microsoft.com/office/drawing/2010/main" xmlns:m="http://schemas.openxmlformats.org/officeDocument/2006/math" xmlns="" val="1"/>
             </a:ext>
           </a:extLst>
         </p:spPr>
@@ -38149,7 +38277,7 @@
           </a:prstGeom>
           <a:extLst>
             <a:ext uri="{C572A759-6A51-4108-AA02-DFA0A04FC94B}">
-              <ma14:wrappingTextBoxFlag xmlns="" xmlns:m="http://schemas.openxmlformats.org/officeDocument/2006/math" xmlns:a14="http://schemas.microsoft.com/office/drawing/2010/main" xmlns:ma14="http://schemas.microsoft.com/office/mac/drawingml/2011/main" val="1"/>
+              <ma14:wrappingTextBoxFlag xmlns:ma14="http://schemas.microsoft.com/office/mac/drawingml/2011/main" xmlns:a14="http://schemas.microsoft.com/office/drawing/2010/main" xmlns:m="http://schemas.openxmlformats.org/officeDocument/2006/math" xmlns="" val="1"/>
             </a:ext>
           </a:extLst>
         </p:spPr>
@@ -38183,7 +38311,7 @@
           </a:ln>
           <a:extLst>
             <a:ext uri="{C572A759-6A51-4108-AA02-DFA0A04FC94B}">
-              <ma14:wrappingTextBoxFlag xmlns="" xmlns:m="http://schemas.openxmlformats.org/officeDocument/2006/math" xmlns:a14="http://schemas.microsoft.com/office/drawing/2010/main" xmlns:ma14="http://schemas.microsoft.com/office/mac/drawingml/2011/main" val="1"/>
+              <ma14:wrappingTextBoxFlag xmlns:ma14="http://schemas.microsoft.com/office/mac/drawingml/2011/main" xmlns:a14="http://schemas.microsoft.com/office/drawing/2010/main" xmlns:m="http://schemas.openxmlformats.org/officeDocument/2006/math" xmlns="" val="1"/>
             </a:ext>
           </a:extLst>
         </p:spPr>
@@ -38225,7 +38353,7 @@
           </a:ln>
           <a:extLst>
             <a:ext uri="{C572A759-6A51-4108-AA02-DFA0A04FC94B}">
-              <ma14:wrappingTextBoxFlag xmlns="" xmlns:m="http://schemas.openxmlformats.org/officeDocument/2006/math" xmlns:a14="http://schemas.microsoft.com/office/drawing/2010/main" xmlns:ma14="http://schemas.microsoft.com/office/mac/drawingml/2011/main" val="1"/>
+              <ma14:wrappingTextBoxFlag xmlns:ma14="http://schemas.microsoft.com/office/mac/drawingml/2011/main" xmlns:a14="http://schemas.microsoft.com/office/drawing/2010/main" xmlns:m="http://schemas.openxmlformats.org/officeDocument/2006/math" xmlns="" val="1"/>
             </a:ext>
           </a:extLst>
         </p:spPr>
@@ -38268,7 +38396,7 @@
           </a:ln>
           <a:extLst>
             <a:ext uri="{C572A759-6A51-4108-AA02-DFA0A04FC94B}">
-              <ma14:wrappingTextBoxFlag xmlns="" xmlns:m="http://schemas.openxmlformats.org/officeDocument/2006/math" xmlns:a14="http://schemas.microsoft.com/office/drawing/2010/main" xmlns:ma14="http://schemas.microsoft.com/office/mac/drawingml/2011/main" val="1"/>
+              <ma14:wrappingTextBoxFlag xmlns:ma14="http://schemas.microsoft.com/office/mac/drawingml/2011/main" xmlns:a14="http://schemas.microsoft.com/office/drawing/2010/main" xmlns:m="http://schemas.openxmlformats.org/officeDocument/2006/math" xmlns="" val="1"/>
             </a:ext>
           </a:extLst>
         </p:spPr>
@@ -38393,7 +38521,7 @@
           </a:ln>
           <a:extLst>
             <a:ext uri="{C572A759-6A51-4108-AA02-DFA0A04FC94B}">
-              <ma14:wrappingTextBoxFlag xmlns="" xmlns:m="http://schemas.openxmlformats.org/officeDocument/2006/math" xmlns:a14="http://schemas.microsoft.com/office/drawing/2010/main" xmlns:ma14="http://schemas.microsoft.com/office/mac/drawingml/2011/main" val="1"/>
+              <ma14:wrappingTextBoxFlag xmlns:ma14="http://schemas.microsoft.com/office/mac/drawingml/2011/main" xmlns:a14="http://schemas.microsoft.com/office/drawing/2010/main" xmlns:m="http://schemas.openxmlformats.org/officeDocument/2006/math" xmlns="" val="1"/>
             </a:ext>
           </a:extLst>
         </p:spPr>
@@ -38443,7 +38571,7 @@
           </a:ln>
           <a:extLst>
             <a:ext uri="{C572A759-6A51-4108-AA02-DFA0A04FC94B}">
-              <ma14:wrappingTextBoxFlag xmlns="" xmlns:m="http://schemas.openxmlformats.org/officeDocument/2006/math" xmlns:a14="http://schemas.microsoft.com/office/drawing/2010/main" xmlns:ma14="http://schemas.microsoft.com/office/mac/drawingml/2011/main" val="1"/>
+              <ma14:wrappingTextBoxFlag xmlns:ma14="http://schemas.microsoft.com/office/mac/drawingml/2011/main" xmlns:a14="http://schemas.microsoft.com/office/drawing/2010/main" xmlns:m="http://schemas.openxmlformats.org/officeDocument/2006/math" xmlns="" val="1"/>
             </a:ext>
           </a:extLst>
         </p:spPr>
@@ -38490,7 +38618,7 @@
           </a:ln>
           <a:extLst>
             <a:ext uri="{C572A759-6A51-4108-AA02-DFA0A04FC94B}">
-              <ma14:wrappingTextBoxFlag xmlns="" xmlns:m="http://schemas.openxmlformats.org/officeDocument/2006/math" xmlns:a14="http://schemas.microsoft.com/office/drawing/2010/main" xmlns:ma14="http://schemas.microsoft.com/office/mac/drawingml/2011/main" val="1"/>
+              <ma14:wrappingTextBoxFlag xmlns:ma14="http://schemas.microsoft.com/office/mac/drawingml/2011/main" xmlns:a14="http://schemas.microsoft.com/office/drawing/2010/main" xmlns:m="http://schemas.openxmlformats.org/officeDocument/2006/math" xmlns="" val="1"/>
             </a:ext>
           </a:extLst>
         </p:spPr>
@@ -38559,7 +38687,7 @@
           </a:ln>
           <a:extLst>
             <a:ext uri="{C572A759-6A51-4108-AA02-DFA0A04FC94B}">
-              <ma14:wrappingTextBoxFlag xmlns="" xmlns:m="http://schemas.openxmlformats.org/officeDocument/2006/math" xmlns:a14="http://schemas.microsoft.com/office/drawing/2010/main" xmlns:ma14="http://schemas.microsoft.com/office/mac/drawingml/2011/main" val="1"/>
+              <ma14:wrappingTextBoxFlag xmlns:ma14="http://schemas.microsoft.com/office/mac/drawingml/2011/main" xmlns:a14="http://schemas.microsoft.com/office/drawing/2010/main" xmlns:m="http://schemas.openxmlformats.org/officeDocument/2006/math" xmlns="" val="1"/>
             </a:ext>
           </a:extLst>
         </p:spPr>
@@ -38595,7 +38723,7 @@
           </a:prstGeom>
           <a:extLst>
             <a:ext uri="{C572A759-6A51-4108-AA02-DFA0A04FC94B}">
-              <ma14:wrappingTextBoxFlag xmlns="" xmlns:m="http://schemas.openxmlformats.org/officeDocument/2006/math" xmlns:a14="http://schemas.microsoft.com/office/drawing/2010/main" xmlns:ma14="http://schemas.microsoft.com/office/mac/drawingml/2011/main" val="1"/>
+              <ma14:wrappingTextBoxFlag xmlns:ma14="http://schemas.microsoft.com/office/mac/drawingml/2011/main" xmlns:a14="http://schemas.microsoft.com/office/drawing/2010/main" xmlns:m="http://schemas.openxmlformats.org/officeDocument/2006/math" xmlns="" val="1"/>
             </a:ext>
           </a:extLst>
         </p:spPr>
@@ -38633,7 +38761,7 @@
           </a:ln>
           <a:extLst>
             <a:ext uri="{C572A759-6A51-4108-AA02-DFA0A04FC94B}">
-              <ma14:wrappingTextBoxFlag xmlns="" xmlns:m="http://schemas.openxmlformats.org/officeDocument/2006/math" xmlns:a14="http://schemas.microsoft.com/office/drawing/2010/main" xmlns:ma14="http://schemas.microsoft.com/office/mac/drawingml/2011/main" val="1"/>
+              <ma14:wrappingTextBoxFlag xmlns:ma14="http://schemas.microsoft.com/office/mac/drawingml/2011/main" xmlns:a14="http://schemas.microsoft.com/office/drawing/2010/main" xmlns:m="http://schemas.openxmlformats.org/officeDocument/2006/math" xmlns="" val="1"/>
             </a:ext>
           </a:extLst>
         </p:spPr>
@@ -38746,7 +38874,7 @@
               </a:ln>
               <a:extLst>
                 <a:ext uri="{C572A759-6A51-4108-AA02-DFA0A04FC94B}">
-                  <ma14:wrappingTextBoxFlag xmlns="" xmlns:m="http://schemas.openxmlformats.org/officeDocument/2006/math" xmlns:ma14="http://schemas.microsoft.com/office/mac/drawingml/2011/main" val="1"/>
+                  <ma14:wrappingTextBoxFlag xmlns:ma14="http://schemas.microsoft.com/office/mac/drawingml/2011/main" xmlns:m="http://schemas.openxmlformats.org/officeDocument/2006/math" xmlns="" val="1"/>
                 </a:ext>
               </a:extLst>
             </p:spPr>
@@ -38996,7 +39124,7 @@
           </a:ln>
           <a:extLst>
             <a:ext uri="{C572A759-6A51-4108-AA02-DFA0A04FC94B}">
-              <ma14:wrappingTextBoxFlag xmlns="" xmlns:m="http://schemas.openxmlformats.org/officeDocument/2006/math" xmlns:a14="http://schemas.microsoft.com/office/drawing/2010/main" xmlns:ma14="http://schemas.microsoft.com/office/mac/drawingml/2011/main" val="1"/>
+              <ma14:wrappingTextBoxFlag xmlns:ma14="http://schemas.microsoft.com/office/mac/drawingml/2011/main" xmlns:a14="http://schemas.microsoft.com/office/drawing/2010/main" xmlns:m="http://schemas.openxmlformats.org/officeDocument/2006/math" xmlns="" val="1"/>
             </a:ext>
           </a:extLst>
         </p:spPr>
@@ -39037,7 +39165,7 @@
               </a:ln>
               <a:extLst>
                 <a:ext uri="{C572A759-6A51-4108-AA02-DFA0A04FC94B}">
-                  <ma14:wrappingTextBoxFlag xmlns="" xmlns:m="http://schemas.openxmlformats.org/officeDocument/2006/math" xmlns:ma14="http://schemas.microsoft.com/office/mac/drawingml/2011/main" val="1"/>
+                  <ma14:wrappingTextBoxFlag xmlns:ma14="http://schemas.microsoft.com/office/mac/drawingml/2011/main" xmlns:m="http://schemas.openxmlformats.org/officeDocument/2006/math" xmlns="" val="1"/>
                 </a:ext>
               </a:extLst>
             </p:spPr>
@@ -39399,7 +39527,7 @@
               </a:ln>
               <a:extLst>
                 <a:ext uri="{C572A759-6A51-4108-AA02-DFA0A04FC94B}">
-                  <ma14:wrappingTextBoxFlag xmlns="" xmlns:m="http://schemas.openxmlformats.org/officeDocument/2006/math" xmlns:ma14="http://schemas.microsoft.com/office/mac/drawingml/2011/main" val="1"/>
+                  <ma14:wrappingTextBoxFlag xmlns:ma14="http://schemas.microsoft.com/office/mac/drawingml/2011/main" xmlns:m="http://schemas.openxmlformats.org/officeDocument/2006/math" xmlns="" val="1"/>
                 </a:ext>
               </a:extLst>
             </p:spPr>
@@ -39602,7 +39730,7 @@
           </a:ln>
           <a:extLst>
             <a:ext uri="{C572A759-6A51-4108-AA02-DFA0A04FC94B}">
-              <ma14:wrappingTextBoxFlag xmlns="" xmlns:m="http://schemas.openxmlformats.org/officeDocument/2006/math" xmlns:a14="http://schemas.microsoft.com/office/drawing/2010/main" xmlns:ma14="http://schemas.microsoft.com/office/mac/drawingml/2011/main" val="1"/>
+              <ma14:wrappingTextBoxFlag xmlns:ma14="http://schemas.microsoft.com/office/mac/drawingml/2011/main" xmlns:a14="http://schemas.microsoft.com/office/drawing/2010/main" xmlns:m="http://schemas.openxmlformats.org/officeDocument/2006/math" xmlns="" val="1"/>
             </a:ext>
           </a:extLst>
         </p:spPr>
@@ -39664,7 +39792,7 @@
           </a:prstGeom>
           <a:extLst>
             <a:ext uri="{C572A759-6A51-4108-AA02-DFA0A04FC94B}">
-              <ma14:wrappingTextBoxFlag xmlns="" xmlns:m="http://schemas.openxmlformats.org/officeDocument/2006/math" xmlns:a14="http://schemas.microsoft.com/office/drawing/2010/main" xmlns:ma14="http://schemas.microsoft.com/office/mac/drawingml/2011/main" val="1"/>
+              <ma14:wrappingTextBoxFlag xmlns:ma14="http://schemas.microsoft.com/office/mac/drawingml/2011/main" xmlns:a14="http://schemas.microsoft.com/office/drawing/2010/main" xmlns:m="http://schemas.openxmlformats.org/officeDocument/2006/math" xmlns="" val="1"/>
             </a:ext>
           </a:extLst>
         </p:spPr>
@@ -39698,7 +39826,7 @@
           </a:ln>
           <a:extLst>
             <a:ext uri="{C572A759-6A51-4108-AA02-DFA0A04FC94B}">
-              <ma14:wrappingTextBoxFlag xmlns="" xmlns:m="http://schemas.openxmlformats.org/officeDocument/2006/math" xmlns:a14="http://schemas.microsoft.com/office/drawing/2010/main" xmlns:ma14="http://schemas.microsoft.com/office/mac/drawingml/2011/main" val="1"/>
+              <ma14:wrappingTextBoxFlag xmlns:ma14="http://schemas.microsoft.com/office/mac/drawingml/2011/main" xmlns:a14="http://schemas.microsoft.com/office/drawing/2010/main" xmlns:m="http://schemas.openxmlformats.org/officeDocument/2006/math" xmlns="" val="1"/>
             </a:ext>
           </a:extLst>
         </p:spPr>
@@ -39737,7 +39865,7 @@
           </a:ln>
           <a:extLst>
             <a:ext uri="{C572A759-6A51-4108-AA02-DFA0A04FC94B}">
-              <ma14:wrappingTextBoxFlag xmlns="" xmlns:m="http://schemas.openxmlformats.org/officeDocument/2006/math" xmlns:a14="http://schemas.microsoft.com/office/drawing/2010/main" xmlns:ma14="http://schemas.microsoft.com/office/mac/drawingml/2011/main" val="1"/>
+              <ma14:wrappingTextBoxFlag xmlns:ma14="http://schemas.microsoft.com/office/mac/drawingml/2011/main" xmlns:a14="http://schemas.microsoft.com/office/drawing/2010/main" xmlns:m="http://schemas.openxmlformats.org/officeDocument/2006/math" xmlns="" val="1"/>
             </a:ext>
           </a:extLst>
         </p:spPr>
@@ -39842,7 +39970,7 @@
           </a:ln>
           <a:extLst>
             <a:ext uri="{C572A759-6A51-4108-AA02-DFA0A04FC94B}">
-              <ma14:wrappingTextBoxFlag xmlns="" xmlns:m="http://schemas.openxmlformats.org/officeDocument/2006/math" xmlns:a14="http://schemas.microsoft.com/office/drawing/2010/main" xmlns:ma14="http://schemas.microsoft.com/office/mac/drawingml/2011/main" val="1"/>
+              <ma14:wrappingTextBoxFlag xmlns:ma14="http://schemas.microsoft.com/office/mac/drawingml/2011/main" xmlns:a14="http://schemas.microsoft.com/office/drawing/2010/main" xmlns:m="http://schemas.openxmlformats.org/officeDocument/2006/math" xmlns="" val="1"/>
             </a:ext>
           </a:extLst>
         </p:spPr>
@@ -39904,7 +40032,7 @@
           </a:prstGeom>
           <a:extLst>
             <a:ext uri="{C572A759-6A51-4108-AA02-DFA0A04FC94B}">
-              <ma14:wrappingTextBoxFlag xmlns="" xmlns:m="http://schemas.openxmlformats.org/officeDocument/2006/math" xmlns:a14="http://schemas.microsoft.com/office/drawing/2010/main" xmlns:ma14="http://schemas.microsoft.com/office/mac/drawingml/2011/main" val="1"/>
+              <ma14:wrappingTextBoxFlag xmlns:ma14="http://schemas.microsoft.com/office/mac/drawingml/2011/main" xmlns:a14="http://schemas.microsoft.com/office/drawing/2010/main" xmlns:m="http://schemas.openxmlformats.org/officeDocument/2006/math" xmlns="" val="1"/>
             </a:ext>
           </a:extLst>
         </p:spPr>
@@ -39938,7 +40066,7 @@
           </a:ln>
           <a:extLst>
             <a:ext uri="{C572A759-6A51-4108-AA02-DFA0A04FC94B}">
-              <ma14:wrappingTextBoxFlag xmlns="" xmlns:m="http://schemas.openxmlformats.org/officeDocument/2006/math" xmlns:a14="http://schemas.microsoft.com/office/drawing/2010/main" xmlns:ma14="http://schemas.microsoft.com/office/mac/drawingml/2011/main" val="1"/>
+              <ma14:wrappingTextBoxFlag xmlns:ma14="http://schemas.microsoft.com/office/mac/drawingml/2011/main" xmlns:a14="http://schemas.microsoft.com/office/drawing/2010/main" xmlns:m="http://schemas.openxmlformats.org/officeDocument/2006/math" xmlns="" val="1"/>
             </a:ext>
           </a:extLst>
         </p:spPr>
@@ -39977,7 +40105,7 @@
           </a:ln>
           <a:extLst>
             <a:ext uri="{C572A759-6A51-4108-AA02-DFA0A04FC94B}">
-              <ma14:wrappingTextBoxFlag xmlns="" xmlns:m="http://schemas.openxmlformats.org/officeDocument/2006/math" xmlns:a14="http://schemas.microsoft.com/office/drawing/2010/main" xmlns:ma14="http://schemas.microsoft.com/office/mac/drawingml/2011/main" val="1"/>
+              <ma14:wrappingTextBoxFlag xmlns:ma14="http://schemas.microsoft.com/office/mac/drawingml/2011/main" xmlns:a14="http://schemas.microsoft.com/office/drawing/2010/main" xmlns:m="http://schemas.openxmlformats.org/officeDocument/2006/math" xmlns="" val="1"/>
             </a:ext>
           </a:extLst>
         </p:spPr>
@@ -40016,7 +40144,7 @@
           </a:ln>
           <a:extLst>
             <a:ext uri="{C572A759-6A51-4108-AA02-DFA0A04FC94B}">
-              <ma14:wrappingTextBoxFlag xmlns="" xmlns:m="http://schemas.openxmlformats.org/officeDocument/2006/math" xmlns:a14="http://schemas.microsoft.com/office/drawing/2010/main" xmlns:ma14="http://schemas.microsoft.com/office/mac/drawingml/2011/main" val="1"/>
+              <ma14:wrappingTextBoxFlag xmlns:ma14="http://schemas.microsoft.com/office/mac/drawingml/2011/main" xmlns:a14="http://schemas.microsoft.com/office/drawing/2010/main" xmlns:m="http://schemas.openxmlformats.org/officeDocument/2006/math" xmlns="" val="1"/>
             </a:ext>
           </a:extLst>
         </p:spPr>
@@ -40153,7 +40281,7 @@
           </a:prstGeom>
           <a:extLst>
             <a:ext uri="{C572A759-6A51-4108-AA02-DFA0A04FC94B}">
-              <ma14:wrappingTextBoxFlag xmlns="" xmlns:m="http://schemas.openxmlformats.org/officeDocument/2006/math" xmlns:a14="http://schemas.microsoft.com/office/drawing/2010/main" xmlns:ma14="http://schemas.microsoft.com/office/mac/drawingml/2011/main" val="1"/>
+              <ma14:wrappingTextBoxFlag xmlns:ma14="http://schemas.microsoft.com/office/mac/drawingml/2011/main" xmlns:a14="http://schemas.microsoft.com/office/drawing/2010/main" xmlns:m="http://schemas.openxmlformats.org/officeDocument/2006/math" xmlns="" val="1"/>
             </a:ext>
           </a:extLst>
         </p:spPr>
@@ -40217,7 +40345,7 @@
           </a:ln>
           <a:extLst>
             <a:ext uri="{C572A759-6A51-4108-AA02-DFA0A04FC94B}">
-              <ma14:wrappingTextBoxFlag xmlns="" xmlns:m="http://schemas.openxmlformats.org/officeDocument/2006/math" xmlns:a14="http://schemas.microsoft.com/office/drawing/2010/main" xmlns:ma14="http://schemas.microsoft.com/office/mac/drawingml/2011/main" val="1"/>
+              <ma14:wrappingTextBoxFlag xmlns:ma14="http://schemas.microsoft.com/office/mac/drawingml/2011/main" xmlns:a14="http://schemas.microsoft.com/office/drawing/2010/main" xmlns:m="http://schemas.openxmlformats.org/officeDocument/2006/math" xmlns="" val="1"/>
             </a:ext>
           </a:extLst>
         </p:spPr>
@@ -40253,7 +40381,7 @@
           </a:prstGeom>
           <a:extLst>
             <a:ext uri="{C572A759-6A51-4108-AA02-DFA0A04FC94B}">
-              <ma14:wrappingTextBoxFlag xmlns="" xmlns:m="http://schemas.openxmlformats.org/officeDocument/2006/math" xmlns:a14="http://schemas.microsoft.com/office/drawing/2010/main" xmlns:ma14="http://schemas.microsoft.com/office/mac/drawingml/2011/main" val="1"/>
+              <ma14:wrappingTextBoxFlag xmlns:ma14="http://schemas.microsoft.com/office/mac/drawingml/2011/main" xmlns:a14="http://schemas.microsoft.com/office/drawing/2010/main" xmlns:m="http://schemas.openxmlformats.org/officeDocument/2006/math" xmlns="" val="1"/>
             </a:ext>
           </a:extLst>
         </p:spPr>
@@ -40291,7 +40419,7 @@
           </a:ln>
           <a:extLst>
             <a:ext uri="{C572A759-6A51-4108-AA02-DFA0A04FC94B}">
-              <ma14:wrappingTextBoxFlag xmlns="" xmlns:m="http://schemas.openxmlformats.org/officeDocument/2006/math" xmlns:a14="http://schemas.microsoft.com/office/drawing/2010/main" xmlns:ma14="http://schemas.microsoft.com/office/mac/drawingml/2011/main" val="1"/>
+              <ma14:wrappingTextBoxFlag xmlns:ma14="http://schemas.microsoft.com/office/mac/drawingml/2011/main" xmlns:a14="http://schemas.microsoft.com/office/drawing/2010/main" xmlns:m="http://schemas.openxmlformats.org/officeDocument/2006/math" xmlns="" val="1"/>
             </a:ext>
           </a:extLst>
         </p:spPr>
@@ -40402,7 +40530,7 @@
           </a:ln>
           <a:extLst>
             <a:ext uri="{C572A759-6A51-4108-AA02-DFA0A04FC94B}">
-              <ma14:wrappingTextBoxFlag xmlns="" xmlns:m="http://schemas.openxmlformats.org/officeDocument/2006/math" xmlns:a14="http://schemas.microsoft.com/office/drawing/2010/main" xmlns:ma14="http://schemas.microsoft.com/office/mac/drawingml/2011/main" val="1"/>
+              <ma14:wrappingTextBoxFlag xmlns:ma14="http://schemas.microsoft.com/office/mac/drawingml/2011/main" xmlns:a14="http://schemas.microsoft.com/office/drawing/2010/main" xmlns:m="http://schemas.openxmlformats.org/officeDocument/2006/math" xmlns="" val="1"/>
             </a:ext>
           </a:extLst>
         </p:spPr>
@@ -40494,7 +40622,7 @@
           </a:ln>
           <a:extLst>
             <a:ext uri="{C572A759-6A51-4108-AA02-DFA0A04FC94B}">
-              <ma14:wrappingTextBoxFlag xmlns="" xmlns:m="http://schemas.openxmlformats.org/officeDocument/2006/math" xmlns:a14="http://schemas.microsoft.com/office/drawing/2010/main" xmlns:ma14="http://schemas.microsoft.com/office/mac/drawingml/2011/main" val="1"/>
+              <ma14:wrappingTextBoxFlag xmlns:ma14="http://schemas.microsoft.com/office/mac/drawingml/2011/main" xmlns:a14="http://schemas.microsoft.com/office/drawing/2010/main" xmlns:m="http://schemas.openxmlformats.org/officeDocument/2006/math" xmlns="" val="1"/>
             </a:ext>
           </a:extLst>
         </p:spPr>
@@ -40530,7 +40658,7 @@
           </a:prstGeom>
           <a:extLst>
             <a:ext uri="{C572A759-6A51-4108-AA02-DFA0A04FC94B}">
-              <ma14:wrappingTextBoxFlag xmlns="" xmlns:m="http://schemas.openxmlformats.org/officeDocument/2006/math" xmlns:a14="http://schemas.microsoft.com/office/drawing/2010/main" xmlns:ma14="http://schemas.microsoft.com/office/mac/drawingml/2011/main" val="1"/>
+              <ma14:wrappingTextBoxFlag xmlns:ma14="http://schemas.microsoft.com/office/mac/drawingml/2011/main" xmlns:a14="http://schemas.microsoft.com/office/drawing/2010/main" xmlns:m="http://schemas.openxmlformats.org/officeDocument/2006/math" xmlns="" val="1"/>
             </a:ext>
           </a:extLst>
         </p:spPr>
@@ -40568,7 +40696,7 @@
           </a:ln>
           <a:extLst>
             <a:ext uri="{C572A759-6A51-4108-AA02-DFA0A04FC94B}">
-              <ma14:wrappingTextBoxFlag xmlns="" xmlns:m="http://schemas.openxmlformats.org/officeDocument/2006/math" xmlns:a14="http://schemas.microsoft.com/office/drawing/2010/main" xmlns:ma14="http://schemas.microsoft.com/office/mac/drawingml/2011/main" val="1"/>
+              <ma14:wrappingTextBoxFlag xmlns:ma14="http://schemas.microsoft.com/office/mac/drawingml/2011/main" xmlns:a14="http://schemas.microsoft.com/office/drawing/2010/main" xmlns:m="http://schemas.openxmlformats.org/officeDocument/2006/math" xmlns="" val="1"/>
             </a:ext>
           </a:extLst>
         </p:spPr>
@@ -40679,7 +40807,7 @@
           </a:ln>
           <a:extLst>
             <a:ext uri="{C572A759-6A51-4108-AA02-DFA0A04FC94B}">
-              <ma14:wrappingTextBoxFlag xmlns="" xmlns:m="http://schemas.openxmlformats.org/officeDocument/2006/math" xmlns:a14="http://schemas.microsoft.com/office/drawing/2010/main" xmlns:ma14="http://schemas.microsoft.com/office/mac/drawingml/2011/main" val="1"/>
+              <ma14:wrappingTextBoxFlag xmlns:ma14="http://schemas.microsoft.com/office/mac/drawingml/2011/main" xmlns:a14="http://schemas.microsoft.com/office/drawing/2010/main" xmlns:m="http://schemas.openxmlformats.org/officeDocument/2006/math" xmlns="" val="1"/>
             </a:ext>
           </a:extLst>
         </p:spPr>
@@ -40718,7 +40846,7 @@
           </a:ln>
           <a:extLst>
             <a:ext uri="{C572A759-6A51-4108-AA02-DFA0A04FC94B}">
-              <ma14:wrappingTextBoxFlag xmlns="" xmlns:m="http://schemas.openxmlformats.org/officeDocument/2006/math" xmlns:a14="http://schemas.microsoft.com/office/drawing/2010/main" xmlns:ma14="http://schemas.microsoft.com/office/mac/drawingml/2011/main" val="1"/>
+              <ma14:wrappingTextBoxFlag xmlns:ma14="http://schemas.microsoft.com/office/mac/drawingml/2011/main" xmlns:a14="http://schemas.microsoft.com/office/drawing/2010/main" xmlns:m="http://schemas.openxmlformats.org/officeDocument/2006/math" xmlns="" val="1"/>
             </a:ext>
           </a:extLst>
         </p:spPr>
@@ -40810,7 +40938,7 @@
           </a:ln>
           <a:extLst>
             <a:ext uri="{C572A759-6A51-4108-AA02-DFA0A04FC94B}">
-              <ma14:wrappingTextBoxFlag xmlns="" xmlns:m="http://schemas.openxmlformats.org/officeDocument/2006/math" xmlns:a14="http://schemas.microsoft.com/office/drawing/2010/main" xmlns:ma14="http://schemas.microsoft.com/office/mac/drawingml/2011/main" val="1"/>
+              <ma14:wrappingTextBoxFlag xmlns:ma14="http://schemas.microsoft.com/office/mac/drawingml/2011/main" xmlns:a14="http://schemas.microsoft.com/office/drawing/2010/main" xmlns:m="http://schemas.openxmlformats.org/officeDocument/2006/math" xmlns="" val="1"/>
             </a:ext>
           </a:extLst>
         </p:spPr>
@@ -40846,7 +40974,7 @@
           </a:prstGeom>
           <a:extLst>
             <a:ext uri="{C572A759-6A51-4108-AA02-DFA0A04FC94B}">
-              <ma14:wrappingTextBoxFlag xmlns="" xmlns:m="http://schemas.openxmlformats.org/officeDocument/2006/math" xmlns:a14="http://schemas.microsoft.com/office/drawing/2010/main" xmlns:ma14="http://schemas.microsoft.com/office/mac/drawingml/2011/main" val="1"/>
+              <ma14:wrappingTextBoxFlag xmlns:ma14="http://schemas.microsoft.com/office/mac/drawingml/2011/main" xmlns:a14="http://schemas.microsoft.com/office/drawing/2010/main" xmlns:m="http://schemas.openxmlformats.org/officeDocument/2006/math" xmlns="" val="1"/>
             </a:ext>
           </a:extLst>
         </p:spPr>
@@ -40884,7 +41012,7 @@
           </a:ln>
           <a:extLst>
             <a:ext uri="{C572A759-6A51-4108-AA02-DFA0A04FC94B}">
-              <ma14:wrappingTextBoxFlag xmlns="" xmlns:m="http://schemas.openxmlformats.org/officeDocument/2006/math" xmlns:a14="http://schemas.microsoft.com/office/drawing/2010/main" xmlns:ma14="http://schemas.microsoft.com/office/mac/drawingml/2011/main" val="1"/>
+              <ma14:wrappingTextBoxFlag xmlns:ma14="http://schemas.microsoft.com/office/mac/drawingml/2011/main" xmlns:a14="http://schemas.microsoft.com/office/drawing/2010/main" xmlns:m="http://schemas.openxmlformats.org/officeDocument/2006/math" xmlns="" val="1"/>
             </a:ext>
           </a:extLst>
         </p:spPr>
@@ -40995,7 +41123,7 @@
           </a:ln>
           <a:extLst>
             <a:ext uri="{C572A759-6A51-4108-AA02-DFA0A04FC94B}">
-              <ma14:wrappingTextBoxFlag xmlns="" xmlns:m="http://schemas.openxmlformats.org/officeDocument/2006/math" xmlns:a14="http://schemas.microsoft.com/office/drawing/2010/main" xmlns:ma14="http://schemas.microsoft.com/office/mac/drawingml/2011/main" val="1"/>
+              <ma14:wrappingTextBoxFlag xmlns:ma14="http://schemas.microsoft.com/office/mac/drawingml/2011/main" xmlns:a14="http://schemas.microsoft.com/office/drawing/2010/main" xmlns:m="http://schemas.openxmlformats.org/officeDocument/2006/math" xmlns="" val="1"/>
             </a:ext>
           </a:extLst>
         </p:spPr>
@@ -41034,7 +41162,7 @@
           </a:ln>
           <a:extLst>
             <a:ext uri="{C572A759-6A51-4108-AA02-DFA0A04FC94B}">
-              <ma14:wrappingTextBoxFlag xmlns="" xmlns:m="http://schemas.openxmlformats.org/officeDocument/2006/math" xmlns:a14="http://schemas.microsoft.com/office/drawing/2010/main" xmlns:ma14="http://schemas.microsoft.com/office/mac/drawingml/2011/main" val="1"/>
+              <ma14:wrappingTextBoxFlag xmlns:ma14="http://schemas.microsoft.com/office/mac/drawingml/2011/main" xmlns:a14="http://schemas.microsoft.com/office/drawing/2010/main" xmlns:m="http://schemas.openxmlformats.org/officeDocument/2006/math" xmlns="" val="1"/>
             </a:ext>
           </a:extLst>
         </p:spPr>
@@ -41126,7 +41254,7 @@
           </a:ln>
           <a:extLst>
             <a:ext uri="{C572A759-6A51-4108-AA02-DFA0A04FC94B}">
-              <ma14:wrappingTextBoxFlag xmlns="" xmlns:m="http://schemas.openxmlformats.org/officeDocument/2006/math" xmlns:a14="http://schemas.microsoft.com/office/drawing/2010/main" xmlns:ma14="http://schemas.microsoft.com/office/mac/drawingml/2011/main" val="1"/>
+              <ma14:wrappingTextBoxFlag xmlns:ma14="http://schemas.microsoft.com/office/mac/drawingml/2011/main" xmlns:a14="http://schemas.microsoft.com/office/drawing/2010/main" xmlns:m="http://schemas.openxmlformats.org/officeDocument/2006/math" xmlns="" val="1"/>
             </a:ext>
           </a:extLst>
         </p:spPr>
@@ -41162,7 +41290,7 @@
           </a:prstGeom>
           <a:extLst>
             <a:ext uri="{C572A759-6A51-4108-AA02-DFA0A04FC94B}">
-              <ma14:wrappingTextBoxFlag xmlns="" xmlns:m="http://schemas.openxmlformats.org/officeDocument/2006/math" xmlns:a14="http://schemas.microsoft.com/office/drawing/2010/main" xmlns:ma14="http://schemas.microsoft.com/office/mac/drawingml/2011/main" val="1"/>
+              <ma14:wrappingTextBoxFlag xmlns:ma14="http://schemas.microsoft.com/office/mac/drawingml/2011/main" xmlns:a14="http://schemas.microsoft.com/office/drawing/2010/main" xmlns:m="http://schemas.openxmlformats.org/officeDocument/2006/math" xmlns="" val="1"/>
             </a:ext>
           </a:extLst>
         </p:spPr>
@@ -41200,7 +41328,7 @@
           </a:ln>
           <a:extLst>
             <a:ext uri="{C572A759-6A51-4108-AA02-DFA0A04FC94B}">
-              <ma14:wrappingTextBoxFlag xmlns="" xmlns:m="http://schemas.openxmlformats.org/officeDocument/2006/math" xmlns:a14="http://schemas.microsoft.com/office/drawing/2010/main" xmlns:ma14="http://schemas.microsoft.com/office/mac/drawingml/2011/main" val="1"/>
+              <ma14:wrappingTextBoxFlag xmlns:ma14="http://schemas.microsoft.com/office/mac/drawingml/2011/main" xmlns:a14="http://schemas.microsoft.com/office/drawing/2010/main" xmlns:m="http://schemas.openxmlformats.org/officeDocument/2006/math" xmlns="" val="1"/>
             </a:ext>
           </a:extLst>
         </p:spPr>
@@ -41311,7 +41439,7 @@
           </a:ln>
           <a:extLst>
             <a:ext uri="{C572A759-6A51-4108-AA02-DFA0A04FC94B}">
-              <ma14:wrappingTextBoxFlag xmlns="" xmlns:m="http://schemas.openxmlformats.org/officeDocument/2006/math" xmlns:a14="http://schemas.microsoft.com/office/drawing/2010/main" xmlns:ma14="http://schemas.microsoft.com/office/mac/drawingml/2011/main" val="1"/>
+              <ma14:wrappingTextBoxFlag xmlns:ma14="http://schemas.microsoft.com/office/mac/drawingml/2011/main" xmlns:a14="http://schemas.microsoft.com/office/drawing/2010/main" xmlns:m="http://schemas.openxmlformats.org/officeDocument/2006/math" xmlns="" val="1"/>
             </a:ext>
           </a:extLst>
         </p:spPr>
@@ -41373,7 +41501,7 @@
           </a:prstGeom>
           <a:extLst>
             <a:ext uri="{C572A759-6A51-4108-AA02-DFA0A04FC94B}">
-              <ma14:wrappingTextBoxFlag xmlns="" xmlns:m="http://schemas.openxmlformats.org/officeDocument/2006/math" xmlns:a14="http://schemas.microsoft.com/office/drawing/2010/main" xmlns:ma14="http://schemas.microsoft.com/office/mac/drawingml/2011/main" val="1"/>
+              <ma14:wrappingTextBoxFlag xmlns:ma14="http://schemas.microsoft.com/office/mac/drawingml/2011/main" xmlns:a14="http://schemas.microsoft.com/office/drawing/2010/main" xmlns:m="http://schemas.openxmlformats.org/officeDocument/2006/math" xmlns="" val="1"/>
             </a:ext>
           </a:extLst>
         </p:spPr>
@@ -41411,7 +41539,7 @@
           </a:ln>
           <a:extLst>
             <a:ext uri="{C572A759-6A51-4108-AA02-DFA0A04FC94B}">
-              <ma14:wrappingTextBoxFlag xmlns="" xmlns:m="http://schemas.openxmlformats.org/officeDocument/2006/math" xmlns:a14="http://schemas.microsoft.com/office/drawing/2010/main" xmlns:ma14="http://schemas.microsoft.com/office/mac/drawingml/2011/main" val="1"/>
+              <ma14:wrappingTextBoxFlag xmlns:ma14="http://schemas.microsoft.com/office/mac/drawingml/2011/main" xmlns:a14="http://schemas.microsoft.com/office/drawing/2010/main" xmlns:m="http://schemas.openxmlformats.org/officeDocument/2006/math" xmlns="" val="1"/>
             </a:ext>
           </a:extLst>
         </p:spPr>
@@ -41534,7 +41662,7 @@
           </a:ln>
           <a:extLst>
             <a:ext uri="{C572A759-6A51-4108-AA02-DFA0A04FC94B}">
-              <ma14:wrappingTextBoxFlag xmlns="" xmlns:m="http://schemas.openxmlformats.org/officeDocument/2006/math" xmlns:a14="http://schemas.microsoft.com/office/drawing/2010/main" xmlns:ma14="http://schemas.microsoft.com/office/mac/drawingml/2011/main" val="1"/>
+              <ma14:wrappingTextBoxFlag xmlns:ma14="http://schemas.microsoft.com/office/mac/drawingml/2011/main" xmlns:a14="http://schemas.microsoft.com/office/drawing/2010/main" xmlns:m="http://schemas.openxmlformats.org/officeDocument/2006/math" xmlns="" val="1"/>
             </a:ext>
           </a:extLst>
         </p:spPr>
@@ -41657,7 +41785,7 @@
           </a:ln>
           <a:extLst>
             <a:ext uri="{C572A759-6A51-4108-AA02-DFA0A04FC94B}">
-              <ma14:wrappingTextBoxFlag xmlns="" xmlns:m="http://schemas.openxmlformats.org/officeDocument/2006/math" xmlns:a14="http://schemas.microsoft.com/office/drawing/2010/main" xmlns:ma14="http://schemas.microsoft.com/office/mac/drawingml/2011/main" val="1"/>
+              <ma14:wrappingTextBoxFlag xmlns:ma14="http://schemas.microsoft.com/office/mac/drawingml/2011/main" xmlns:a14="http://schemas.microsoft.com/office/drawing/2010/main" xmlns:m="http://schemas.openxmlformats.org/officeDocument/2006/math" xmlns="" val="1"/>
             </a:ext>
           </a:extLst>
         </p:spPr>
@@ -41703,7 +41831,7 @@
           </a:ln>
           <a:extLst>
             <a:ext uri="{C572A759-6A51-4108-AA02-DFA0A04FC94B}">
-              <ma14:wrappingTextBoxFlag xmlns="" xmlns:m="http://schemas.openxmlformats.org/officeDocument/2006/math" xmlns:a14="http://schemas.microsoft.com/office/drawing/2010/main" xmlns:ma14="http://schemas.microsoft.com/office/mac/drawingml/2011/main" val="1"/>
+              <ma14:wrappingTextBoxFlag xmlns:ma14="http://schemas.microsoft.com/office/mac/drawingml/2011/main" xmlns:a14="http://schemas.microsoft.com/office/drawing/2010/main" xmlns:m="http://schemas.openxmlformats.org/officeDocument/2006/math" xmlns="" val="1"/>
             </a:ext>
           </a:extLst>
         </p:spPr>

</xml_diff>